<commit_message>
DOCS: add new page
</commit_message>
<xml_diff>
--- a/Report notes/GDL_PorosityDistribution.pptx
+++ b/Report notes/GDL_PorosityDistribution.pptx
@@ -5,18 +5,19 @@
     <p:sldMasterId id="2147483660" r:id="rId1"/>
   </p:sldMasterIdLst>
   <p:notesMasterIdLst>
-    <p:notesMasterId r:id="rId11"/>
+    <p:notesMasterId r:id="rId12"/>
   </p:notesMasterIdLst>
   <p:sldIdLst>
     <p:sldId id="261" r:id="rId2"/>
-    <p:sldId id="258" r:id="rId3"/>
-    <p:sldId id="264" r:id="rId4"/>
-    <p:sldId id="259" r:id="rId5"/>
-    <p:sldId id="262" r:id="rId6"/>
-    <p:sldId id="260" r:id="rId7"/>
-    <p:sldId id="256" r:id="rId8"/>
-    <p:sldId id="257" r:id="rId9"/>
-    <p:sldId id="263" r:id="rId10"/>
+    <p:sldId id="265" r:id="rId3"/>
+    <p:sldId id="258" r:id="rId4"/>
+    <p:sldId id="264" r:id="rId5"/>
+    <p:sldId id="259" r:id="rId6"/>
+    <p:sldId id="262" r:id="rId7"/>
+    <p:sldId id="260" r:id="rId8"/>
+    <p:sldId id="256" r:id="rId9"/>
+    <p:sldId id="257" r:id="rId10"/>
+    <p:sldId id="263" r:id="rId11"/>
   </p:sldIdLst>
   <p:sldSz cx="9144000" cy="6858000" type="screen4x3"/>
   <p:notesSz cx="6858000" cy="9144000"/>
@@ -158,9 +159,9 @@
     </p:extLst>
   </p:cm>
   <p:cm authorId="1" dt="2019-05-16T21:44:48.782" idx="3">
-    <p:pos x="4134" y="3492"/>
+    <p:pos x="3713" y="3293"/>
     <p:text>气体扩散的特性本质是分子碰撞的结果，催化层、扩散层以及流道内都存在这种现象，但是对于催化层来说，由于其孔隙直径非常小接近分子碰撞的平均自由程，因此分子和壁面之间的也会发生碰撞，则努森扩散变得十分重要，根据努森数可以判断努森扩散否占主导地位</p:text>
-    <p:extLst>
+    <p:extLst mod="1">
       <p:ext uri="{C676402C-5697-4E1C-873F-D02D1690AC5C}">
         <p15:threadingInfo xmlns:p15="http://schemas.microsoft.com/office/powerpoint/2012/main" timeZoneBias="-480"/>
       </p:ext>
@@ -176,9 +177,9 @@
     </p:extLst>
   </p:cm>
   <p:cm authorId="1" dt="2019-05-16T22:09:01.193" idx="5">
-    <p:pos x="3940" y="527"/>
+    <p:pos x="3468" y="453"/>
     <p:text>质子在通过质子交互膜时，往往要携带水分以水合氢离子的方式传递，由于质子传导引起的膜内水的传输称为电渗拖曳</p:text>
-    <p:extLst>
+    <p:extLst mod="1">
       <p:ext uri="{C676402C-5697-4E1C-873F-D02D1690AC5C}">
         <p15:threadingInfo xmlns:p15="http://schemas.microsoft.com/office/powerpoint/2012/main" timeZoneBias="-480"/>
       </p:ext>
@@ -269,7 +270,7 @@
           <a:p>
             <a:fld id="{4E31AF11-D304-43EE-B6E4-B029EBD63324}" type="datetimeFigureOut">
               <a:rPr lang="zh-CN" altLang="en-US" smtClean="0"/>
-              <a:t>2019/5/17</a:t>
+              <a:t>2019/5/20</a:t>
             </a:fld>
             <a:endParaRPr lang="zh-CN" altLang="en-US"/>
           </a:p>
@@ -752,7 +753,7 @@
           <a:p>
             <a:fld id="{0D931F99-1544-4821-BA39-7D82BFF6D049}" type="datetimeFigureOut">
               <a:rPr lang="zh-CN" altLang="en-US" smtClean="0"/>
-              <a:t>2019/5/17</a:t>
+              <a:t>2019/5/20</a:t>
             </a:fld>
             <a:endParaRPr lang="zh-CN" altLang="en-US"/>
           </a:p>
@@ -922,7 +923,7 @@
           <a:p>
             <a:fld id="{0D931F99-1544-4821-BA39-7D82BFF6D049}" type="datetimeFigureOut">
               <a:rPr lang="zh-CN" altLang="en-US" smtClean="0"/>
-              <a:t>2019/5/17</a:t>
+              <a:t>2019/5/20</a:t>
             </a:fld>
             <a:endParaRPr lang="zh-CN" altLang="en-US"/>
           </a:p>
@@ -1102,7 +1103,7 @@
           <a:p>
             <a:fld id="{0D931F99-1544-4821-BA39-7D82BFF6D049}" type="datetimeFigureOut">
               <a:rPr lang="zh-CN" altLang="en-US" smtClean="0"/>
-              <a:t>2019/5/17</a:t>
+              <a:t>2019/5/20</a:t>
             </a:fld>
             <a:endParaRPr lang="zh-CN" altLang="en-US"/>
           </a:p>
@@ -1272,7 +1273,7 @@
           <a:p>
             <a:fld id="{0D931F99-1544-4821-BA39-7D82BFF6D049}" type="datetimeFigureOut">
               <a:rPr lang="zh-CN" altLang="en-US" smtClean="0"/>
-              <a:t>2019/5/17</a:t>
+              <a:t>2019/5/20</a:t>
             </a:fld>
             <a:endParaRPr lang="zh-CN" altLang="en-US"/>
           </a:p>
@@ -1516,7 +1517,7 @@
           <a:p>
             <a:fld id="{0D931F99-1544-4821-BA39-7D82BFF6D049}" type="datetimeFigureOut">
               <a:rPr lang="zh-CN" altLang="en-US" smtClean="0"/>
-              <a:t>2019/5/17</a:t>
+              <a:t>2019/5/20</a:t>
             </a:fld>
             <a:endParaRPr lang="zh-CN" altLang="en-US"/>
           </a:p>
@@ -1748,7 +1749,7 @@
           <a:p>
             <a:fld id="{0D931F99-1544-4821-BA39-7D82BFF6D049}" type="datetimeFigureOut">
               <a:rPr lang="zh-CN" altLang="en-US" smtClean="0"/>
-              <a:t>2019/5/17</a:t>
+              <a:t>2019/5/20</a:t>
             </a:fld>
             <a:endParaRPr lang="zh-CN" altLang="en-US"/>
           </a:p>
@@ -2115,7 +2116,7 @@
           <a:p>
             <a:fld id="{0D931F99-1544-4821-BA39-7D82BFF6D049}" type="datetimeFigureOut">
               <a:rPr lang="zh-CN" altLang="en-US" smtClean="0"/>
-              <a:t>2019/5/17</a:t>
+              <a:t>2019/5/20</a:t>
             </a:fld>
             <a:endParaRPr lang="zh-CN" altLang="en-US"/>
           </a:p>
@@ -2233,7 +2234,7 @@
           <a:p>
             <a:fld id="{0D931F99-1544-4821-BA39-7D82BFF6D049}" type="datetimeFigureOut">
               <a:rPr lang="zh-CN" altLang="en-US" smtClean="0"/>
-              <a:t>2019/5/17</a:t>
+              <a:t>2019/5/20</a:t>
             </a:fld>
             <a:endParaRPr lang="zh-CN" altLang="en-US"/>
           </a:p>
@@ -2328,7 +2329,7 @@
           <a:p>
             <a:fld id="{0D931F99-1544-4821-BA39-7D82BFF6D049}" type="datetimeFigureOut">
               <a:rPr lang="zh-CN" altLang="en-US" smtClean="0"/>
-              <a:t>2019/5/17</a:t>
+              <a:t>2019/5/20</a:t>
             </a:fld>
             <a:endParaRPr lang="zh-CN" altLang="en-US"/>
           </a:p>
@@ -2605,7 +2606,7 @@
           <a:p>
             <a:fld id="{0D931F99-1544-4821-BA39-7D82BFF6D049}" type="datetimeFigureOut">
               <a:rPr lang="zh-CN" altLang="en-US" smtClean="0"/>
-              <a:t>2019/5/17</a:t>
+              <a:t>2019/5/20</a:t>
             </a:fld>
             <a:endParaRPr lang="zh-CN" altLang="en-US"/>
           </a:p>
@@ -2862,7 +2863,7 @@
           <a:p>
             <a:fld id="{0D931F99-1544-4821-BA39-7D82BFF6D049}" type="datetimeFigureOut">
               <a:rPr lang="zh-CN" altLang="en-US" smtClean="0"/>
-              <a:t>2019/5/17</a:t>
+              <a:t>2019/5/20</a:t>
             </a:fld>
             <a:endParaRPr lang="zh-CN" altLang="en-US"/>
           </a:p>
@@ -3075,7 +3076,7 @@
           <a:p>
             <a:fld id="{0D931F99-1544-4821-BA39-7D82BFF6D049}" type="datetimeFigureOut">
               <a:rPr lang="zh-CN" altLang="en-US" smtClean="0"/>
-              <a:t>2019/5/17</a:t>
+              <a:t>2019/5/20</a:t>
             </a:fld>
             <a:endParaRPr lang="zh-CN" altLang="en-US"/>
           </a:p>
@@ -3739,7 +3740,7 @@
         </p:blipFill>
         <p:spPr>
           <a:xfrm>
-            <a:off x="-747362" y="396809"/>
+            <a:off x="-860252" y="595515"/>
             <a:ext cx="6425671" cy="3454116"/>
           </a:xfrm>
           <a:prstGeom prst="rect">
@@ -3799,7 +3800,7 @@
         </p:blipFill>
         <p:spPr>
           <a:xfrm>
-            <a:off x="-2042623" y="2882544"/>
+            <a:off x="3161555" y="2950277"/>
             <a:ext cx="5838825" cy="4229100"/>
           </a:xfrm>
           <a:prstGeom prst="rect">
@@ -3817,8 +3818,8 @@
         </p:nvSpPr>
         <p:spPr bwMode="auto">
           <a:xfrm>
-            <a:off x="2810933" y="-1598433"/>
-            <a:ext cx="6130292" cy="8710077"/>
+            <a:off x="2352584" y="-153455"/>
+            <a:ext cx="6130292" cy="8094524"/>
           </a:xfrm>
           <a:prstGeom prst="rect">
             <a:avLst/>
@@ -4393,7 +4394,15 @@
                 <a:ea typeface="微软雅黑" panose="020B0503020204020204" pitchFamily="34" charset="-122"/>
                 <a:cs typeface="Times New Roman" panose="02020603050405020304" pitchFamily="18" charset="0"/>
               </a:rPr>
-              <a:t>g +</a:t>
+              <a:t>l </a:t>
+            </a:r>
+            <a:r>
+              <a:rPr lang="en-US" altLang="zh-CN" sz="2000" dirty="0">
+                <a:latin typeface="微软雅黑" panose="020B0503020204020204" pitchFamily="34" charset="-122"/>
+                <a:ea typeface="微软雅黑" panose="020B0503020204020204" pitchFamily="34" charset="-122"/>
+                <a:cs typeface="Times New Roman" panose="02020603050405020304" pitchFamily="18" charset="0"/>
+              </a:rPr>
+              <a:t>+g +</a:t>
             </a:r>
             <a:r>
               <a:rPr lang="zh-CN" altLang="en-US" sz="2000" dirty="0">
@@ -4401,63 +4410,47 @@
                 <a:ea typeface="微软雅黑" panose="020B0503020204020204" pitchFamily="34" charset="-122"/>
                 <a:cs typeface="Times New Roman" panose="02020603050405020304" pitchFamily="18" charset="0"/>
               </a:rPr>
-              <a:t>化学位梯度（</a:t>
-            </a:r>
+              <a:t>化学位梯度（扩散）</a:t>
+            </a:r>
+            <a:r>
+              <a:rPr lang="en-US" altLang="zh-CN" sz="2000" dirty="0">
+                <a:latin typeface="微软雅黑" panose="020B0503020204020204" pitchFamily="34" charset="-122"/>
+                <a:ea typeface="微软雅黑" panose="020B0503020204020204" pitchFamily="34" charset="-122"/>
+                <a:cs typeface="Times New Roman" panose="02020603050405020304" pitchFamily="18" charset="0"/>
+              </a:rPr>
+              <a:t>+ GDL</a:t>
+            </a:r>
+            <a:r>
+              <a:rPr lang="zh-CN" altLang="en-US" sz="2000" dirty="0">
+                <a:latin typeface="微软雅黑" panose="020B0503020204020204" pitchFamily="34" charset="-122"/>
+                <a:ea typeface="微软雅黑" panose="020B0503020204020204" pitchFamily="34" charset="-122"/>
+                <a:cs typeface="Times New Roman" panose="02020603050405020304" pitchFamily="18" charset="0"/>
+              </a:rPr>
+              <a:t>到</a:t>
+            </a:r>
+            <a:r>
+              <a:rPr lang="en-US" altLang="zh-CN" sz="2000" dirty="0">
+                <a:latin typeface="微软雅黑" panose="020B0503020204020204" pitchFamily="34" charset="-122"/>
+                <a:ea typeface="微软雅黑" panose="020B0503020204020204" pitchFamily="34" charset="-122"/>
+                <a:cs typeface="Times New Roman" panose="02020603050405020304" pitchFamily="18" charset="0"/>
+              </a:rPr>
+              <a:t>CL</a:t>
+            </a:r>
+          </a:p>
+          <a:p>
+            <a:pPr marL="342900" indent="-342900">
+              <a:spcBef>
+                <a:spcPct val="0"/>
+              </a:spcBef>
+              <a:buSzPct val="110000"/>
+            </a:pPr>
             <a:r>
               <a:rPr lang="zh-CN" altLang="en-US" sz="2000" dirty="0" smtClean="0">
                 <a:latin typeface="微软雅黑" panose="020B0503020204020204" pitchFamily="34" charset="-122"/>
                 <a:ea typeface="微软雅黑" panose="020B0503020204020204" pitchFamily="34" charset="-122"/>
                 <a:cs typeface="Times New Roman" panose="02020603050405020304" pitchFamily="18" charset="0"/>
               </a:rPr>
-              <a:t>扩散）</a:t>
-            </a:r>
-            <a:r>
-              <a:rPr lang="en-US" altLang="zh-CN" sz="2000" dirty="0" smtClean="0">
-                <a:latin typeface="微软雅黑" panose="020B0503020204020204" pitchFamily="34" charset="-122"/>
-                <a:ea typeface="微软雅黑" panose="020B0503020204020204" pitchFamily="34" charset="-122"/>
-                <a:cs typeface="Times New Roman" panose="02020603050405020304" pitchFamily="18" charset="0"/>
-              </a:rPr>
-              <a:t>+ GDL</a:t>
-            </a:r>
-            <a:r>
-              <a:rPr lang="zh-CN" altLang="en-US" sz="2000" dirty="0" smtClean="0">
-                <a:latin typeface="微软雅黑" panose="020B0503020204020204" pitchFamily="34" charset="-122"/>
-                <a:ea typeface="微软雅黑" panose="020B0503020204020204" pitchFamily="34" charset="-122"/>
-                <a:cs typeface="Times New Roman" panose="02020603050405020304" pitchFamily="18" charset="0"/>
-              </a:rPr>
-              <a:t>到</a:t>
-            </a:r>
-            <a:r>
-              <a:rPr lang="en-US" altLang="zh-CN" sz="2000" dirty="0" smtClean="0">
-                <a:latin typeface="微软雅黑" panose="020B0503020204020204" pitchFamily="34" charset="-122"/>
-                <a:ea typeface="微软雅黑" panose="020B0503020204020204" pitchFamily="34" charset="-122"/>
-                <a:cs typeface="Times New Roman" panose="02020603050405020304" pitchFamily="18" charset="0"/>
-              </a:rPr>
-              <a:t>CL</a:t>
-            </a:r>
-          </a:p>
-          <a:p>
-            <a:pPr marL="342900" indent="-342900">
-              <a:spcBef>
-                <a:spcPct val="0"/>
-              </a:spcBef>
-              <a:buSzPct val="110000"/>
-            </a:pPr>
-            <a:r>
-              <a:rPr lang="en-US" altLang="zh-CN" sz="2000" dirty="0">
-                <a:latin typeface="微软雅黑" panose="020B0503020204020204" pitchFamily="34" charset="-122"/>
-                <a:ea typeface="微软雅黑" panose="020B0503020204020204" pitchFamily="34" charset="-122"/>
-                <a:cs typeface="Times New Roman" panose="02020603050405020304" pitchFamily="18" charset="0"/>
-              </a:rPr>
-              <a:t>l</a:t>
-            </a:r>
-            <a:r>
-              <a:rPr lang="en-US" altLang="zh-CN" sz="2000" dirty="0" smtClean="0">
-                <a:latin typeface="微软雅黑" panose="020B0503020204020204" pitchFamily="34" charset="-122"/>
-                <a:ea typeface="微软雅黑" panose="020B0503020204020204" pitchFamily="34" charset="-122"/>
-                <a:cs typeface="Times New Roman" panose="02020603050405020304" pitchFamily="18" charset="0"/>
-              </a:rPr>
-              <a:t> +</a:t>
+              <a:t>化学位</a:t>
             </a:r>
             <a:r>
               <a:rPr lang="zh-CN" altLang="en-US" sz="2000" dirty="0">
@@ -4465,7 +4458,7 @@
                 <a:ea typeface="微软雅黑" panose="020B0503020204020204" pitchFamily="34" charset="-122"/>
                 <a:cs typeface="Times New Roman" panose="02020603050405020304" pitchFamily="18" charset="0"/>
               </a:rPr>
-              <a:t>化学位梯度</a:t>
+              <a:t>梯度</a:t>
             </a:r>
             <a:r>
               <a:rPr lang="zh-CN" altLang="en-US" sz="2000" dirty="0" smtClean="0">
@@ -5080,67 +5073,13 @@
               </a:rPr>
               <a:t>PEM</a:t>
             </a:r>
-            <a:r>
-              <a:rPr lang="zh-CN" altLang="en-US" sz="2000" dirty="0" smtClean="0">
-                <a:latin typeface="微软雅黑" panose="020B0503020204020204" pitchFamily="34" charset="-122"/>
-                <a:ea typeface="微软雅黑" panose="020B0503020204020204" pitchFamily="34" charset="-122"/>
-                <a:cs typeface="Times New Roman" panose="02020603050405020304" pitchFamily="18" charset="0"/>
-              </a:rPr>
-              <a:t>，</a:t>
-            </a:r>
-            <a:r>
-              <a:rPr lang="en-US" altLang="zh-CN" sz="2000" dirty="0" err="1" smtClean="0">
-                <a:latin typeface="微软雅黑" panose="020B0503020204020204" pitchFamily="34" charset="-122"/>
-                <a:ea typeface="微软雅黑" panose="020B0503020204020204" pitchFamily="34" charset="-122"/>
-                <a:cs typeface="Times New Roman" panose="02020603050405020304" pitchFamily="18" charset="0"/>
-              </a:rPr>
-              <a:t>CL</a:t>
-            </a:r>
-            <a:r>
-              <a:rPr lang="en-US" altLang="zh-CN" sz="2000" baseline="-25000" dirty="0" err="1" smtClean="0">
-                <a:latin typeface="微软雅黑" panose="020B0503020204020204" pitchFamily="34" charset="-122"/>
-                <a:ea typeface="微软雅黑" panose="020B0503020204020204" pitchFamily="34" charset="-122"/>
-                <a:cs typeface="Times New Roman" panose="02020603050405020304" pitchFamily="18" charset="0"/>
-              </a:rPr>
-              <a:t>c</a:t>
-            </a:r>
-            <a:r>
-              <a:rPr lang="zh-CN" altLang="en-US" sz="2000" dirty="0" smtClean="0">
-                <a:latin typeface="微软雅黑" panose="020B0503020204020204" pitchFamily="34" charset="-122"/>
-                <a:ea typeface="微软雅黑" panose="020B0503020204020204" pitchFamily="34" charset="-122"/>
-                <a:cs typeface="Times New Roman" panose="02020603050405020304" pitchFamily="18" charset="0"/>
-              </a:rPr>
-              <a:t>到</a:t>
-            </a:r>
-            <a:r>
-              <a:rPr lang="en-US" altLang="zh-CN" sz="2000" dirty="0" err="1" smtClean="0">
-                <a:latin typeface="微软雅黑" panose="020B0503020204020204" pitchFamily="34" charset="-122"/>
-                <a:ea typeface="微软雅黑" panose="020B0503020204020204" pitchFamily="34" charset="-122"/>
-                <a:cs typeface="Times New Roman" panose="02020603050405020304" pitchFamily="18" charset="0"/>
-              </a:rPr>
-              <a:t>GDL</a:t>
-            </a:r>
-            <a:r>
-              <a:rPr lang="en-US" altLang="zh-CN" sz="2000" baseline="-25000" dirty="0" err="1" smtClean="0">
-                <a:latin typeface="微软雅黑" panose="020B0503020204020204" pitchFamily="34" charset="-122"/>
-                <a:ea typeface="微软雅黑" panose="020B0503020204020204" pitchFamily="34" charset="-122"/>
-                <a:cs typeface="Times New Roman" panose="02020603050405020304" pitchFamily="18" charset="0"/>
-              </a:rPr>
-              <a:t>c</a:t>
-            </a:r>
-            <a:endParaRPr lang="en-US" altLang="zh-CN" sz="2000" baseline="-25000" dirty="0" smtClean="0">
-              <a:latin typeface="微软雅黑" panose="020B0503020204020204" pitchFamily="34" charset="-122"/>
-              <a:ea typeface="微软雅黑" panose="020B0503020204020204" pitchFamily="34" charset="-122"/>
-              <a:cs typeface="Times New Roman" panose="02020603050405020304" pitchFamily="18" charset="0"/>
-            </a:endParaRPr>
-          </a:p>
-          <a:p>
-            <a:pPr>
+          </a:p>
+          <a:p>
+            <a:pPr marL="342900" indent="-342900">
               <a:spcBef>
                 <a:spcPct val="0"/>
               </a:spcBef>
               <a:buSzPct val="110000"/>
-              <a:buNone/>
             </a:pPr>
             <a:endParaRPr lang="en-US" altLang="zh-CN" sz="2000" dirty="0" smtClean="0">
               <a:latin typeface="微软雅黑" panose="020B0503020204020204" pitchFamily="34" charset="-122"/>
@@ -5342,7 +5281,1136 @@
 </p:sld>
 </file>
 
+<file path=ppt/slides/slide10.xml><?xml version="1.0" encoding="utf-8"?>
+<p:sld xmlns:a="http://schemas.openxmlformats.org/drawingml/2006/main" xmlns:r="http://schemas.openxmlformats.org/officeDocument/2006/relationships" xmlns:p="http://schemas.openxmlformats.org/presentationml/2006/main">
+  <p:cSld>
+    <p:spTree>
+      <p:nvGrpSpPr>
+        <p:cNvPr id="1" name=""/>
+        <p:cNvGrpSpPr/>
+        <p:nvPr/>
+      </p:nvGrpSpPr>
+      <p:grpSpPr>
+        <a:xfrm>
+          <a:off x="0" y="0"/>
+          <a:ext cx="0" cy="0"/>
+          <a:chOff x="0" y="0"/>
+          <a:chExt cx="0" cy="0"/>
+        </a:xfrm>
+      </p:grpSpPr>
+    </p:spTree>
+    <p:extLst>
+      <p:ext uri="{BB962C8B-B14F-4D97-AF65-F5344CB8AC3E}">
+        <p14:creationId xmlns:p14="http://schemas.microsoft.com/office/powerpoint/2010/main" val="1164111951"/>
+      </p:ext>
+    </p:extLst>
+  </p:cSld>
+  <p:clrMapOvr>
+    <a:masterClrMapping/>
+  </p:clrMapOvr>
+</p:sld>
+</file>
+
 <file path=ppt/slides/slide2.xml><?xml version="1.0" encoding="utf-8"?>
+<p:sld xmlns:a="http://schemas.openxmlformats.org/drawingml/2006/main" xmlns:r="http://schemas.openxmlformats.org/officeDocument/2006/relationships" xmlns:p="http://schemas.openxmlformats.org/presentationml/2006/main">
+  <p:cSld>
+    <p:spTree>
+      <p:nvGrpSpPr>
+        <p:cNvPr id="1" name=""/>
+        <p:cNvGrpSpPr/>
+        <p:nvPr/>
+      </p:nvGrpSpPr>
+      <p:grpSpPr>
+        <a:xfrm>
+          <a:off x="0" y="0"/>
+          <a:ext cx="0" cy="0"/>
+          <a:chOff x="0" y="0"/>
+          <a:chExt cx="0" cy="0"/>
+        </a:xfrm>
+      </p:grpSpPr>
+      <p:sp>
+        <p:nvSpPr>
+          <p:cNvPr id="15" name="内容占位符 2"/>
+          <p:cNvSpPr txBox="1">
+            <a:spLocks/>
+          </p:cNvSpPr>
+          <p:nvPr/>
+        </p:nvSpPr>
+        <p:spPr bwMode="auto">
+          <a:xfrm>
+            <a:off x="73025" y="4618038"/>
+            <a:ext cx="9001125" cy="2184400"/>
+          </a:xfrm>
+          <a:prstGeom prst="rect">
+            <a:avLst/>
+          </a:prstGeom>
+          <a:noFill/>
+          <a:ln w="19050">
+            <a:solidFill>
+              <a:schemeClr val="accent1"/>
+            </a:solidFill>
+            <a:prstDash val="lgDash"/>
+            <a:miter lim="800000"/>
+            <a:headEnd/>
+            <a:tailEnd/>
+          </a:ln>
+          <a:extLst>
+            <a:ext uri="{909E8E84-426E-40DD-AFC4-6F175D3DCCD1}">
+              <a14:hiddenFill xmlns:a14="http://schemas.microsoft.com/office/drawing/2010/main">
+                <a:solidFill>
+                  <a:srgbClr val="FFFFFF"/>
+                </a:solidFill>
+              </a14:hiddenFill>
+            </a:ext>
+          </a:extLst>
+        </p:spPr>
+        <p:txBody>
+          <a:bodyPr/>
+          <a:lstStyle>
+            <a:lvl1pPr>
+              <a:spcBef>
+                <a:spcPct val="20000"/>
+              </a:spcBef>
+              <a:buFont typeface="Arial" panose="020B0604020202020204" pitchFamily="34" charset="0"/>
+              <a:buChar char="•"/>
+              <a:defRPr sz="3200">
+                <a:solidFill>
+                  <a:schemeClr val="tx1"/>
+                </a:solidFill>
+                <a:latin typeface="Calibri" panose="020F0502020204030204" pitchFamily="34" charset="0"/>
+                <a:ea typeface="宋体" panose="02010600030101010101" pitchFamily="2" charset="-122"/>
+                <a:sym typeface="Calibri" panose="020F0502020204030204" pitchFamily="34" charset="0"/>
+              </a:defRPr>
+            </a:lvl1pPr>
+            <a:lvl2pPr marL="742950" indent="-285750">
+              <a:spcBef>
+                <a:spcPct val="20000"/>
+              </a:spcBef>
+              <a:buFont typeface="Arial" panose="020B0604020202020204" pitchFamily="34" charset="0"/>
+              <a:buChar char="–"/>
+              <a:defRPr sz="2800">
+                <a:solidFill>
+                  <a:schemeClr val="tx1"/>
+                </a:solidFill>
+                <a:latin typeface="Calibri" panose="020F0502020204030204" pitchFamily="34" charset="0"/>
+                <a:ea typeface="宋体" panose="02010600030101010101" pitchFamily="2" charset="-122"/>
+                <a:sym typeface="Calibri" panose="020F0502020204030204" pitchFamily="34" charset="0"/>
+              </a:defRPr>
+            </a:lvl2pPr>
+            <a:lvl3pPr marL="1143000" indent="-228600">
+              <a:spcBef>
+                <a:spcPct val="20000"/>
+              </a:spcBef>
+              <a:buFont typeface="Arial" panose="020B0604020202020204" pitchFamily="34" charset="0"/>
+              <a:buChar char="•"/>
+              <a:defRPr sz="2400">
+                <a:solidFill>
+                  <a:schemeClr val="tx1"/>
+                </a:solidFill>
+                <a:latin typeface="Calibri" panose="020F0502020204030204" pitchFamily="34" charset="0"/>
+                <a:ea typeface="宋体" panose="02010600030101010101" pitchFamily="2" charset="-122"/>
+                <a:sym typeface="Calibri" panose="020F0502020204030204" pitchFamily="34" charset="0"/>
+              </a:defRPr>
+            </a:lvl3pPr>
+            <a:lvl4pPr marL="1600200" indent="-228600">
+              <a:spcBef>
+                <a:spcPct val="20000"/>
+              </a:spcBef>
+              <a:buFont typeface="Arial" panose="020B0604020202020204" pitchFamily="34" charset="0"/>
+              <a:buChar char="–"/>
+              <a:defRPr sz="2000">
+                <a:solidFill>
+                  <a:schemeClr val="tx1"/>
+                </a:solidFill>
+                <a:latin typeface="Calibri" panose="020F0502020204030204" pitchFamily="34" charset="0"/>
+                <a:ea typeface="宋体" panose="02010600030101010101" pitchFamily="2" charset="-122"/>
+                <a:sym typeface="Calibri" panose="020F0502020204030204" pitchFamily="34" charset="0"/>
+              </a:defRPr>
+            </a:lvl4pPr>
+            <a:lvl5pPr marL="2057400" indent="-228600">
+              <a:spcBef>
+                <a:spcPct val="20000"/>
+              </a:spcBef>
+              <a:buFont typeface="Arial" panose="020B0604020202020204" pitchFamily="34" charset="0"/>
+              <a:buChar char="»"/>
+              <a:defRPr sz="2000">
+                <a:solidFill>
+                  <a:schemeClr val="tx1"/>
+                </a:solidFill>
+                <a:latin typeface="Calibri" panose="020F0502020204030204" pitchFamily="34" charset="0"/>
+                <a:ea typeface="宋体" panose="02010600030101010101" pitchFamily="2" charset="-122"/>
+                <a:sym typeface="Calibri" panose="020F0502020204030204" pitchFamily="34" charset="0"/>
+              </a:defRPr>
+            </a:lvl5pPr>
+            <a:lvl6pPr marL="2514600" indent="-228600" eaLnBrk="0" fontAlgn="base" hangingPunct="0">
+              <a:spcBef>
+                <a:spcPct val="20000"/>
+              </a:spcBef>
+              <a:spcAft>
+                <a:spcPct val="0"/>
+              </a:spcAft>
+              <a:buFont typeface="Arial" panose="020B0604020202020204" pitchFamily="34" charset="0"/>
+              <a:buChar char="»"/>
+              <a:defRPr sz="2000">
+                <a:solidFill>
+                  <a:schemeClr val="tx1"/>
+                </a:solidFill>
+                <a:latin typeface="Calibri" panose="020F0502020204030204" pitchFamily="34" charset="0"/>
+                <a:ea typeface="宋体" panose="02010600030101010101" pitchFamily="2" charset="-122"/>
+                <a:sym typeface="Calibri" panose="020F0502020204030204" pitchFamily="34" charset="0"/>
+              </a:defRPr>
+            </a:lvl6pPr>
+            <a:lvl7pPr marL="2971800" indent="-228600" eaLnBrk="0" fontAlgn="base" hangingPunct="0">
+              <a:spcBef>
+                <a:spcPct val="20000"/>
+              </a:spcBef>
+              <a:spcAft>
+                <a:spcPct val="0"/>
+              </a:spcAft>
+              <a:buFont typeface="Arial" panose="020B0604020202020204" pitchFamily="34" charset="0"/>
+              <a:buChar char="»"/>
+              <a:defRPr sz="2000">
+                <a:solidFill>
+                  <a:schemeClr val="tx1"/>
+                </a:solidFill>
+                <a:latin typeface="Calibri" panose="020F0502020204030204" pitchFamily="34" charset="0"/>
+                <a:ea typeface="宋体" panose="02010600030101010101" pitchFamily="2" charset="-122"/>
+                <a:sym typeface="Calibri" panose="020F0502020204030204" pitchFamily="34" charset="0"/>
+              </a:defRPr>
+            </a:lvl7pPr>
+            <a:lvl8pPr marL="3429000" indent="-228600" eaLnBrk="0" fontAlgn="base" hangingPunct="0">
+              <a:spcBef>
+                <a:spcPct val="20000"/>
+              </a:spcBef>
+              <a:spcAft>
+                <a:spcPct val="0"/>
+              </a:spcAft>
+              <a:buFont typeface="Arial" panose="020B0604020202020204" pitchFamily="34" charset="0"/>
+              <a:buChar char="»"/>
+              <a:defRPr sz="2000">
+                <a:solidFill>
+                  <a:schemeClr val="tx1"/>
+                </a:solidFill>
+                <a:latin typeface="Calibri" panose="020F0502020204030204" pitchFamily="34" charset="0"/>
+                <a:ea typeface="宋体" panose="02010600030101010101" pitchFamily="2" charset="-122"/>
+                <a:sym typeface="Calibri" panose="020F0502020204030204" pitchFamily="34" charset="0"/>
+              </a:defRPr>
+            </a:lvl8pPr>
+            <a:lvl9pPr marL="3886200" indent="-228600" eaLnBrk="0" fontAlgn="base" hangingPunct="0">
+              <a:spcBef>
+                <a:spcPct val="20000"/>
+              </a:spcBef>
+              <a:spcAft>
+                <a:spcPct val="0"/>
+              </a:spcAft>
+              <a:buFont typeface="Arial" panose="020B0604020202020204" pitchFamily="34" charset="0"/>
+              <a:buChar char="»"/>
+              <a:defRPr sz="2000">
+                <a:solidFill>
+                  <a:schemeClr val="tx1"/>
+                </a:solidFill>
+                <a:latin typeface="Calibri" panose="020F0502020204030204" pitchFamily="34" charset="0"/>
+                <a:ea typeface="宋体" panose="02010600030101010101" pitchFamily="2" charset="-122"/>
+                <a:sym typeface="Calibri" panose="020F0502020204030204" pitchFamily="34" charset="0"/>
+              </a:defRPr>
+            </a:lvl9pPr>
+          </a:lstStyle>
+          <a:p>
+            <a:pPr eaLnBrk="1" hangingPunct="1">
+              <a:spcBef>
+                <a:spcPct val="0"/>
+              </a:spcBef>
+              <a:buFontTx/>
+              <a:buNone/>
+            </a:pPr>
+            <a:endParaRPr lang="en-US" altLang="zh-CN" sz="2400" b="1">
+              <a:latin typeface="微软雅黑" panose="020B0503020204020204" pitchFamily="34" charset="-122"/>
+              <a:ea typeface="微软雅黑" panose="020B0503020204020204" pitchFamily="34" charset="-122"/>
+              <a:cs typeface="Times New Roman" panose="02020603050405020304" pitchFamily="18" charset="0"/>
+            </a:endParaRPr>
+          </a:p>
+        </p:txBody>
+      </p:sp>
+      <p:sp>
+        <p:nvSpPr>
+          <p:cNvPr id="18" name="矩形 15"/>
+          <p:cNvSpPr>
+            <a:spLocks noChangeArrowheads="1"/>
+          </p:cNvSpPr>
+          <p:nvPr/>
+        </p:nvSpPr>
+        <p:spPr bwMode="auto">
+          <a:xfrm>
+            <a:off x="6973570" y="-52388"/>
+            <a:ext cx="2159566" cy="738664"/>
+          </a:xfrm>
+          <a:prstGeom prst="rect">
+            <a:avLst/>
+          </a:prstGeom>
+          <a:noFill/>
+          <a:ln>
+            <a:noFill/>
+          </a:ln>
+          <a:extLst>
+            <a:ext uri="{909E8E84-426E-40DD-AFC4-6F175D3DCCD1}">
+              <a14:hiddenFill xmlns:a14="http://schemas.microsoft.com/office/drawing/2010/main">
+                <a:solidFill>
+                  <a:srgbClr val="FFFFFF"/>
+                </a:solidFill>
+              </a14:hiddenFill>
+            </a:ext>
+            <a:ext uri="{91240B29-F687-4F45-9708-019B960494DF}">
+              <a14:hiddenLine xmlns:a14="http://schemas.microsoft.com/office/drawing/2010/main" w="9525">
+                <a:solidFill>
+                  <a:srgbClr val="000000"/>
+                </a:solidFill>
+                <a:miter lim="800000"/>
+                <a:headEnd/>
+                <a:tailEnd/>
+              </a14:hiddenLine>
+            </a:ext>
+          </a:extLst>
+        </p:spPr>
+        <p:txBody>
+          <a:bodyPr wrap="none">
+            <a:spAutoFit/>
+          </a:bodyPr>
+          <a:lstStyle>
+            <a:lvl1pPr>
+              <a:spcBef>
+                <a:spcPct val="20000"/>
+              </a:spcBef>
+              <a:buFont typeface="Arial" panose="020B0604020202020204" pitchFamily="34" charset="0"/>
+              <a:buChar char="•"/>
+              <a:defRPr sz="3200">
+                <a:solidFill>
+                  <a:schemeClr val="tx1"/>
+                </a:solidFill>
+                <a:latin typeface="Calibri" panose="020F0502020204030204" pitchFamily="34" charset="0"/>
+                <a:ea typeface="宋体" panose="02010600030101010101" pitchFamily="2" charset="-122"/>
+                <a:sym typeface="Calibri" panose="020F0502020204030204" pitchFamily="34" charset="0"/>
+              </a:defRPr>
+            </a:lvl1pPr>
+            <a:lvl2pPr marL="742950" indent="-285750">
+              <a:spcBef>
+                <a:spcPct val="20000"/>
+              </a:spcBef>
+              <a:buFont typeface="Arial" panose="020B0604020202020204" pitchFamily="34" charset="0"/>
+              <a:buChar char="–"/>
+              <a:defRPr sz="2800">
+                <a:solidFill>
+                  <a:schemeClr val="tx1"/>
+                </a:solidFill>
+                <a:latin typeface="Calibri" panose="020F0502020204030204" pitchFamily="34" charset="0"/>
+                <a:ea typeface="宋体" panose="02010600030101010101" pitchFamily="2" charset="-122"/>
+                <a:sym typeface="Calibri" panose="020F0502020204030204" pitchFamily="34" charset="0"/>
+              </a:defRPr>
+            </a:lvl2pPr>
+            <a:lvl3pPr marL="1143000" indent="-228600">
+              <a:spcBef>
+                <a:spcPct val="20000"/>
+              </a:spcBef>
+              <a:buFont typeface="Arial" panose="020B0604020202020204" pitchFamily="34" charset="0"/>
+              <a:buChar char="•"/>
+              <a:defRPr sz="2400">
+                <a:solidFill>
+                  <a:schemeClr val="tx1"/>
+                </a:solidFill>
+                <a:latin typeface="Calibri" panose="020F0502020204030204" pitchFamily="34" charset="0"/>
+                <a:ea typeface="宋体" panose="02010600030101010101" pitchFamily="2" charset="-122"/>
+                <a:sym typeface="Calibri" panose="020F0502020204030204" pitchFamily="34" charset="0"/>
+              </a:defRPr>
+            </a:lvl3pPr>
+            <a:lvl4pPr marL="1600200" indent="-228600">
+              <a:spcBef>
+                <a:spcPct val="20000"/>
+              </a:spcBef>
+              <a:buFont typeface="Arial" panose="020B0604020202020204" pitchFamily="34" charset="0"/>
+              <a:buChar char="–"/>
+              <a:defRPr sz="2000">
+                <a:solidFill>
+                  <a:schemeClr val="tx1"/>
+                </a:solidFill>
+                <a:latin typeface="Calibri" panose="020F0502020204030204" pitchFamily="34" charset="0"/>
+                <a:ea typeface="宋体" panose="02010600030101010101" pitchFamily="2" charset="-122"/>
+                <a:sym typeface="Calibri" panose="020F0502020204030204" pitchFamily="34" charset="0"/>
+              </a:defRPr>
+            </a:lvl4pPr>
+            <a:lvl5pPr marL="2057400" indent="-228600">
+              <a:spcBef>
+                <a:spcPct val="20000"/>
+              </a:spcBef>
+              <a:buFont typeface="Arial" panose="020B0604020202020204" pitchFamily="34" charset="0"/>
+              <a:buChar char="»"/>
+              <a:defRPr sz="2000">
+                <a:solidFill>
+                  <a:schemeClr val="tx1"/>
+                </a:solidFill>
+                <a:latin typeface="Calibri" panose="020F0502020204030204" pitchFamily="34" charset="0"/>
+                <a:ea typeface="宋体" panose="02010600030101010101" pitchFamily="2" charset="-122"/>
+                <a:sym typeface="Calibri" panose="020F0502020204030204" pitchFamily="34" charset="0"/>
+              </a:defRPr>
+            </a:lvl5pPr>
+            <a:lvl6pPr marL="2514600" indent="-228600" eaLnBrk="0" fontAlgn="base" hangingPunct="0">
+              <a:spcBef>
+                <a:spcPct val="20000"/>
+              </a:spcBef>
+              <a:spcAft>
+                <a:spcPct val="0"/>
+              </a:spcAft>
+              <a:buFont typeface="Arial" panose="020B0604020202020204" pitchFamily="34" charset="0"/>
+              <a:buChar char="»"/>
+              <a:defRPr sz="2000">
+                <a:solidFill>
+                  <a:schemeClr val="tx1"/>
+                </a:solidFill>
+                <a:latin typeface="Calibri" panose="020F0502020204030204" pitchFamily="34" charset="0"/>
+                <a:ea typeface="宋体" panose="02010600030101010101" pitchFamily="2" charset="-122"/>
+                <a:sym typeface="Calibri" panose="020F0502020204030204" pitchFamily="34" charset="0"/>
+              </a:defRPr>
+            </a:lvl6pPr>
+            <a:lvl7pPr marL="2971800" indent="-228600" eaLnBrk="0" fontAlgn="base" hangingPunct="0">
+              <a:spcBef>
+                <a:spcPct val="20000"/>
+              </a:spcBef>
+              <a:spcAft>
+                <a:spcPct val="0"/>
+              </a:spcAft>
+              <a:buFont typeface="Arial" panose="020B0604020202020204" pitchFamily="34" charset="0"/>
+              <a:buChar char="»"/>
+              <a:defRPr sz="2000">
+                <a:solidFill>
+                  <a:schemeClr val="tx1"/>
+                </a:solidFill>
+                <a:latin typeface="Calibri" panose="020F0502020204030204" pitchFamily="34" charset="0"/>
+                <a:ea typeface="宋体" panose="02010600030101010101" pitchFamily="2" charset="-122"/>
+                <a:sym typeface="Calibri" panose="020F0502020204030204" pitchFamily="34" charset="0"/>
+              </a:defRPr>
+            </a:lvl7pPr>
+            <a:lvl8pPr marL="3429000" indent="-228600" eaLnBrk="0" fontAlgn="base" hangingPunct="0">
+              <a:spcBef>
+                <a:spcPct val="20000"/>
+              </a:spcBef>
+              <a:spcAft>
+                <a:spcPct val="0"/>
+              </a:spcAft>
+              <a:buFont typeface="Arial" panose="020B0604020202020204" pitchFamily="34" charset="0"/>
+              <a:buChar char="»"/>
+              <a:defRPr sz="2000">
+                <a:solidFill>
+                  <a:schemeClr val="tx1"/>
+                </a:solidFill>
+                <a:latin typeface="Calibri" panose="020F0502020204030204" pitchFamily="34" charset="0"/>
+                <a:ea typeface="宋体" panose="02010600030101010101" pitchFamily="2" charset="-122"/>
+                <a:sym typeface="Calibri" panose="020F0502020204030204" pitchFamily="34" charset="0"/>
+              </a:defRPr>
+            </a:lvl8pPr>
+            <a:lvl9pPr marL="3886200" indent="-228600" eaLnBrk="0" fontAlgn="base" hangingPunct="0">
+              <a:spcBef>
+                <a:spcPct val="20000"/>
+              </a:spcBef>
+              <a:spcAft>
+                <a:spcPct val="0"/>
+              </a:spcAft>
+              <a:buFont typeface="Arial" panose="020B0604020202020204" pitchFamily="34" charset="0"/>
+              <a:buChar char="»"/>
+              <a:defRPr sz="2000">
+                <a:solidFill>
+                  <a:schemeClr val="tx1"/>
+                </a:solidFill>
+                <a:latin typeface="Calibri" panose="020F0502020204030204" pitchFamily="34" charset="0"/>
+                <a:ea typeface="宋体" panose="02010600030101010101" pitchFamily="2" charset="-122"/>
+                <a:sym typeface="Calibri" panose="020F0502020204030204" pitchFamily="34" charset="0"/>
+              </a:defRPr>
+            </a:lvl9pPr>
+          </a:lstStyle>
+          <a:p>
+            <a:pPr>
+              <a:lnSpc>
+                <a:spcPct val="150000"/>
+              </a:lnSpc>
+              <a:spcBef>
+                <a:spcPct val="0"/>
+              </a:spcBef>
+              <a:buFontTx/>
+              <a:buNone/>
+            </a:pPr>
+            <a:r>
+              <a:rPr lang="en-US" altLang="zh-CN" sz="2800" b="1" dirty="0" smtClean="0">
+                <a:solidFill>
+                  <a:srgbClr val="3333FF"/>
+                </a:solidFill>
+                <a:latin typeface="Times New Roman" panose="02020603050405020304" pitchFamily="18" charset="0"/>
+                <a:ea typeface="微软雅黑" panose="020B0503020204020204" pitchFamily="34" charset="-122"/>
+                <a:cs typeface="Times New Roman" panose="02020603050405020304" pitchFamily="18" charset="0"/>
+              </a:rPr>
+              <a:t>1</a:t>
+            </a:r>
+            <a:r>
+              <a:rPr lang="zh-CN" altLang="en-US" sz="2800" b="1" dirty="0" smtClean="0">
+                <a:solidFill>
+                  <a:srgbClr val="3333FF"/>
+                </a:solidFill>
+                <a:latin typeface="Times New Roman" panose="02020603050405020304" pitchFamily="18" charset="0"/>
+                <a:ea typeface="微软雅黑" panose="020B0503020204020204" pitchFamily="34" charset="-122"/>
+                <a:cs typeface="Times New Roman" panose="02020603050405020304" pitchFamily="18" charset="0"/>
+              </a:rPr>
+              <a:t>、问题描述</a:t>
+            </a:r>
+            <a:endParaRPr lang="zh-CN" altLang="en-US" sz="2800" b="1" dirty="0">
+              <a:solidFill>
+                <a:srgbClr val="3333FF"/>
+              </a:solidFill>
+              <a:latin typeface="微软雅黑" panose="020B0503020204020204" pitchFamily="34" charset="-122"/>
+              <a:ea typeface="微软雅黑" panose="020B0503020204020204" pitchFamily="34" charset="-122"/>
+              <a:cs typeface="Times New Roman" panose="02020603050405020304" pitchFamily="18" charset="0"/>
+            </a:endParaRPr>
+          </a:p>
+        </p:txBody>
+      </p:sp>
+      <p:sp>
+        <p:nvSpPr>
+          <p:cNvPr id="20" name="Text Box 7"/>
+          <p:cNvSpPr txBox="1">
+            <a:spLocks noChangeArrowheads="1"/>
+          </p:cNvSpPr>
+          <p:nvPr/>
+        </p:nvSpPr>
+        <p:spPr bwMode="auto">
+          <a:xfrm>
+            <a:off x="473075" y="4152900"/>
+            <a:ext cx="8288338" cy="341055"/>
+          </a:xfrm>
+          <a:prstGeom prst="rect">
+            <a:avLst/>
+          </a:prstGeom>
+          <a:noFill/>
+          <a:ln>
+            <a:noFill/>
+          </a:ln>
+          <a:extLst>
+            <a:ext uri="{909E8E84-426E-40DD-AFC4-6F175D3DCCD1}">
+              <a14:hiddenFill xmlns:a14="http://schemas.microsoft.com/office/drawing/2010/main">
+                <a:solidFill>
+                  <a:srgbClr val="FFFFFF"/>
+                </a:solidFill>
+              </a14:hiddenFill>
+            </a:ext>
+            <a:ext uri="{91240B29-F687-4F45-9708-019B960494DF}">
+              <a14:hiddenLine xmlns:a14="http://schemas.microsoft.com/office/drawing/2010/main" w="19050">
+                <a:solidFill>
+                  <a:srgbClr val="000000"/>
+                </a:solidFill>
+                <a:miter lim="800000"/>
+                <a:headEnd/>
+                <a:tailEnd/>
+              </a14:hiddenLine>
+            </a:ext>
+          </a:extLst>
+        </p:spPr>
+        <p:txBody>
+          <a:bodyPr>
+            <a:spAutoFit/>
+          </a:bodyPr>
+          <a:lstStyle>
+            <a:lvl1pPr>
+              <a:spcBef>
+                <a:spcPct val="20000"/>
+              </a:spcBef>
+              <a:buFont typeface="Arial" panose="020B0604020202020204" pitchFamily="34" charset="0"/>
+              <a:buChar char="•"/>
+              <a:defRPr sz="3200">
+                <a:solidFill>
+                  <a:schemeClr val="tx1"/>
+                </a:solidFill>
+                <a:latin typeface="Calibri" panose="020F0502020204030204" pitchFamily="34" charset="0"/>
+                <a:ea typeface="宋体" panose="02010600030101010101" pitchFamily="2" charset="-122"/>
+                <a:sym typeface="Calibri" panose="020F0502020204030204" pitchFamily="34" charset="0"/>
+              </a:defRPr>
+            </a:lvl1pPr>
+            <a:lvl2pPr marL="742950" indent="-285750">
+              <a:spcBef>
+                <a:spcPct val="20000"/>
+              </a:spcBef>
+              <a:buFont typeface="Arial" panose="020B0604020202020204" pitchFamily="34" charset="0"/>
+              <a:buChar char="–"/>
+              <a:defRPr sz="2800">
+                <a:solidFill>
+                  <a:schemeClr val="tx1"/>
+                </a:solidFill>
+                <a:latin typeface="Calibri" panose="020F0502020204030204" pitchFamily="34" charset="0"/>
+                <a:ea typeface="宋体" panose="02010600030101010101" pitchFamily="2" charset="-122"/>
+                <a:sym typeface="Calibri" panose="020F0502020204030204" pitchFamily="34" charset="0"/>
+              </a:defRPr>
+            </a:lvl2pPr>
+            <a:lvl3pPr marL="1143000" indent="-228600">
+              <a:spcBef>
+                <a:spcPct val="20000"/>
+              </a:spcBef>
+              <a:buFont typeface="Arial" panose="020B0604020202020204" pitchFamily="34" charset="0"/>
+              <a:buChar char="•"/>
+              <a:defRPr sz="2400">
+                <a:solidFill>
+                  <a:schemeClr val="tx1"/>
+                </a:solidFill>
+                <a:latin typeface="Calibri" panose="020F0502020204030204" pitchFamily="34" charset="0"/>
+                <a:ea typeface="宋体" panose="02010600030101010101" pitchFamily="2" charset="-122"/>
+                <a:sym typeface="Calibri" panose="020F0502020204030204" pitchFamily="34" charset="0"/>
+              </a:defRPr>
+            </a:lvl3pPr>
+            <a:lvl4pPr marL="1600200" indent="-228600">
+              <a:spcBef>
+                <a:spcPct val="20000"/>
+              </a:spcBef>
+              <a:buFont typeface="Arial" panose="020B0604020202020204" pitchFamily="34" charset="0"/>
+              <a:buChar char="–"/>
+              <a:defRPr sz="2000">
+                <a:solidFill>
+                  <a:schemeClr val="tx1"/>
+                </a:solidFill>
+                <a:latin typeface="Calibri" panose="020F0502020204030204" pitchFamily="34" charset="0"/>
+                <a:ea typeface="宋体" panose="02010600030101010101" pitchFamily="2" charset="-122"/>
+                <a:sym typeface="Calibri" panose="020F0502020204030204" pitchFamily="34" charset="0"/>
+              </a:defRPr>
+            </a:lvl4pPr>
+            <a:lvl5pPr marL="2057400" indent="-228600">
+              <a:spcBef>
+                <a:spcPct val="20000"/>
+              </a:spcBef>
+              <a:buFont typeface="Arial" panose="020B0604020202020204" pitchFamily="34" charset="0"/>
+              <a:buChar char="»"/>
+              <a:defRPr sz="2000">
+                <a:solidFill>
+                  <a:schemeClr val="tx1"/>
+                </a:solidFill>
+                <a:latin typeface="Calibri" panose="020F0502020204030204" pitchFamily="34" charset="0"/>
+                <a:ea typeface="宋体" panose="02010600030101010101" pitchFamily="2" charset="-122"/>
+                <a:sym typeface="Calibri" panose="020F0502020204030204" pitchFamily="34" charset="0"/>
+              </a:defRPr>
+            </a:lvl5pPr>
+            <a:lvl6pPr marL="2514600" indent="-228600" eaLnBrk="0" fontAlgn="base" hangingPunct="0">
+              <a:spcBef>
+                <a:spcPct val="20000"/>
+              </a:spcBef>
+              <a:spcAft>
+                <a:spcPct val="0"/>
+              </a:spcAft>
+              <a:buFont typeface="Arial" panose="020B0604020202020204" pitchFamily="34" charset="0"/>
+              <a:buChar char="»"/>
+              <a:defRPr sz="2000">
+                <a:solidFill>
+                  <a:schemeClr val="tx1"/>
+                </a:solidFill>
+                <a:latin typeface="Calibri" panose="020F0502020204030204" pitchFamily="34" charset="0"/>
+                <a:ea typeface="宋体" panose="02010600030101010101" pitchFamily="2" charset="-122"/>
+                <a:sym typeface="Calibri" panose="020F0502020204030204" pitchFamily="34" charset="0"/>
+              </a:defRPr>
+            </a:lvl6pPr>
+            <a:lvl7pPr marL="2971800" indent="-228600" eaLnBrk="0" fontAlgn="base" hangingPunct="0">
+              <a:spcBef>
+                <a:spcPct val="20000"/>
+              </a:spcBef>
+              <a:spcAft>
+                <a:spcPct val="0"/>
+              </a:spcAft>
+              <a:buFont typeface="Arial" panose="020B0604020202020204" pitchFamily="34" charset="0"/>
+              <a:buChar char="»"/>
+              <a:defRPr sz="2000">
+                <a:solidFill>
+                  <a:schemeClr val="tx1"/>
+                </a:solidFill>
+                <a:latin typeface="Calibri" panose="020F0502020204030204" pitchFamily="34" charset="0"/>
+                <a:ea typeface="宋体" panose="02010600030101010101" pitchFamily="2" charset="-122"/>
+                <a:sym typeface="Calibri" panose="020F0502020204030204" pitchFamily="34" charset="0"/>
+              </a:defRPr>
+            </a:lvl7pPr>
+            <a:lvl8pPr marL="3429000" indent="-228600" eaLnBrk="0" fontAlgn="base" hangingPunct="0">
+              <a:spcBef>
+                <a:spcPct val="20000"/>
+              </a:spcBef>
+              <a:spcAft>
+                <a:spcPct val="0"/>
+              </a:spcAft>
+              <a:buFont typeface="Arial" panose="020B0604020202020204" pitchFamily="34" charset="0"/>
+              <a:buChar char="»"/>
+              <a:defRPr sz="2000">
+                <a:solidFill>
+                  <a:schemeClr val="tx1"/>
+                </a:solidFill>
+                <a:latin typeface="Calibri" panose="020F0502020204030204" pitchFamily="34" charset="0"/>
+                <a:ea typeface="宋体" panose="02010600030101010101" pitchFamily="2" charset="-122"/>
+                <a:sym typeface="Calibri" panose="020F0502020204030204" pitchFamily="34" charset="0"/>
+              </a:defRPr>
+            </a:lvl8pPr>
+            <a:lvl9pPr marL="3886200" indent="-228600" eaLnBrk="0" fontAlgn="base" hangingPunct="0">
+              <a:spcBef>
+                <a:spcPct val="20000"/>
+              </a:spcBef>
+              <a:spcAft>
+                <a:spcPct val="0"/>
+              </a:spcAft>
+              <a:buFont typeface="Arial" panose="020B0604020202020204" pitchFamily="34" charset="0"/>
+              <a:buChar char="»"/>
+              <a:defRPr sz="2000">
+                <a:solidFill>
+                  <a:schemeClr val="tx1"/>
+                </a:solidFill>
+                <a:latin typeface="Calibri" panose="020F0502020204030204" pitchFamily="34" charset="0"/>
+                <a:ea typeface="宋体" panose="02010600030101010101" pitchFamily="2" charset="-122"/>
+                <a:sym typeface="Calibri" panose="020F0502020204030204" pitchFamily="34" charset="0"/>
+              </a:defRPr>
+            </a:lvl9pPr>
+          </a:lstStyle>
+          <a:p>
+            <a:pPr algn="ctr" eaLnBrk="1" hangingPunct="1">
+              <a:lnSpc>
+                <a:spcPct val="110000"/>
+              </a:lnSpc>
+              <a:spcBef>
+                <a:spcPct val="50000"/>
+              </a:spcBef>
+              <a:buFontTx/>
+              <a:buNone/>
+            </a:pPr>
+            <a:r>
+              <a:rPr kumimoji="1" lang="en-US" altLang="zh-CN" sz="1600" b="1" dirty="0" smtClean="0">
+                <a:latin typeface="Times New Roman" panose="02020603050405020304" pitchFamily="18" charset="0"/>
+                <a:ea typeface="黑体" panose="02010609060101010101" pitchFamily="49" charset="-122"/>
+                <a:cs typeface="Times New Roman" panose="02020603050405020304" pitchFamily="18" charset="0"/>
+              </a:rPr>
+              <a:t>Caption here</a:t>
+            </a:r>
+            <a:endParaRPr kumimoji="1" lang="en-US" altLang="zh-CN" sz="1600" b="1" dirty="0">
+              <a:latin typeface="Times New Roman" panose="02020603050405020304" pitchFamily="18" charset="0"/>
+              <a:ea typeface="黑体" panose="02010609060101010101" pitchFamily="49" charset="-122"/>
+              <a:cs typeface="Times New Roman" panose="02020603050405020304" pitchFamily="18" charset="0"/>
+            </a:endParaRPr>
+          </a:p>
+        </p:txBody>
+      </p:sp>
+      <p:grpSp>
+        <p:nvGrpSpPr>
+          <p:cNvPr id="22" name="组合 12"/>
+          <p:cNvGrpSpPr>
+            <a:grpSpLocks/>
+          </p:cNvGrpSpPr>
+          <p:nvPr/>
+        </p:nvGrpSpPr>
+        <p:grpSpPr bwMode="auto">
+          <a:xfrm>
+            <a:off x="125413" y="731838"/>
+            <a:ext cx="2868612" cy="465137"/>
+            <a:chOff x="124668" y="732018"/>
+            <a:chExt cx="3120950" cy="465081"/>
+          </a:xfrm>
+        </p:grpSpPr>
+        <p:sp>
+          <p:nvSpPr>
+            <p:cNvPr id="23" name="矩形 22">
+              <a:extLst>
+                <a:ext uri="{FF2B5EF4-FFF2-40B4-BE49-F238E27FC236}">
+                  <a16:creationId xmlns:a16="http://schemas.microsoft.com/office/drawing/2014/main" id="{ACFF976D-C10F-4773-B6C0-A8EF394982B5}"/>
+                </a:ext>
+              </a:extLst>
+            </p:cNvPr>
+            <p:cNvSpPr/>
+            <p:nvPr/>
+          </p:nvSpPr>
+          <p:spPr>
+            <a:xfrm>
+              <a:off x="360713" y="732018"/>
+              <a:ext cx="2884905" cy="455033"/>
+            </a:xfrm>
+            <a:prstGeom prst="rect">
+              <a:avLst/>
+            </a:prstGeom>
+            <a:gradFill flip="none" rotWithShape="0">
+              <a:gsLst>
+                <a:gs pos="0">
+                  <a:srgbClr val="0070C0">
+                    <a:shade val="30000"/>
+                    <a:satMod val="115000"/>
+                  </a:srgbClr>
+                </a:gs>
+                <a:gs pos="50000">
+                  <a:srgbClr val="0070C0">
+                    <a:shade val="67500"/>
+                    <a:satMod val="115000"/>
+                  </a:srgbClr>
+                </a:gs>
+                <a:gs pos="100000">
+                  <a:srgbClr val="0070C0">
+                    <a:shade val="100000"/>
+                    <a:satMod val="115000"/>
+                  </a:srgbClr>
+                </a:gs>
+              </a:gsLst>
+              <a:lin ang="13500000" scaled="1"/>
+              <a:tileRect/>
+            </a:gradFill>
+            <a:scene3d>
+              <a:camera prst="orthographicFront"/>
+              <a:lightRig rig="flat" dir="t"/>
+            </a:scene3d>
+            <a:sp3d prstMaterial="dkEdge">
+              <a:bevelT w="8200" h="38100"/>
+            </a:sp3d>
+          </p:spPr>
+          <p:style>
+            <a:lnRef idx="0">
+              <a:schemeClr val="lt1">
+                <a:hueOff val="0"/>
+                <a:satOff val="0"/>
+                <a:lumOff val="0"/>
+                <a:alphaOff val="0"/>
+              </a:schemeClr>
+            </a:lnRef>
+            <a:fillRef idx="2">
+              <a:scrgbClr r="0" g="0" b="0"/>
+            </a:fillRef>
+            <a:effectRef idx="1">
+              <a:schemeClr val="accent6">
+                <a:shade val="80000"/>
+                <a:hueOff val="0"/>
+                <a:satOff val="0"/>
+                <a:lumOff val="0"/>
+                <a:alphaOff val="0"/>
+              </a:schemeClr>
+            </a:effectRef>
+            <a:fontRef idx="minor">
+              <a:schemeClr val="dk1"/>
+            </a:fontRef>
+          </p:style>
+        </p:sp>
+        <p:sp>
+          <p:nvSpPr>
+            <p:cNvPr id="24" name="文本框 23">
+              <a:extLst>
+                <a:ext uri="{FF2B5EF4-FFF2-40B4-BE49-F238E27FC236}">
+                  <a16:creationId xmlns:a16="http://schemas.microsoft.com/office/drawing/2014/main" id="{3583D282-40E0-4567-95F3-C6CD9EBD4A2A}"/>
+                </a:ext>
+              </a:extLst>
+            </p:cNvPr>
+            <p:cNvSpPr txBox="1"/>
+            <p:nvPr/>
+          </p:nvSpPr>
+          <p:spPr>
+            <a:xfrm>
+              <a:off x="124668" y="742066"/>
+              <a:ext cx="3035630" cy="455033"/>
+            </a:xfrm>
+            <a:prstGeom prst="rect">
+              <a:avLst/>
+            </a:prstGeom>
+            <a:scene3d>
+              <a:camera prst="orthographicFront"/>
+              <a:lightRig rig="flat" dir="t"/>
+            </a:scene3d>
+            <a:sp3d/>
+          </p:spPr>
+          <p:style>
+            <a:lnRef idx="0">
+              <a:scrgbClr r="0" g="0" b="0"/>
+            </a:lnRef>
+            <a:fillRef idx="0">
+              <a:scrgbClr r="0" g="0" b="0"/>
+            </a:fillRef>
+            <a:effectRef idx="0">
+              <a:scrgbClr r="0" g="0" b="0"/>
+            </a:effectRef>
+            <a:fontRef idx="minor">
+              <a:schemeClr val="dk1"/>
+            </a:fontRef>
+          </p:style>
+          <p:txBody>
+            <a:bodyPr lIns="361183" tIns="55880" rIns="55880" bIns="55880" spcCol="1270" anchor="ctr"/>
+            <a:lstStyle/>
+            <a:p>
+              <a:pPr defTabSz="977900">
+                <a:lnSpc>
+                  <a:spcPct val="90000"/>
+                </a:lnSpc>
+                <a:spcAft>
+                  <a:spcPts val="0"/>
+                </a:spcAft>
+                <a:tabLst>
+                  <a:tab pos="444500" algn="l"/>
+                </a:tabLst>
+                <a:defRPr/>
+              </a:pPr>
+              <a:r>
+                <a:rPr lang="zh-CN" altLang="en-US" sz="2200" dirty="0">
+                  <a:solidFill>
+                    <a:schemeClr val="bg1"/>
+                  </a:solidFill>
+                  <a:latin typeface="Times New Roman" panose="02020603050405020304" pitchFamily="18" charset="0"/>
+                  <a:ea typeface="微软雅黑" panose="020B0503020204020204" pitchFamily="34" charset="-122"/>
+                  <a:cs typeface="Times New Roman" panose="02020603050405020304" pitchFamily="18" charset="0"/>
+                </a:rPr>
+                <a:t>（</a:t>
+              </a:r>
+              <a:r>
+                <a:rPr lang="en-US" altLang="zh-CN" sz="2200" dirty="0">
+                  <a:solidFill>
+                    <a:schemeClr val="bg1"/>
+                  </a:solidFill>
+                  <a:latin typeface="Times New Roman" panose="02020603050405020304" pitchFamily="18" charset="0"/>
+                  <a:ea typeface="微软雅黑" panose="020B0503020204020204" pitchFamily="34" charset="-122"/>
+                  <a:cs typeface="Times New Roman" panose="02020603050405020304" pitchFamily="18" charset="0"/>
+                </a:rPr>
+                <a:t>1</a:t>
+              </a:r>
+              <a:r>
+                <a:rPr lang="zh-CN" altLang="en-US" sz="2200" dirty="0" smtClean="0">
+                  <a:solidFill>
+                    <a:schemeClr val="bg1"/>
+                  </a:solidFill>
+                  <a:latin typeface="Times New Roman" panose="02020603050405020304" pitchFamily="18" charset="0"/>
+                  <a:ea typeface="微软雅黑" panose="020B0503020204020204" pitchFamily="34" charset="-122"/>
+                  <a:cs typeface="Times New Roman" panose="02020603050405020304" pitchFamily="18" charset="0"/>
+                </a:rPr>
+                <a:t>）</a:t>
+              </a:r>
+              <a:r>
+                <a:rPr lang="zh-CN" altLang="en-US" sz="2200" dirty="0" smtClean="0">
+                  <a:solidFill>
+                    <a:schemeClr val="bg1"/>
+                  </a:solidFill>
+                  <a:latin typeface="微软雅黑" panose="020B0503020204020204" pitchFamily="34" charset="-122"/>
+                  <a:ea typeface="微软雅黑" panose="020B0503020204020204" pitchFamily="34" charset="-122"/>
+                  <a:cs typeface="Times New Roman" panose="02020603050405020304" pitchFamily="18" charset="0"/>
+                </a:rPr>
+                <a:t>机理示意图</a:t>
+              </a:r>
+              <a:endParaRPr lang="zh-CN" altLang="en-US" sz="2200" dirty="0">
+                <a:solidFill>
+                  <a:schemeClr val="bg1"/>
+                </a:solidFill>
+                <a:latin typeface="微软雅黑" panose="020B0503020204020204" pitchFamily="34" charset="-122"/>
+                <a:ea typeface="微软雅黑" panose="020B0503020204020204" pitchFamily="34" charset="-122"/>
+              </a:endParaRPr>
+            </a:p>
+          </p:txBody>
+        </p:sp>
+      </p:grpSp>
+      <p:sp>
+        <p:nvSpPr>
+          <p:cNvPr id="25" name="灯片编号占位符 1"/>
+          <p:cNvSpPr>
+            <a:spLocks noGrp="1"/>
+          </p:cNvSpPr>
+          <p:nvPr>
+            <p:ph type="sldNum" sz="quarter" idx="11"/>
+          </p:nvPr>
+        </p:nvSpPr>
+        <p:spPr>
+          <a:xfrm>
+            <a:off x="8547100" y="6330950"/>
+            <a:ext cx="527050" cy="427038"/>
+          </a:xfrm>
+          <a:noFill/>
+        </p:spPr>
+        <p:txBody>
+          <a:bodyPr>
+            <a:prstTxWarp prst="textNoShape">
+              <a:avLst/>
+            </a:prstTxWarp>
+          </a:bodyPr>
+          <a:lstStyle>
+            <a:lvl1pPr>
+              <a:spcBef>
+                <a:spcPct val="20000"/>
+              </a:spcBef>
+              <a:buFont typeface="Arial" panose="020B0604020202020204" pitchFamily="34" charset="0"/>
+              <a:buChar char="•"/>
+              <a:defRPr sz="3200">
+                <a:solidFill>
+                  <a:schemeClr val="tx1"/>
+                </a:solidFill>
+                <a:latin typeface="Calibri" panose="020F0502020204030204" pitchFamily="34" charset="0"/>
+                <a:ea typeface="宋体" panose="02010600030101010101" pitchFamily="2" charset="-122"/>
+                <a:sym typeface="Calibri" panose="020F0502020204030204" pitchFamily="34" charset="0"/>
+              </a:defRPr>
+            </a:lvl1pPr>
+            <a:lvl2pPr marL="742950" indent="-285750">
+              <a:spcBef>
+                <a:spcPct val="20000"/>
+              </a:spcBef>
+              <a:buFont typeface="Arial" panose="020B0604020202020204" pitchFamily="34" charset="0"/>
+              <a:buChar char="–"/>
+              <a:defRPr sz="2800">
+                <a:solidFill>
+                  <a:schemeClr val="tx1"/>
+                </a:solidFill>
+                <a:latin typeface="Calibri" panose="020F0502020204030204" pitchFamily="34" charset="0"/>
+                <a:ea typeface="宋体" panose="02010600030101010101" pitchFamily="2" charset="-122"/>
+                <a:sym typeface="Calibri" panose="020F0502020204030204" pitchFamily="34" charset="0"/>
+              </a:defRPr>
+            </a:lvl2pPr>
+            <a:lvl3pPr marL="1143000" indent="-228600">
+              <a:spcBef>
+                <a:spcPct val="20000"/>
+              </a:spcBef>
+              <a:buFont typeface="Arial" panose="020B0604020202020204" pitchFamily="34" charset="0"/>
+              <a:buChar char="•"/>
+              <a:defRPr sz="2400">
+                <a:solidFill>
+                  <a:schemeClr val="tx1"/>
+                </a:solidFill>
+                <a:latin typeface="Calibri" panose="020F0502020204030204" pitchFamily="34" charset="0"/>
+                <a:ea typeface="宋体" panose="02010600030101010101" pitchFamily="2" charset="-122"/>
+                <a:sym typeface="Calibri" panose="020F0502020204030204" pitchFamily="34" charset="0"/>
+              </a:defRPr>
+            </a:lvl3pPr>
+            <a:lvl4pPr marL="1600200" indent="-228600">
+              <a:spcBef>
+                <a:spcPct val="20000"/>
+              </a:spcBef>
+              <a:buFont typeface="Arial" panose="020B0604020202020204" pitchFamily="34" charset="0"/>
+              <a:buChar char="–"/>
+              <a:defRPr sz="2000">
+                <a:solidFill>
+                  <a:schemeClr val="tx1"/>
+                </a:solidFill>
+                <a:latin typeface="Calibri" panose="020F0502020204030204" pitchFamily="34" charset="0"/>
+                <a:ea typeface="宋体" panose="02010600030101010101" pitchFamily="2" charset="-122"/>
+                <a:sym typeface="Calibri" panose="020F0502020204030204" pitchFamily="34" charset="0"/>
+              </a:defRPr>
+            </a:lvl4pPr>
+            <a:lvl5pPr marL="2057400" indent="-228600">
+              <a:spcBef>
+                <a:spcPct val="20000"/>
+              </a:spcBef>
+              <a:buFont typeface="Arial" panose="020B0604020202020204" pitchFamily="34" charset="0"/>
+              <a:buChar char="»"/>
+              <a:defRPr sz="2000">
+                <a:solidFill>
+                  <a:schemeClr val="tx1"/>
+                </a:solidFill>
+                <a:latin typeface="Calibri" panose="020F0502020204030204" pitchFamily="34" charset="0"/>
+                <a:ea typeface="宋体" panose="02010600030101010101" pitchFamily="2" charset="-122"/>
+                <a:sym typeface="Calibri" panose="020F0502020204030204" pitchFamily="34" charset="0"/>
+              </a:defRPr>
+            </a:lvl5pPr>
+            <a:lvl6pPr marL="2514600" indent="-228600" eaLnBrk="0" fontAlgn="base" hangingPunct="0">
+              <a:spcBef>
+                <a:spcPct val="20000"/>
+              </a:spcBef>
+              <a:spcAft>
+                <a:spcPct val="0"/>
+              </a:spcAft>
+              <a:buFont typeface="Arial" panose="020B0604020202020204" pitchFamily="34" charset="0"/>
+              <a:buChar char="»"/>
+              <a:defRPr sz="2000">
+                <a:solidFill>
+                  <a:schemeClr val="tx1"/>
+                </a:solidFill>
+                <a:latin typeface="Calibri" panose="020F0502020204030204" pitchFamily="34" charset="0"/>
+                <a:ea typeface="宋体" panose="02010600030101010101" pitchFamily="2" charset="-122"/>
+                <a:sym typeface="Calibri" panose="020F0502020204030204" pitchFamily="34" charset="0"/>
+              </a:defRPr>
+            </a:lvl6pPr>
+            <a:lvl7pPr marL="2971800" indent="-228600" eaLnBrk="0" fontAlgn="base" hangingPunct="0">
+              <a:spcBef>
+                <a:spcPct val="20000"/>
+              </a:spcBef>
+              <a:spcAft>
+                <a:spcPct val="0"/>
+              </a:spcAft>
+              <a:buFont typeface="Arial" panose="020B0604020202020204" pitchFamily="34" charset="0"/>
+              <a:buChar char="»"/>
+              <a:defRPr sz="2000">
+                <a:solidFill>
+                  <a:schemeClr val="tx1"/>
+                </a:solidFill>
+                <a:latin typeface="Calibri" panose="020F0502020204030204" pitchFamily="34" charset="0"/>
+                <a:ea typeface="宋体" panose="02010600030101010101" pitchFamily="2" charset="-122"/>
+                <a:sym typeface="Calibri" panose="020F0502020204030204" pitchFamily="34" charset="0"/>
+              </a:defRPr>
+            </a:lvl7pPr>
+            <a:lvl8pPr marL="3429000" indent="-228600" eaLnBrk="0" fontAlgn="base" hangingPunct="0">
+              <a:spcBef>
+                <a:spcPct val="20000"/>
+              </a:spcBef>
+              <a:spcAft>
+                <a:spcPct val="0"/>
+              </a:spcAft>
+              <a:buFont typeface="Arial" panose="020B0604020202020204" pitchFamily="34" charset="0"/>
+              <a:buChar char="»"/>
+              <a:defRPr sz="2000">
+                <a:solidFill>
+                  <a:schemeClr val="tx1"/>
+                </a:solidFill>
+                <a:latin typeface="Calibri" panose="020F0502020204030204" pitchFamily="34" charset="0"/>
+                <a:ea typeface="宋体" panose="02010600030101010101" pitchFamily="2" charset="-122"/>
+                <a:sym typeface="Calibri" panose="020F0502020204030204" pitchFamily="34" charset="0"/>
+              </a:defRPr>
+            </a:lvl8pPr>
+            <a:lvl9pPr marL="3886200" indent="-228600" eaLnBrk="0" fontAlgn="base" hangingPunct="0">
+              <a:spcBef>
+                <a:spcPct val="20000"/>
+              </a:spcBef>
+              <a:spcAft>
+                <a:spcPct val="0"/>
+              </a:spcAft>
+              <a:buFont typeface="Arial" panose="020B0604020202020204" pitchFamily="34" charset="0"/>
+              <a:buChar char="»"/>
+              <a:defRPr sz="2000">
+                <a:solidFill>
+                  <a:schemeClr val="tx1"/>
+                </a:solidFill>
+                <a:latin typeface="Calibri" panose="020F0502020204030204" pitchFamily="34" charset="0"/>
+                <a:ea typeface="宋体" panose="02010600030101010101" pitchFamily="2" charset="-122"/>
+                <a:sym typeface="Calibri" panose="020F0502020204030204" pitchFamily="34" charset="0"/>
+              </a:defRPr>
+            </a:lvl9pPr>
+          </a:lstStyle>
+          <a:p>
+            <a:pPr>
+              <a:spcBef>
+                <a:spcPct val="0"/>
+              </a:spcBef>
+              <a:buFont typeface="Arial" panose="020B0604020202020204" pitchFamily="34" charset="0"/>
+              <a:buNone/>
+            </a:pPr>
+            <a:r>
+              <a:rPr lang="en-US" altLang="zh-CN" sz="1800" dirty="0" smtClean="0">
+                <a:solidFill>
+                  <a:srgbClr val="898989"/>
+                </a:solidFill>
+                <a:latin typeface="微软雅黑" panose="020B0503020204020204" pitchFamily="34" charset="-122"/>
+                <a:ea typeface="微软雅黑" panose="020B0503020204020204" pitchFamily="34" charset="-122"/>
+              </a:rPr>
+              <a:t>?</a:t>
+            </a:r>
+            <a:endParaRPr lang="zh-CN" altLang="en-US" sz="1800" dirty="0" smtClean="0">
+              <a:latin typeface="微软雅黑" panose="020B0503020204020204" pitchFamily="34" charset="-122"/>
+              <a:ea typeface="微软雅黑" panose="020B0503020204020204" pitchFamily="34" charset="-122"/>
+            </a:endParaRPr>
+          </a:p>
+        </p:txBody>
+      </p:sp>
+    </p:spTree>
+    <p:extLst>
+      <p:ext uri="{BB962C8B-B14F-4D97-AF65-F5344CB8AC3E}">
+        <p14:creationId xmlns:p14="http://schemas.microsoft.com/office/powerpoint/2010/main" val="1326571828"/>
+      </p:ext>
+    </p:extLst>
+  </p:cSld>
+  <p:clrMapOvr>
+    <a:masterClrMapping/>
+  </p:clrMapOvr>
+  <p:timing>
+    <p:tnLst>
+      <p:par>
+        <p:cTn id="1" dur="indefinite" restart="never" nodeType="tmRoot"/>
+      </p:par>
+    </p:tnLst>
+  </p:timing>
+</p:sld>
+</file>
+
+<file path=ppt/slides/slide3.xml><?xml version="1.0" encoding="utf-8"?>
 <p:sld xmlns:a="http://schemas.openxmlformats.org/drawingml/2006/main" xmlns:r="http://schemas.openxmlformats.org/officeDocument/2006/relationships" xmlns:p="http://schemas.openxmlformats.org/presentationml/2006/main">
   <p:cSld>
     <p:spTree>
@@ -7590,7 +8658,7 @@
 </p:sld>
 </file>
 
-<file path=ppt/slides/slide3.xml><?xml version="1.0" encoding="utf-8"?>
+<file path=ppt/slides/slide4.xml><?xml version="1.0" encoding="utf-8"?>
 <p:sld xmlns:a="http://schemas.openxmlformats.org/drawingml/2006/main" xmlns:r="http://schemas.openxmlformats.org/officeDocument/2006/relationships" xmlns:p="http://schemas.openxmlformats.org/presentationml/2006/main">
   <p:cSld>
     <p:spTree>
@@ -8296,7 +9364,7 @@
 </p:sld>
 </file>
 
-<file path=ppt/slides/slide4.xml><?xml version="1.0" encoding="utf-8"?>
+<file path=ppt/slides/slide5.xml><?xml version="1.0" encoding="utf-8"?>
 <p:sld xmlns:a="http://schemas.openxmlformats.org/drawingml/2006/main" xmlns:r="http://schemas.openxmlformats.org/officeDocument/2006/relationships" xmlns:p="http://schemas.openxmlformats.org/presentationml/2006/main">
   <p:cSld>
     <p:spTree>
@@ -8743,7 +9811,7 @@
           <a:graphicData uri="http://schemas.openxmlformats.org/presentationml/2006/ole">
             <mc:AlternateContent xmlns:mc="http://schemas.openxmlformats.org/markup-compatibility/2006">
               <mc:Choice xmlns:v="urn:schemas-microsoft-com:vml" Requires="v">
-                <p:oleObj spid="_x0000_s1206" name="公式" r:id="rId3" imgW="558800" imgH="228600" progId="Equation.3">
+                <p:oleObj spid="_x0000_s1254" name="公式" r:id="rId3" imgW="558800" imgH="228600" progId="Equation.3">
                   <p:embed/>
                 </p:oleObj>
               </mc:Choice>
@@ -8826,7 +9894,7 @@
           <a:graphicData uri="http://schemas.openxmlformats.org/presentationml/2006/ole">
             <mc:AlternateContent xmlns:mc="http://schemas.openxmlformats.org/markup-compatibility/2006">
               <mc:Choice xmlns:v="urn:schemas-microsoft-com:vml" Requires="v">
-                <p:oleObj spid="_x0000_s1207" name="公式" r:id="rId5" imgW="2108200" imgH="457200" progId="Equation.3">
+                <p:oleObj spid="_x0000_s1255" name="公式" r:id="rId5" imgW="2108200" imgH="457200" progId="Equation.3">
                   <p:embed/>
                 </p:oleObj>
               </mc:Choice>
@@ -8909,7 +9977,7 @@
           <a:graphicData uri="http://schemas.openxmlformats.org/presentationml/2006/ole">
             <mc:AlternateContent xmlns:mc="http://schemas.openxmlformats.org/markup-compatibility/2006">
               <mc:Choice xmlns:v="urn:schemas-microsoft-com:vml" Requires="v">
-                <p:oleObj spid="_x0000_s1208" name="公式" r:id="rId7" imgW="2082800" imgH="457200" progId="Equation.3">
+                <p:oleObj spid="_x0000_s1256" name="公式" r:id="rId7" imgW="2082800" imgH="457200" progId="Equation.3">
                   <p:embed/>
                 </p:oleObj>
               </mc:Choice>
@@ -8992,7 +10060,7 @@
           <a:graphicData uri="http://schemas.openxmlformats.org/presentationml/2006/ole">
             <mc:AlternateContent xmlns:mc="http://schemas.openxmlformats.org/markup-compatibility/2006">
               <mc:Choice xmlns:v="urn:schemas-microsoft-com:vml" Requires="v">
-                <p:oleObj spid="_x0000_s1209" name="公式" r:id="rId9" imgW="1879600" imgH="457200" progId="Equation.3">
+                <p:oleObj spid="_x0000_s1257" name="公式" r:id="rId9" imgW="1879600" imgH="457200" progId="Equation.3">
                   <p:embed/>
                 </p:oleObj>
               </mc:Choice>
@@ -9081,7 +10149,7 @@
           <a:graphicData uri="http://schemas.openxmlformats.org/presentationml/2006/ole">
             <mc:AlternateContent xmlns:mc="http://schemas.openxmlformats.org/markup-compatibility/2006">
               <mc:Choice xmlns:v="urn:schemas-microsoft-com:vml" Requires="v">
-                <p:oleObj spid="_x0000_s1210" name="公式" r:id="rId11" imgW="2540000" imgH="508000" progId="Equation.3">
+                <p:oleObj spid="_x0000_s1258" name="公式" r:id="rId11" imgW="2540000" imgH="508000" progId="Equation.3">
                   <p:embed/>
                 </p:oleObj>
               </mc:Choice>
@@ -9170,7 +10238,7 @@
           <a:graphicData uri="http://schemas.openxmlformats.org/presentationml/2006/ole">
             <mc:AlternateContent xmlns:mc="http://schemas.openxmlformats.org/markup-compatibility/2006">
               <mc:Choice xmlns:v="urn:schemas-microsoft-com:vml" Requires="v">
-                <p:oleObj spid="_x0000_s1211" name="公式" r:id="rId13" imgW="3136900" imgH="508000" progId="Equation.3">
+                <p:oleObj spid="_x0000_s1259" name="公式" r:id="rId13" imgW="3136900" imgH="508000" progId="Equation.3">
                   <p:embed/>
                 </p:oleObj>
               </mc:Choice>
@@ -10218,7 +11286,7 @@
 </p:sld>
 </file>
 
-<file path=ppt/slides/slide5.xml><?xml version="1.0" encoding="utf-8"?>
+<file path=ppt/slides/slide6.xml><?xml version="1.0" encoding="utf-8"?>
 <p:sld xmlns:a="http://schemas.openxmlformats.org/drawingml/2006/main" xmlns:r="http://schemas.openxmlformats.org/officeDocument/2006/relationships" xmlns:p="http://schemas.openxmlformats.org/presentationml/2006/main">
   <p:cSld>
     <p:spTree>
@@ -13161,7 +14229,7 @@
 </p:sld>
 </file>
 
-<file path=ppt/slides/slide6.xml><?xml version="1.0" encoding="utf-8"?>
+<file path=ppt/slides/slide7.xml><?xml version="1.0" encoding="utf-8"?>
 <p:sld xmlns:a="http://schemas.openxmlformats.org/drawingml/2006/main" xmlns:r="http://schemas.openxmlformats.org/officeDocument/2006/relationships" xmlns:p="http://schemas.openxmlformats.org/presentationml/2006/main">
   <p:cSld>
     <p:spTree>
@@ -15026,451 +16094,6 @@
 </p:sld>
 </file>
 
-<file path=ppt/slides/slide7.xml><?xml version="1.0" encoding="utf-8"?>
-<p:sld xmlns:a="http://schemas.openxmlformats.org/drawingml/2006/main" xmlns:r="http://schemas.openxmlformats.org/officeDocument/2006/relationships" xmlns:p="http://schemas.openxmlformats.org/presentationml/2006/main">
-  <p:cSld>
-    <p:spTree>
-      <p:nvGrpSpPr>
-        <p:cNvPr id="1" name=""/>
-        <p:cNvGrpSpPr/>
-        <p:nvPr/>
-      </p:nvGrpSpPr>
-      <p:grpSpPr>
-        <a:xfrm>
-          <a:off x="0" y="0"/>
-          <a:ext cx="0" cy="0"/>
-          <a:chOff x="0" y="0"/>
-          <a:chExt cx="0" cy="0"/>
-        </a:xfrm>
-      </p:grpSpPr>
-      <p:sp>
-        <p:nvSpPr>
-          <p:cNvPr id="2" name="文本框 1"/>
-          <p:cNvSpPr txBox="1"/>
-          <p:nvPr/>
-        </p:nvSpPr>
-        <p:spPr>
-          <a:xfrm>
-            <a:off x="205740" y="297180"/>
-            <a:ext cx="7109460" cy="830997"/>
-          </a:xfrm>
-          <a:prstGeom prst="rect">
-            <a:avLst/>
-          </a:prstGeom>
-          <a:noFill/>
-        </p:spPr>
-        <p:txBody>
-          <a:bodyPr wrap="square" rtlCol="0">
-            <a:spAutoFit/>
-          </a:bodyPr>
-          <a:lstStyle/>
-          <a:p>
-            <a:r>
-              <a:rPr lang="zh-CN" altLang="en-US" sz="2400" b="1" dirty="0" smtClean="0">
-                <a:latin typeface="微软雅黑" panose="020B0503020204020204" pitchFamily="34" charset="-122"/>
-                <a:ea typeface="微软雅黑" panose="020B0503020204020204" pitchFamily="34" charset="-122"/>
-              </a:rPr>
-              <a:t>发现</a:t>
-            </a:r>
-            <a:r>
-              <a:rPr lang="en-US" altLang="zh-CN" sz="2400" b="1" dirty="0" smtClean="0">
-                <a:latin typeface="微软雅黑" panose="020B0503020204020204" pitchFamily="34" charset="-122"/>
-                <a:ea typeface="微软雅黑" panose="020B0503020204020204" pitchFamily="34" charset="-122"/>
-              </a:rPr>
-              <a:t>1</a:t>
-            </a:r>
-            <a:r>
-              <a:rPr lang="zh-CN" altLang="en-US" sz="2400" b="1" dirty="0" smtClean="0">
-                <a:latin typeface="微软雅黑" panose="020B0503020204020204" pitchFamily="34" charset="-122"/>
-                <a:ea typeface="微软雅黑" panose="020B0503020204020204" pitchFamily="34" charset="-122"/>
-              </a:rPr>
-              <a:t>：不同电流密度，减小</a:t>
-            </a:r>
-            <a:r>
-              <a:rPr lang="zh-CN" altLang="en-US" sz="2400" b="1" dirty="0">
-                <a:latin typeface="微软雅黑" panose="020B0503020204020204" pitchFamily="34" charset="-122"/>
-                <a:ea typeface="微软雅黑" panose="020B0503020204020204" pitchFamily="34" charset="-122"/>
-              </a:rPr>
-              <a:t>阴极</a:t>
-            </a:r>
-            <a:r>
-              <a:rPr lang="zh-CN" altLang="en-US" sz="2400" b="1" dirty="0" smtClean="0">
-                <a:latin typeface="微软雅黑" panose="020B0503020204020204" pitchFamily="34" charset="-122"/>
-                <a:ea typeface="微软雅黑" panose="020B0503020204020204" pitchFamily="34" charset="-122"/>
-              </a:rPr>
-              <a:t>入口处的</a:t>
-            </a:r>
-            <a:r>
-              <a:rPr lang="en-US" altLang="zh-CN" sz="2400" b="1" dirty="0" smtClean="0">
-                <a:latin typeface="微软雅黑" panose="020B0503020204020204" pitchFamily="34" charset="-122"/>
-                <a:ea typeface="微软雅黑" panose="020B0503020204020204" pitchFamily="34" charset="-122"/>
-              </a:rPr>
-              <a:t>GDL</a:t>
-            </a:r>
-            <a:r>
-              <a:rPr lang="zh-CN" altLang="en-US" sz="2400" b="1" dirty="0" smtClean="0">
-                <a:latin typeface="微软雅黑" panose="020B0503020204020204" pitchFamily="34" charset="-122"/>
-                <a:ea typeface="微软雅黑" panose="020B0503020204020204" pitchFamily="34" charset="-122"/>
-              </a:rPr>
-              <a:t>孔隙率对水传输和电化学反应速率的影响不同</a:t>
-            </a:r>
-            <a:endParaRPr lang="en-US" altLang="zh-CN" sz="2400" b="1" dirty="0" smtClean="0">
-              <a:latin typeface="微软雅黑" panose="020B0503020204020204" pitchFamily="34" charset="-122"/>
-              <a:ea typeface="微软雅黑" panose="020B0503020204020204" pitchFamily="34" charset="-122"/>
-            </a:endParaRPr>
-          </a:p>
-        </p:txBody>
-      </p:sp>
-      <p:sp>
-        <p:nvSpPr>
-          <p:cNvPr id="4" name="文本框 3"/>
-          <p:cNvSpPr txBox="1"/>
-          <p:nvPr/>
-        </p:nvSpPr>
-        <p:spPr>
-          <a:xfrm>
-            <a:off x="1280160" y="5113020"/>
-            <a:ext cx="1314450" cy="276999"/>
-          </a:xfrm>
-          <a:prstGeom prst="rect">
-            <a:avLst/>
-          </a:prstGeom>
-        </p:spPr>
-        <p:txBody>
-          <a:bodyPr wrap="square">
-            <a:spAutoFit/>
-          </a:bodyPr>
-          <a:lstStyle>
-            <a:defPPr>
-              <a:defRPr lang="en-US"/>
-            </a:defPPr>
-            <a:lvl1pPr>
-              <a:defRPr sz="1200" b="1">
-                <a:latin typeface="Times New Roman" panose="02020603050405020304" pitchFamily="18" charset="0"/>
-                <a:cs typeface="Times New Roman" panose="02020603050405020304" pitchFamily="18" charset="0"/>
-              </a:defRPr>
-            </a:lvl1pPr>
-          </a:lstStyle>
-          <a:p>
-            <a:r>
-              <a:rPr lang="en-US" altLang="zh-CN" dirty="0"/>
-              <a:t>0.6V, 0.4</a:t>
-            </a:r>
-          </a:p>
-        </p:txBody>
-      </p:sp>
-      <p:sp>
-        <p:nvSpPr>
-          <p:cNvPr id="6" name="文本框 5"/>
-          <p:cNvSpPr txBox="1"/>
-          <p:nvPr/>
-        </p:nvSpPr>
-        <p:spPr>
-          <a:xfrm>
-            <a:off x="1280160" y="5390019"/>
-            <a:ext cx="1474470" cy="276999"/>
-          </a:xfrm>
-          <a:prstGeom prst="rect">
-            <a:avLst/>
-          </a:prstGeom>
-        </p:spPr>
-        <p:txBody>
-          <a:bodyPr wrap="square">
-            <a:spAutoFit/>
-          </a:bodyPr>
-          <a:lstStyle>
-            <a:defPPr>
-              <a:defRPr lang="en-US"/>
-            </a:defPPr>
-            <a:lvl1pPr>
-              <a:defRPr sz="1200" b="1">
-                <a:latin typeface="Times New Roman" panose="02020603050405020304" pitchFamily="18" charset="0"/>
-                <a:cs typeface="Times New Roman" panose="02020603050405020304" pitchFamily="18" charset="0"/>
-              </a:defRPr>
-            </a:lvl1pPr>
-          </a:lstStyle>
-          <a:p>
-            <a:r>
-              <a:rPr lang="en-US" altLang="zh-CN" dirty="0"/>
-              <a:t>0.6V, 0.3-0.4-0.5</a:t>
-            </a:r>
-          </a:p>
-        </p:txBody>
-      </p:sp>
-      <p:sp>
-        <p:nvSpPr>
-          <p:cNvPr id="7" name="文本框 6"/>
-          <p:cNvSpPr txBox="1"/>
-          <p:nvPr/>
-        </p:nvSpPr>
-        <p:spPr>
-          <a:xfrm>
-            <a:off x="5044440" y="5113020"/>
-            <a:ext cx="1314450" cy="276999"/>
-          </a:xfrm>
-          <a:prstGeom prst="rect">
-            <a:avLst/>
-          </a:prstGeom>
-          <a:noFill/>
-        </p:spPr>
-        <p:txBody>
-          <a:bodyPr wrap="square" rtlCol="0">
-            <a:spAutoFit/>
-          </a:bodyPr>
-          <a:lstStyle/>
-          <a:p>
-            <a:r>
-              <a:rPr lang="en-US" altLang="zh-CN" sz="1200" b="1" dirty="0">
-                <a:latin typeface="Times New Roman" panose="02020603050405020304" pitchFamily="18" charset="0"/>
-                <a:cs typeface="Times New Roman" panose="02020603050405020304" pitchFamily="18" charset="0"/>
-              </a:rPr>
-              <a:t>0.9V</a:t>
-            </a:r>
-            <a:r>
-              <a:rPr lang="en-US" altLang="zh-CN" sz="1200" b="1" dirty="0" smtClean="0">
-                <a:latin typeface="微软雅黑" panose="020B0503020204020204" pitchFamily="34" charset="-122"/>
-                <a:ea typeface="微软雅黑" panose="020B0503020204020204" pitchFamily="34" charset="-122"/>
-              </a:rPr>
-              <a:t>, 0.4</a:t>
-            </a:r>
-          </a:p>
-        </p:txBody>
-      </p:sp>
-      <p:sp>
-        <p:nvSpPr>
-          <p:cNvPr id="8" name="文本框 7"/>
-          <p:cNvSpPr txBox="1"/>
-          <p:nvPr/>
-        </p:nvSpPr>
-        <p:spPr>
-          <a:xfrm>
-            <a:off x="5044440" y="5390019"/>
-            <a:ext cx="1474470" cy="276999"/>
-          </a:xfrm>
-          <a:prstGeom prst="rect">
-            <a:avLst/>
-          </a:prstGeom>
-          <a:noFill/>
-        </p:spPr>
-        <p:txBody>
-          <a:bodyPr wrap="square" rtlCol="0">
-            <a:spAutoFit/>
-          </a:bodyPr>
-          <a:lstStyle/>
-          <a:p>
-            <a:r>
-              <a:rPr lang="en-US" altLang="zh-CN" sz="1200" b="1" dirty="0" smtClean="0">
-                <a:latin typeface="Times New Roman" panose="02020603050405020304" pitchFamily="18" charset="0"/>
-                <a:ea typeface="微软雅黑" panose="020B0503020204020204" pitchFamily="34" charset="-122"/>
-                <a:cs typeface="Times New Roman" panose="02020603050405020304" pitchFamily="18" charset="0"/>
-              </a:rPr>
-              <a:t>0.9V, 0.3-0.4-0.5</a:t>
-            </a:r>
-          </a:p>
-        </p:txBody>
-      </p:sp>
-      <p:sp>
-        <p:nvSpPr>
-          <p:cNvPr id="9" name="矩形 8"/>
-          <p:cNvSpPr/>
-          <p:nvPr/>
-        </p:nvSpPr>
-        <p:spPr>
-          <a:xfrm flipH="1">
-            <a:off x="2170261" y="5113020"/>
-            <a:ext cx="1569253" cy="276999"/>
-          </a:xfrm>
-          <a:prstGeom prst="rect">
-            <a:avLst/>
-          </a:prstGeom>
-        </p:spPr>
-        <p:txBody>
-          <a:bodyPr wrap="square">
-            <a:spAutoFit/>
-          </a:bodyPr>
-          <a:lstStyle/>
-          <a:p>
-            <a:r>
-              <a:rPr lang="en-US" altLang="zh-CN" sz="1200" b="1" dirty="0" smtClean="0">
-                <a:latin typeface="Times New Roman" panose="02020603050405020304" pitchFamily="18" charset="0"/>
-                <a:cs typeface="Times New Roman" panose="02020603050405020304" pitchFamily="18" charset="0"/>
-              </a:rPr>
-              <a:t>I = </a:t>
-            </a:r>
-            <a:r>
-              <a:rPr lang="zh-CN" altLang="en-US" sz="1200" b="1" dirty="0" smtClean="0">
-                <a:latin typeface="Times New Roman" panose="02020603050405020304" pitchFamily="18" charset="0"/>
-                <a:cs typeface="Times New Roman" panose="02020603050405020304" pitchFamily="18" charset="0"/>
-              </a:rPr>
-              <a:t>0</a:t>
-            </a:r>
-            <a:r>
-              <a:rPr lang="zh-CN" altLang="en-US" sz="1200" b="1" dirty="0">
-                <a:latin typeface="Times New Roman" panose="02020603050405020304" pitchFamily="18" charset="0"/>
-                <a:cs typeface="Times New Roman" panose="02020603050405020304" pitchFamily="18" charset="0"/>
-              </a:rPr>
-              <a:t>.017589</a:t>
-            </a:r>
-          </a:p>
-        </p:txBody>
-      </p:sp>
-      <p:sp>
-        <p:nvSpPr>
-          <p:cNvPr id="10" name="矩形 9"/>
-          <p:cNvSpPr/>
-          <p:nvPr/>
-        </p:nvSpPr>
-        <p:spPr>
-          <a:xfrm flipH="1">
-            <a:off x="6029324" y="5113019"/>
-            <a:ext cx="1569253" cy="276999"/>
-          </a:xfrm>
-          <a:prstGeom prst="rect">
-            <a:avLst/>
-          </a:prstGeom>
-        </p:spPr>
-        <p:txBody>
-          <a:bodyPr wrap="square">
-            <a:spAutoFit/>
-          </a:bodyPr>
-          <a:lstStyle/>
-          <a:p>
-            <a:r>
-              <a:rPr lang="en-US" altLang="zh-CN" sz="1200" b="1" dirty="0" smtClean="0">
-                <a:latin typeface="Times New Roman" panose="02020603050405020304" pitchFamily="18" charset="0"/>
-                <a:cs typeface="Times New Roman" panose="02020603050405020304" pitchFamily="18" charset="0"/>
-              </a:rPr>
-              <a:t>I </a:t>
-            </a:r>
-            <a:r>
-              <a:rPr lang="en-US" altLang="zh-CN" sz="1200" b="1" dirty="0">
-                <a:latin typeface="Times New Roman" panose="02020603050405020304" pitchFamily="18" charset="0"/>
-                <a:cs typeface="Times New Roman" panose="02020603050405020304" pitchFamily="18" charset="0"/>
-              </a:rPr>
-              <a:t>= 1.0636</a:t>
-            </a:r>
-            <a:endParaRPr lang="zh-CN" altLang="en-US" sz="1200" b="1" dirty="0">
-              <a:latin typeface="Times New Roman" panose="02020603050405020304" pitchFamily="18" charset="0"/>
-              <a:cs typeface="Times New Roman" panose="02020603050405020304" pitchFamily="18" charset="0"/>
-            </a:endParaRPr>
-          </a:p>
-        </p:txBody>
-      </p:sp>
-      <p:sp>
-        <p:nvSpPr>
-          <p:cNvPr id="11" name="矩形 10"/>
-          <p:cNvSpPr/>
-          <p:nvPr/>
-        </p:nvSpPr>
-        <p:spPr>
-          <a:xfrm flipH="1">
-            <a:off x="2589847" y="5390019"/>
-            <a:ext cx="1569253" cy="276999"/>
-          </a:xfrm>
-          <a:prstGeom prst="rect">
-            <a:avLst/>
-          </a:prstGeom>
-        </p:spPr>
-        <p:txBody>
-          <a:bodyPr wrap="square">
-            <a:spAutoFit/>
-          </a:bodyPr>
-          <a:lstStyle/>
-          <a:p>
-            <a:r>
-              <a:rPr lang="en-US" altLang="zh-CN" sz="1200" b="1" dirty="0" smtClean="0">
-                <a:latin typeface="Times New Roman" panose="02020603050405020304" pitchFamily="18" charset="0"/>
-                <a:cs typeface="Times New Roman" panose="02020603050405020304" pitchFamily="18" charset="0"/>
-              </a:rPr>
-              <a:t>I =</a:t>
-            </a:r>
-            <a:endParaRPr lang="zh-CN" altLang="en-US" sz="1200" b="1" dirty="0">
-              <a:latin typeface="Times New Roman" panose="02020603050405020304" pitchFamily="18" charset="0"/>
-              <a:cs typeface="Times New Roman" panose="02020603050405020304" pitchFamily="18" charset="0"/>
-            </a:endParaRPr>
-          </a:p>
-        </p:txBody>
-      </p:sp>
-      <p:sp>
-        <p:nvSpPr>
-          <p:cNvPr id="12" name="矩形 11"/>
-          <p:cNvSpPr/>
-          <p:nvPr/>
-        </p:nvSpPr>
-        <p:spPr>
-          <a:xfrm flipH="1">
-            <a:off x="6488430" y="5390018"/>
-            <a:ext cx="1569253" cy="276999"/>
-          </a:xfrm>
-          <a:prstGeom prst="rect">
-            <a:avLst/>
-          </a:prstGeom>
-        </p:spPr>
-        <p:txBody>
-          <a:bodyPr wrap="square">
-            <a:spAutoFit/>
-          </a:bodyPr>
-          <a:lstStyle/>
-          <a:p>
-            <a:r>
-              <a:rPr lang="en-US" altLang="zh-CN" sz="1200" b="1" dirty="0" smtClean="0">
-                <a:latin typeface="Times New Roman" panose="02020603050405020304" pitchFamily="18" charset="0"/>
-                <a:cs typeface="Times New Roman" panose="02020603050405020304" pitchFamily="18" charset="0"/>
-              </a:rPr>
-              <a:t>I =</a:t>
-            </a:r>
-            <a:endParaRPr lang="zh-CN" altLang="en-US" sz="1200" b="1" dirty="0">
-              <a:latin typeface="Times New Roman" panose="02020603050405020304" pitchFamily="18" charset="0"/>
-              <a:cs typeface="Times New Roman" panose="02020603050405020304" pitchFamily="18" charset="0"/>
-            </a:endParaRPr>
-          </a:p>
-        </p:txBody>
-      </p:sp>
-      <p:sp>
-        <p:nvSpPr>
-          <p:cNvPr id="13" name="矩形 12"/>
-          <p:cNvSpPr/>
-          <p:nvPr/>
-        </p:nvSpPr>
-        <p:spPr>
-          <a:xfrm>
-            <a:off x="3605102" y="2797433"/>
-            <a:ext cx="1107996" cy="369332"/>
-          </a:xfrm>
-          <a:prstGeom prst="rect">
-            <a:avLst/>
-          </a:prstGeom>
-        </p:spPr>
-        <p:txBody>
-          <a:bodyPr wrap="none">
-            <a:spAutoFit/>
-          </a:bodyPr>
-          <a:lstStyle/>
-          <a:p>
-            <a:r>
-              <a:rPr lang="zh-CN" altLang="en-US" b="1" dirty="0" smtClean="0">
-                <a:latin typeface="微软雅黑" panose="020B0503020204020204" pitchFamily="34" charset="-122"/>
-                <a:ea typeface="微软雅黑" panose="020B0503020204020204" pitchFamily="34" charset="-122"/>
-              </a:rPr>
-              <a:t>水饱和度</a:t>
-            </a:r>
-            <a:endParaRPr lang="zh-CN" altLang="en-US" dirty="0"/>
-          </a:p>
-        </p:txBody>
-      </p:sp>
-    </p:spTree>
-    <p:extLst>
-      <p:ext uri="{BB962C8B-B14F-4D97-AF65-F5344CB8AC3E}">
-        <p14:creationId xmlns:p14="http://schemas.microsoft.com/office/powerpoint/2010/main" val="1101883155"/>
-      </p:ext>
-    </p:extLst>
-  </p:cSld>
-  <p:clrMapOvr>
-    <a:masterClrMapping/>
-  </p:clrMapOvr>
-</p:sld>
-</file>
-
 <file path=ppt/slides/slide8.xml><?xml version="1.0" encoding="utf-8"?>
 <p:sld xmlns:a="http://schemas.openxmlformats.org/drawingml/2006/main" xmlns:r="http://schemas.openxmlformats.org/officeDocument/2006/relationships" xmlns:p="http://schemas.openxmlformats.org/presentationml/2006/main">
   <p:cSld>
@@ -15669,7 +16292,14 @@
                 <a:latin typeface="Times New Roman" panose="02020603050405020304" pitchFamily="18" charset="0"/>
                 <a:cs typeface="Times New Roman" panose="02020603050405020304" pitchFamily="18" charset="0"/>
               </a:rPr>
-              <a:t>0.9V, 0.4</a:t>
+              <a:t>0.9V</a:t>
+            </a:r>
+            <a:r>
+              <a:rPr lang="en-US" altLang="zh-CN" sz="1200" b="1" dirty="0" smtClean="0">
+                <a:latin typeface="微软雅黑" panose="020B0503020204020204" pitchFamily="34" charset="-122"/>
+                <a:ea typeface="微软雅黑" panose="020B0503020204020204" pitchFamily="34" charset="-122"/>
+              </a:rPr>
+              <a:t>, 0.4</a:t>
             </a:r>
           </a:p>
         </p:txBody>
@@ -15697,8 +16327,9 @@
           <a:lstStyle/>
           <a:p>
             <a:r>
-              <a:rPr lang="en-US" altLang="zh-CN" sz="1200" b="1" dirty="0">
+              <a:rPr lang="en-US" altLang="zh-CN" sz="1200" b="1" dirty="0" smtClean="0">
                 <a:latin typeface="Times New Roman" panose="02020603050405020304" pitchFamily="18" charset="0"/>
+                <a:ea typeface="微软雅黑" panose="020B0503020204020204" pitchFamily="34" charset="-122"/>
                 <a:cs typeface="Times New Roman" panose="02020603050405020304" pitchFamily="18" charset="0"/>
               </a:rPr>
               <a:t>0.9V, 0.3-0.4-0.5</a:t>
@@ -15872,7 +16503,7 @@
         <p:spPr>
           <a:xfrm>
             <a:off x="3605102" y="2797433"/>
-            <a:ext cx="1800493" cy="369332"/>
+            <a:ext cx="1107996" cy="369332"/>
           </a:xfrm>
           <a:prstGeom prst="rect">
             <a:avLst/>
@@ -15885,11 +16516,11 @@
           <a:lstStyle/>
           <a:p>
             <a:r>
-              <a:rPr lang="zh-CN" altLang="en-US" b="1" dirty="0">
+              <a:rPr lang="zh-CN" altLang="en-US" b="1" dirty="0" smtClean="0">
                 <a:latin typeface="微软雅黑" panose="020B0503020204020204" pitchFamily="34" charset="-122"/>
                 <a:ea typeface="微软雅黑" panose="020B0503020204020204" pitchFamily="34" charset="-122"/>
               </a:rPr>
-              <a:t>电化学反应速率</a:t>
+              <a:t>水饱和度</a:t>
             </a:r>
             <a:endParaRPr lang="zh-CN" altLang="en-US" dirty="0"/>
           </a:p>
@@ -15898,7 +16529,7 @@
     </p:spTree>
     <p:extLst>
       <p:ext uri="{BB962C8B-B14F-4D97-AF65-F5344CB8AC3E}">
-        <p14:creationId xmlns:p14="http://schemas.microsoft.com/office/powerpoint/2010/main" val="841909923"/>
+        <p14:creationId xmlns:p14="http://schemas.microsoft.com/office/powerpoint/2010/main" val="1101883155"/>
       </p:ext>
     </p:extLst>
   </p:cSld>
@@ -15925,10 +16556,417 @@
           <a:chExt cx="0" cy="0"/>
         </a:xfrm>
       </p:grpSpPr>
+      <p:sp>
+        <p:nvSpPr>
+          <p:cNvPr id="2" name="文本框 1"/>
+          <p:cNvSpPr txBox="1"/>
+          <p:nvPr/>
+        </p:nvSpPr>
+        <p:spPr>
+          <a:xfrm>
+            <a:off x="205740" y="297180"/>
+            <a:ext cx="7109460" cy="830997"/>
+          </a:xfrm>
+          <a:prstGeom prst="rect">
+            <a:avLst/>
+          </a:prstGeom>
+          <a:noFill/>
+        </p:spPr>
+        <p:txBody>
+          <a:bodyPr wrap="square" rtlCol="0">
+            <a:spAutoFit/>
+          </a:bodyPr>
+          <a:lstStyle/>
+          <a:p>
+            <a:r>
+              <a:rPr lang="zh-CN" altLang="en-US" sz="2400" b="1" dirty="0" smtClean="0">
+                <a:latin typeface="微软雅黑" panose="020B0503020204020204" pitchFamily="34" charset="-122"/>
+                <a:ea typeface="微软雅黑" panose="020B0503020204020204" pitchFamily="34" charset="-122"/>
+              </a:rPr>
+              <a:t>发现</a:t>
+            </a:r>
+            <a:r>
+              <a:rPr lang="en-US" altLang="zh-CN" sz="2400" b="1" dirty="0" smtClean="0">
+                <a:latin typeface="微软雅黑" panose="020B0503020204020204" pitchFamily="34" charset="-122"/>
+                <a:ea typeface="微软雅黑" panose="020B0503020204020204" pitchFamily="34" charset="-122"/>
+              </a:rPr>
+              <a:t>1</a:t>
+            </a:r>
+            <a:r>
+              <a:rPr lang="zh-CN" altLang="en-US" sz="2400" b="1" dirty="0" smtClean="0">
+                <a:latin typeface="微软雅黑" panose="020B0503020204020204" pitchFamily="34" charset="-122"/>
+                <a:ea typeface="微软雅黑" panose="020B0503020204020204" pitchFamily="34" charset="-122"/>
+              </a:rPr>
+              <a:t>：不同电流密度，减小</a:t>
+            </a:r>
+            <a:r>
+              <a:rPr lang="zh-CN" altLang="en-US" sz="2400" b="1" dirty="0">
+                <a:latin typeface="微软雅黑" panose="020B0503020204020204" pitchFamily="34" charset="-122"/>
+                <a:ea typeface="微软雅黑" panose="020B0503020204020204" pitchFamily="34" charset="-122"/>
+              </a:rPr>
+              <a:t>阴极</a:t>
+            </a:r>
+            <a:r>
+              <a:rPr lang="zh-CN" altLang="en-US" sz="2400" b="1" dirty="0" smtClean="0">
+                <a:latin typeface="微软雅黑" panose="020B0503020204020204" pitchFamily="34" charset="-122"/>
+                <a:ea typeface="微软雅黑" panose="020B0503020204020204" pitchFamily="34" charset="-122"/>
+              </a:rPr>
+              <a:t>入口处的</a:t>
+            </a:r>
+            <a:r>
+              <a:rPr lang="en-US" altLang="zh-CN" sz="2400" b="1" dirty="0" smtClean="0">
+                <a:latin typeface="微软雅黑" panose="020B0503020204020204" pitchFamily="34" charset="-122"/>
+                <a:ea typeface="微软雅黑" panose="020B0503020204020204" pitchFamily="34" charset="-122"/>
+              </a:rPr>
+              <a:t>GDL</a:t>
+            </a:r>
+            <a:r>
+              <a:rPr lang="zh-CN" altLang="en-US" sz="2400" b="1" dirty="0" smtClean="0">
+                <a:latin typeface="微软雅黑" panose="020B0503020204020204" pitchFamily="34" charset="-122"/>
+                <a:ea typeface="微软雅黑" panose="020B0503020204020204" pitchFamily="34" charset="-122"/>
+              </a:rPr>
+              <a:t>孔隙率对水传输和电化学反应速率的影响不同</a:t>
+            </a:r>
+            <a:endParaRPr lang="en-US" altLang="zh-CN" sz="2400" b="1" dirty="0" smtClean="0">
+              <a:latin typeface="微软雅黑" panose="020B0503020204020204" pitchFamily="34" charset="-122"/>
+              <a:ea typeface="微软雅黑" panose="020B0503020204020204" pitchFamily="34" charset="-122"/>
+            </a:endParaRPr>
+          </a:p>
+        </p:txBody>
+      </p:sp>
+      <p:sp>
+        <p:nvSpPr>
+          <p:cNvPr id="4" name="文本框 3"/>
+          <p:cNvSpPr txBox="1"/>
+          <p:nvPr/>
+        </p:nvSpPr>
+        <p:spPr>
+          <a:xfrm>
+            <a:off x="1280160" y="5113020"/>
+            <a:ext cx="1314450" cy="276999"/>
+          </a:xfrm>
+          <a:prstGeom prst="rect">
+            <a:avLst/>
+          </a:prstGeom>
+        </p:spPr>
+        <p:txBody>
+          <a:bodyPr wrap="square">
+            <a:spAutoFit/>
+          </a:bodyPr>
+          <a:lstStyle>
+            <a:defPPr>
+              <a:defRPr lang="en-US"/>
+            </a:defPPr>
+            <a:lvl1pPr>
+              <a:defRPr sz="1200" b="1">
+                <a:latin typeface="Times New Roman" panose="02020603050405020304" pitchFamily="18" charset="0"/>
+                <a:cs typeface="Times New Roman" panose="02020603050405020304" pitchFamily="18" charset="0"/>
+              </a:defRPr>
+            </a:lvl1pPr>
+          </a:lstStyle>
+          <a:p>
+            <a:r>
+              <a:rPr lang="en-US" altLang="zh-CN" dirty="0"/>
+              <a:t>0.6V, 0.4</a:t>
+            </a:r>
+          </a:p>
+        </p:txBody>
+      </p:sp>
+      <p:sp>
+        <p:nvSpPr>
+          <p:cNvPr id="6" name="文本框 5"/>
+          <p:cNvSpPr txBox="1"/>
+          <p:nvPr/>
+        </p:nvSpPr>
+        <p:spPr>
+          <a:xfrm>
+            <a:off x="1280160" y="5390019"/>
+            <a:ext cx="1474470" cy="276999"/>
+          </a:xfrm>
+          <a:prstGeom prst="rect">
+            <a:avLst/>
+          </a:prstGeom>
+        </p:spPr>
+        <p:txBody>
+          <a:bodyPr wrap="square">
+            <a:spAutoFit/>
+          </a:bodyPr>
+          <a:lstStyle>
+            <a:defPPr>
+              <a:defRPr lang="en-US"/>
+            </a:defPPr>
+            <a:lvl1pPr>
+              <a:defRPr sz="1200" b="1">
+                <a:latin typeface="Times New Roman" panose="02020603050405020304" pitchFamily="18" charset="0"/>
+                <a:cs typeface="Times New Roman" panose="02020603050405020304" pitchFamily="18" charset="0"/>
+              </a:defRPr>
+            </a:lvl1pPr>
+          </a:lstStyle>
+          <a:p>
+            <a:r>
+              <a:rPr lang="en-US" altLang="zh-CN" dirty="0"/>
+              <a:t>0.6V, 0.3-0.4-0.5</a:t>
+            </a:r>
+          </a:p>
+        </p:txBody>
+      </p:sp>
+      <p:sp>
+        <p:nvSpPr>
+          <p:cNvPr id="7" name="文本框 6"/>
+          <p:cNvSpPr txBox="1"/>
+          <p:nvPr/>
+        </p:nvSpPr>
+        <p:spPr>
+          <a:xfrm>
+            <a:off x="5044440" y="5113020"/>
+            <a:ext cx="1314450" cy="276999"/>
+          </a:xfrm>
+          <a:prstGeom prst="rect">
+            <a:avLst/>
+          </a:prstGeom>
+          <a:noFill/>
+        </p:spPr>
+        <p:txBody>
+          <a:bodyPr wrap="square" rtlCol="0">
+            <a:spAutoFit/>
+          </a:bodyPr>
+          <a:lstStyle/>
+          <a:p>
+            <a:r>
+              <a:rPr lang="en-US" altLang="zh-CN" sz="1200" b="1" dirty="0">
+                <a:latin typeface="Times New Roman" panose="02020603050405020304" pitchFamily="18" charset="0"/>
+                <a:cs typeface="Times New Roman" panose="02020603050405020304" pitchFamily="18" charset="0"/>
+              </a:rPr>
+              <a:t>0.9V, 0.4</a:t>
+            </a:r>
+          </a:p>
+        </p:txBody>
+      </p:sp>
+      <p:sp>
+        <p:nvSpPr>
+          <p:cNvPr id="8" name="文本框 7"/>
+          <p:cNvSpPr txBox="1"/>
+          <p:nvPr/>
+        </p:nvSpPr>
+        <p:spPr>
+          <a:xfrm>
+            <a:off x="5044440" y="5390019"/>
+            <a:ext cx="1474470" cy="276999"/>
+          </a:xfrm>
+          <a:prstGeom prst="rect">
+            <a:avLst/>
+          </a:prstGeom>
+          <a:noFill/>
+        </p:spPr>
+        <p:txBody>
+          <a:bodyPr wrap="square" rtlCol="0">
+            <a:spAutoFit/>
+          </a:bodyPr>
+          <a:lstStyle/>
+          <a:p>
+            <a:r>
+              <a:rPr lang="en-US" altLang="zh-CN" sz="1200" b="1" dirty="0">
+                <a:latin typeface="Times New Roman" panose="02020603050405020304" pitchFamily="18" charset="0"/>
+                <a:cs typeface="Times New Roman" panose="02020603050405020304" pitchFamily="18" charset="0"/>
+              </a:rPr>
+              <a:t>0.9V, 0.3-0.4-0.5</a:t>
+            </a:r>
+          </a:p>
+        </p:txBody>
+      </p:sp>
+      <p:sp>
+        <p:nvSpPr>
+          <p:cNvPr id="9" name="矩形 8"/>
+          <p:cNvSpPr/>
+          <p:nvPr/>
+        </p:nvSpPr>
+        <p:spPr>
+          <a:xfrm flipH="1">
+            <a:off x="2170261" y="5113020"/>
+            <a:ext cx="1569253" cy="276999"/>
+          </a:xfrm>
+          <a:prstGeom prst="rect">
+            <a:avLst/>
+          </a:prstGeom>
+        </p:spPr>
+        <p:txBody>
+          <a:bodyPr wrap="square">
+            <a:spAutoFit/>
+          </a:bodyPr>
+          <a:lstStyle/>
+          <a:p>
+            <a:r>
+              <a:rPr lang="en-US" altLang="zh-CN" sz="1200" b="1" dirty="0" smtClean="0">
+                <a:latin typeface="Times New Roman" panose="02020603050405020304" pitchFamily="18" charset="0"/>
+                <a:cs typeface="Times New Roman" panose="02020603050405020304" pitchFamily="18" charset="0"/>
+              </a:rPr>
+              <a:t>I = </a:t>
+            </a:r>
+            <a:r>
+              <a:rPr lang="zh-CN" altLang="en-US" sz="1200" b="1" dirty="0" smtClean="0">
+                <a:latin typeface="Times New Roman" panose="02020603050405020304" pitchFamily="18" charset="0"/>
+                <a:cs typeface="Times New Roman" panose="02020603050405020304" pitchFamily="18" charset="0"/>
+              </a:rPr>
+              <a:t>0</a:t>
+            </a:r>
+            <a:r>
+              <a:rPr lang="zh-CN" altLang="en-US" sz="1200" b="1" dirty="0">
+                <a:latin typeface="Times New Roman" panose="02020603050405020304" pitchFamily="18" charset="0"/>
+                <a:cs typeface="Times New Roman" panose="02020603050405020304" pitchFamily="18" charset="0"/>
+              </a:rPr>
+              <a:t>.017589</a:t>
+            </a:r>
+          </a:p>
+        </p:txBody>
+      </p:sp>
+      <p:sp>
+        <p:nvSpPr>
+          <p:cNvPr id="10" name="矩形 9"/>
+          <p:cNvSpPr/>
+          <p:nvPr/>
+        </p:nvSpPr>
+        <p:spPr>
+          <a:xfrm flipH="1">
+            <a:off x="6029324" y="5113019"/>
+            <a:ext cx="1569253" cy="276999"/>
+          </a:xfrm>
+          <a:prstGeom prst="rect">
+            <a:avLst/>
+          </a:prstGeom>
+        </p:spPr>
+        <p:txBody>
+          <a:bodyPr wrap="square">
+            <a:spAutoFit/>
+          </a:bodyPr>
+          <a:lstStyle/>
+          <a:p>
+            <a:r>
+              <a:rPr lang="en-US" altLang="zh-CN" sz="1200" b="1" dirty="0" smtClean="0">
+                <a:latin typeface="Times New Roman" panose="02020603050405020304" pitchFamily="18" charset="0"/>
+                <a:cs typeface="Times New Roman" panose="02020603050405020304" pitchFamily="18" charset="0"/>
+              </a:rPr>
+              <a:t>I </a:t>
+            </a:r>
+            <a:r>
+              <a:rPr lang="en-US" altLang="zh-CN" sz="1200" b="1" dirty="0">
+                <a:latin typeface="Times New Roman" panose="02020603050405020304" pitchFamily="18" charset="0"/>
+                <a:cs typeface="Times New Roman" panose="02020603050405020304" pitchFamily="18" charset="0"/>
+              </a:rPr>
+              <a:t>= 1.0636</a:t>
+            </a:r>
+            <a:endParaRPr lang="zh-CN" altLang="en-US" sz="1200" b="1" dirty="0">
+              <a:latin typeface="Times New Roman" panose="02020603050405020304" pitchFamily="18" charset="0"/>
+              <a:cs typeface="Times New Roman" panose="02020603050405020304" pitchFamily="18" charset="0"/>
+            </a:endParaRPr>
+          </a:p>
+        </p:txBody>
+      </p:sp>
+      <p:sp>
+        <p:nvSpPr>
+          <p:cNvPr id="11" name="矩形 10"/>
+          <p:cNvSpPr/>
+          <p:nvPr/>
+        </p:nvSpPr>
+        <p:spPr>
+          <a:xfrm flipH="1">
+            <a:off x="2589847" y="5390019"/>
+            <a:ext cx="1569253" cy="276999"/>
+          </a:xfrm>
+          <a:prstGeom prst="rect">
+            <a:avLst/>
+          </a:prstGeom>
+        </p:spPr>
+        <p:txBody>
+          <a:bodyPr wrap="square">
+            <a:spAutoFit/>
+          </a:bodyPr>
+          <a:lstStyle/>
+          <a:p>
+            <a:r>
+              <a:rPr lang="en-US" altLang="zh-CN" sz="1200" b="1" dirty="0" smtClean="0">
+                <a:latin typeface="Times New Roman" panose="02020603050405020304" pitchFamily="18" charset="0"/>
+                <a:cs typeface="Times New Roman" panose="02020603050405020304" pitchFamily="18" charset="0"/>
+              </a:rPr>
+              <a:t>I =</a:t>
+            </a:r>
+            <a:endParaRPr lang="zh-CN" altLang="en-US" sz="1200" b="1" dirty="0">
+              <a:latin typeface="Times New Roman" panose="02020603050405020304" pitchFamily="18" charset="0"/>
+              <a:cs typeface="Times New Roman" panose="02020603050405020304" pitchFamily="18" charset="0"/>
+            </a:endParaRPr>
+          </a:p>
+        </p:txBody>
+      </p:sp>
+      <p:sp>
+        <p:nvSpPr>
+          <p:cNvPr id="12" name="矩形 11"/>
+          <p:cNvSpPr/>
+          <p:nvPr/>
+        </p:nvSpPr>
+        <p:spPr>
+          <a:xfrm flipH="1">
+            <a:off x="6488430" y="5390018"/>
+            <a:ext cx="1569253" cy="276999"/>
+          </a:xfrm>
+          <a:prstGeom prst="rect">
+            <a:avLst/>
+          </a:prstGeom>
+        </p:spPr>
+        <p:txBody>
+          <a:bodyPr wrap="square">
+            <a:spAutoFit/>
+          </a:bodyPr>
+          <a:lstStyle/>
+          <a:p>
+            <a:r>
+              <a:rPr lang="en-US" altLang="zh-CN" sz="1200" b="1" dirty="0" smtClean="0">
+                <a:latin typeface="Times New Roman" panose="02020603050405020304" pitchFamily="18" charset="0"/>
+                <a:cs typeface="Times New Roman" panose="02020603050405020304" pitchFamily="18" charset="0"/>
+              </a:rPr>
+              <a:t>I =</a:t>
+            </a:r>
+            <a:endParaRPr lang="zh-CN" altLang="en-US" sz="1200" b="1" dirty="0">
+              <a:latin typeface="Times New Roman" panose="02020603050405020304" pitchFamily="18" charset="0"/>
+              <a:cs typeface="Times New Roman" panose="02020603050405020304" pitchFamily="18" charset="0"/>
+            </a:endParaRPr>
+          </a:p>
+        </p:txBody>
+      </p:sp>
+      <p:sp>
+        <p:nvSpPr>
+          <p:cNvPr id="13" name="矩形 12"/>
+          <p:cNvSpPr/>
+          <p:nvPr/>
+        </p:nvSpPr>
+        <p:spPr>
+          <a:xfrm>
+            <a:off x="3605102" y="2797433"/>
+            <a:ext cx="1800493" cy="369332"/>
+          </a:xfrm>
+          <a:prstGeom prst="rect">
+            <a:avLst/>
+          </a:prstGeom>
+        </p:spPr>
+        <p:txBody>
+          <a:bodyPr wrap="none">
+            <a:spAutoFit/>
+          </a:bodyPr>
+          <a:lstStyle/>
+          <a:p>
+            <a:r>
+              <a:rPr lang="zh-CN" altLang="en-US" b="1" dirty="0">
+                <a:latin typeface="微软雅黑" panose="020B0503020204020204" pitchFamily="34" charset="-122"/>
+                <a:ea typeface="微软雅黑" panose="020B0503020204020204" pitchFamily="34" charset="-122"/>
+              </a:rPr>
+              <a:t>电化学反应速率</a:t>
+            </a:r>
+            <a:endParaRPr lang="zh-CN" altLang="en-US" dirty="0"/>
+          </a:p>
+        </p:txBody>
+      </p:sp>
     </p:spTree>
     <p:extLst>
       <p:ext uri="{BB962C8B-B14F-4D97-AF65-F5344CB8AC3E}">
-        <p14:creationId xmlns:p14="http://schemas.microsoft.com/office/powerpoint/2010/main" val="1164111951"/>
+        <p14:creationId xmlns:p14="http://schemas.microsoft.com/office/powerpoint/2010/main" val="841909923"/>
       </p:ext>
     </p:extLst>
   </p:cSld>

</xml_diff>

<commit_message>
DOCS: update next content for new adding later
</commit_message>
<xml_diff>
--- a/Report notes/GDL_PorosityDistribution.pptx
+++ b/Report notes/GDL_PorosityDistribution.pptx
@@ -5,7 +5,7 @@
     <p:sldMasterId id="2147483660" r:id="rId1"/>
   </p:sldMasterIdLst>
   <p:notesMasterIdLst>
-    <p:notesMasterId r:id="rId15"/>
+    <p:notesMasterId r:id="rId18"/>
   </p:notesMasterIdLst>
   <p:sldIdLst>
     <p:sldId id="269" r:id="rId2"/>
@@ -18,9 +18,12 @@
     <p:sldId id="264" r:id="rId9"/>
     <p:sldId id="260" r:id="rId10"/>
     <p:sldId id="266" r:id="rId11"/>
-    <p:sldId id="257" r:id="rId12"/>
-    <p:sldId id="263" r:id="rId13"/>
-    <p:sldId id="256" r:id="rId14"/>
+    <p:sldId id="270" r:id="rId12"/>
+    <p:sldId id="257" r:id="rId13"/>
+    <p:sldId id="263" r:id="rId14"/>
+    <p:sldId id="256" r:id="rId15"/>
+    <p:sldId id="271" r:id="rId16"/>
+    <p:sldId id="272" r:id="rId17"/>
   </p:sldIdLst>
   <p:sldSz cx="9144000" cy="6858000" type="screen4x3"/>
   <p:notesSz cx="6858000" cy="9144000"/>
@@ -129,7 +132,7 @@
 
 <file path=ppt/commentAuthors.xml><?xml version="1.0" encoding="utf-8"?>
 <p:cmAuthorLst xmlns:a="http://schemas.openxmlformats.org/drawingml/2006/main" xmlns:r="http://schemas.openxmlformats.org/officeDocument/2006/relationships" xmlns:p="http://schemas.openxmlformats.org/presentationml/2006/main">
-  <p:cmAuthor id="1" name="1" initials="1" lastIdx="29" clrIdx="0">
+  <p:cmAuthor id="1" name="1" initials="1" lastIdx="31" clrIdx="0">
     <p:extLst>
       <p:ext uri="{19B8F6BF-5375-455C-9EA6-DF929625EA0E}">
         <p15:presenceInfo xmlns:p15="http://schemas.microsoft.com/office/powerpoint/2012/main" userId="1" providerId="None"/>
@@ -175,6 +178,26 @@
       <p:ext uri="{C676402C-5697-4E1C-873F-D02D1690AC5C}">
         <p15:threadingInfo xmlns:p15="http://schemas.microsoft.com/office/powerpoint/2012/main" timeZoneBias="-480">
           <p15:parentCm authorId="1" idx="8"/>
+        </p15:threadingInfo>
+      </p:ext>
+    </p:extLst>
+  </p:cm>
+  <p:cm authorId="1" dt="2019-06-05T08:53:05.147" idx="30">
+    <p:pos x="2674" y="2350"/>
+    <p:text>毛细压力的作用具体包括小孔中表面张力的作用和壁面吸附力的作用</p:text>
+    <p:extLst>
+      <p:ext uri="{C676402C-5697-4E1C-873F-D02D1690AC5C}">
+        <p15:threadingInfo xmlns:p15="http://schemas.microsoft.com/office/powerpoint/2012/main" timeZoneBias="-480"/>
+      </p:ext>
+    </p:extLst>
+  </p:cm>
+  <p:cm authorId="1" dt="2019-06-05T08:55:38.029" idx="31">
+    <p:pos x="2674" y="2486"/>
+    <p:text>毛细压力即定义为界面压力差，用YoungeLaplace equation来描述 [Jiao, K. and X. Li, Water transport in polymer electrolyte membrane fuel cells. Progress in Energy and Combustion Science, 2011. 37(3): p. 221-291.][126]</p:text>
+    <p:extLst>
+      <p:ext uri="{C676402C-5697-4E1C-873F-D02D1690AC5C}">
+        <p15:threadingInfo xmlns:p15="http://schemas.microsoft.com/office/powerpoint/2012/main" timeZoneBias="-480">
+          <p15:parentCm authorId="1" idx="30"/>
         </p15:threadingInfo>
       </p:ext>
     </p:extLst>
@@ -403,7 +426,7 @@
           <a:p>
             <a:fld id="{4E31AF11-D304-43EE-B6E4-B029EBD63324}" type="datetimeFigureOut">
               <a:rPr lang="zh-CN" altLang="en-US" smtClean="0"/>
-              <a:t>2019/5/29</a:t>
+              <a:t>2019/6/5</a:t>
             </a:fld>
             <a:endParaRPr lang="zh-CN" altLang="en-US"/>
           </a:p>
@@ -671,6 +694,174 @@
 </p:notesMaster>
 </file>
 
+<file path=ppt/notesSlides/notesSlide1.xml><?xml version="1.0" encoding="utf-8"?>
+<p:notes xmlns:a="http://schemas.openxmlformats.org/drawingml/2006/main" xmlns:r="http://schemas.openxmlformats.org/officeDocument/2006/relationships" xmlns:p="http://schemas.openxmlformats.org/presentationml/2006/main">
+  <p:cSld>
+    <p:spTree>
+      <p:nvGrpSpPr>
+        <p:cNvPr id="1" name=""/>
+        <p:cNvGrpSpPr/>
+        <p:nvPr/>
+      </p:nvGrpSpPr>
+      <p:grpSpPr>
+        <a:xfrm>
+          <a:off x="0" y="0"/>
+          <a:ext cx="0" cy="0"/>
+          <a:chOff x="0" y="0"/>
+          <a:chExt cx="0" cy="0"/>
+        </a:xfrm>
+      </p:grpSpPr>
+      <p:sp>
+        <p:nvSpPr>
+          <p:cNvPr id="2" name="幻灯片图像占位符 1"/>
+          <p:cNvSpPr>
+            <a:spLocks noGrp="1" noRot="1" noChangeAspect="1"/>
+          </p:cNvSpPr>
+          <p:nvPr>
+            <p:ph type="sldImg"/>
+          </p:nvPr>
+        </p:nvSpPr>
+        <p:spPr/>
+      </p:sp>
+      <p:sp>
+        <p:nvSpPr>
+          <p:cNvPr id="3" name="备注占位符 2"/>
+          <p:cNvSpPr>
+            <a:spLocks noGrp="1"/>
+          </p:cNvSpPr>
+          <p:nvPr>
+            <p:ph type="body" idx="1"/>
+          </p:nvPr>
+        </p:nvSpPr>
+        <p:spPr/>
+        <p:txBody>
+          <a:bodyPr/>
+          <a:lstStyle/>
+          <a:p>
+            <a:endParaRPr lang="zh-CN" altLang="en-US" noProof="0" dirty="0"/>
+          </a:p>
+        </p:txBody>
+      </p:sp>
+      <p:sp>
+        <p:nvSpPr>
+          <p:cNvPr id="4" name="灯片编号占位符 3"/>
+          <p:cNvSpPr>
+            <a:spLocks noGrp="1"/>
+          </p:cNvSpPr>
+          <p:nvPr>
+            <p:ph type="sldNum" sz="quarter" idx="10"/>
+          </p:nvPr>
+        </p:nvSpPr>
+        <p:spPr/>
+        <p:txBody>
+          <a:bodyPr/>
+          <a:lstStyle/>
+          <a:p>
+            <a:fld id="{C1EFE4FD-7CD6-4399-BE09-0993CCBA1179}" type="slidenum">
+              <a:rPr lang="zh-CN" altLang="en-US" smtClean="0"/>
+              <a:t>1</a:t>
+            </a:fld>
+            <a:endParaRPr lang="zh-CN" altLang="en-US"/>
+          </a:p>
+        </p:txBody>
+      </p:sp>
+    </p:spTree>
+    <p:extLst>
+      <p:ext uri="{BB962C8B-B14F-4D97-AF65-F5344CB8AC3E}">
+        <p14:creationId xmlns:p14="http://schemas.microsoft.com/office/powerpoint/2010/main" val="3918542830"/>
+      </p:ext>
+    </p:extLst>
+  </p:cSld>
+  <p:clrMapOvr>
+    <a:masterClrMapping/>
+  </p:clrMapOvr>
+</p:notes>
+</file>
+
+<file path=ppt/notesSlides/notesSlide2.xml><?xml version="1.0" encoding="utf-8"?>
+<p:notes xmlns:a="http://schemas.openxmlformats.org/drawingml/2006/main" xmlns:r="http://schemas.openxmlformats.org/officeDocument/2006/relationships" xmlns:p="http://schemas.openxmlformats.org/presentationml/2006/main">
+  <p:cSld>
+    <p:spTree>
+      <p:nvGrpSpPr>
+        <p:cNvPr id="1" name=""/>
+        <p:cNvGrpSpPr/>
+        <p:nvPr/>
+      </p:nvGrpSpPr>
+      <p:grpSpPr>
+        <a:xfrm>
+          <a:off x="0" y="0"/>
+          <a:ext cx="0" cy="0"/>
+          <a:chOff x="0" y="0"/>
+          <a:chExt cx="0" cy="0"/>
+        </a:xfrm>
+      </p:grpSpPr>
+      <p:sp>
+        <p:nvSpPr>
+          <p:cNvPr id="2" name="幻灯片图像占位符 1"/>
+          <p:cNvSpPr>
+            <a:spLocks noGrp="1" noRot="1" noChangeAspect="1"/>
+          </p:cNvSpPr>
+          <p:nvPr>
+            <p:ph type="sldImg"/>
+          </p:nvPr>
+        </p:nvSpPr>
+        <p:spPr/>
+      </p:sp>
+      <p:sp>
+        <p:nvSpPr>
+          <p:cNvPr id="3" name="备注占位符 2"/>
+          <p:cNvSpPr>
+            <a:spLocks noGrp="1"/>
+          </p:cNvSpPr>
+          <p:nvPr>
+            <p:ph type="body" idx="1"/>
+          </p:nvPr>
+        </p:nvSpPr>
+        <p:spPr/>
+        <p:txBody>
+          <a:bodyPr/>
+          <a:lstStyle/>
+          <a:p>
+            <a:endParaRPr lang="zh-CN" altLang="en-US" dirty="0"/>
+          </a:p>
+        </p:txBody>
+      </p:sp>
+      <p:sp>
+        <p:nvSpPr>
+          <p:cNvPr id="4" name="灯片编号占位符 3"/>
+          <p:cNvSpPr>
+            <a:spLocks noGrp="1"/>
+          </p:cNvSpPr>
+          <p:nvPr>
+            <p:ph type="sldNum" sz="quarter" idx="10"/>
+          </p:nvPr>
+        </p:nvSpPr>
+        <p:spPr/>
+        <p:txBody>
+          <a:bodyPr/>
+          <a:lstStyle/>
+          <a:p>
+            <a:fld id="{C1EFE4FD-7CD6-4399-BE09-0993CCBA1179}" type="slidenum">
+              <a:rPr lang="zh-CN" altLang="en-US" smtClean="0"/>
+              <a:t>3</a:t>
+            </a:fld>
+            <a:endParaRPr lang="zh-CN" altLang="en-US"/>
+          </a:p>
+        </p:txBody>
+      </p:sp>
+    </p:spTree>
+    <p:extLst>
+      <p:ext uri="{BB962C8B-B14F-4D97-AF65-F5344CB8AC3E}">
+        <p14:creationId xmlns:p14="http://schemas.microsoft.com/office/powerpoint/2010/main" val="2343748721"/>
+      </p:ext>
+    </p:extLst>
+  </p:cSld>
+  <p:clrMapOvr>
+    <a:masterClrMapping/>
+  </p:clrMapOvr>
+</p:notes>
+</file>
+
 <file path=ppt/slideLayouts/slideLayout1.xml><?xml version="1.0" encoding="utf-8"?>
 <p:sldLayout xmlns:a="http://schemas.openxmlformats.org/drawingml/2006/main" xmlns:r="http://schemas.openxmlformats.org/officeDocument/2006/relationships" xmlns:p="http://schemas.openxmlformats.org/presentationml/2006/main" type="title" preserve="1">
   <p:cSld name="标题幻灯片">
@@ -802,7 +993,7 @@
           <a:p>
             <a:fld id="{0D931F99-1544-4821-BA39-7D82BFF6D049}" type="datetimeFigureOut">
               <a:rPr lang="zh-CN" altLang="en-US" smtClean="0"/>
-              <a:t>2019/5/29</a:t>
+              <a:t>2019/6/5</a:t>
             </a:fld>
             <a:endParaRPr lang="zh-CN" altLang="en-US"/>
           </a:p>
@@ -972,7 +1163,7 @@
           <a:p>
             <a:fld id="{0D931F99-1544-4821-BA39-7D82BFF6D049}" type="datetimeFigureOut">
               <a:rPr lang="zh-CN" altLang="en-US" smtClean="0"/>
-              <a:t>2019/5/29</a:t>
+              <a:t>2019/6/5</a:t>
             </a:fld>
             <a:endParaRPr lang="zh-CN" altLang="en-US"/>
           </a:p>
@@ -1152,7 +1343,7 @@
           <a:p>
             <a:fld id="{0D931F99-1544-4821-BA39-7D82BFF6D049}" type="datetimeFigureOut">
               <a:rPr lang="zh-CN" altLang="en-US" smtClean="0"/>
-              <a:t>2019/5/29</a:t>
+              <a:t>2019/6/5</a:t>
             </a:fld>
             <a:endParaRPr lang="zh-CN" altLang="en-US"/>
           </a:p>
@@ -1322,7 +1513,7 @@
           <a:p>
             <a:fld id="{0D931F99-1544-4821-BA39-7D82BFF6D049}" type="datetimeFigureOut">
               <a:rPr lang="zh-CN" altLang="en-US" smtClean="0"/>
-              <a:t>2019/5/29</a:t>
+              <a:t>2019/6/5</a:t>
             </a:fld>
             <a:endParaRPr lang="zh-CN" altLang="en-US"/>
           </a:p>
@@ -1566,7 +1757,7 @@
           <a:p>
             <a:fld id="{0D931F99-1544-4821-BA39-7D82BFF6D049}" type="datetimeFigureOut">
               <a:rPr lang="zh-CN" altLang="en-US" smtClean="0"/>
-              <a:t>2019/5/29</a:t>
+              <a:t>2019/6/5</a:t>
             </a:fld>
             <a:endParaRPr lang="zh-CN" altLang="en-US"/>
           </a:p>
@@ -1798,7 +1989,7 @@
           <a:p>
             <a:fld id="{0D931F99-1544-4821-BA39-7D82BFF6D049}" type="datetimeFigureOut">
               <a:rPr lang="zh-CN" altLang="en-US" smtClean="0"/>
-              <a:t>2019/5/29</a:t>
+              <a:t>2019/6/5</a:t>
             </a:fld>
             <a:endParaRPr lang="zh-CN" altLang="en-US"/>
           </a:p>
@@ -2165,7 +2356,7 @@
           <a:p>
             <a:fld id="{0D931F99-1544-4821-BA39-7D82BFF6D049}" type="datetimeFigureOut">
               <a:rPr lang="zh-CN" altLang="en-US" smtClean="0"/>
-              <a:t>2019/5/29</a:t>
+              <a:t>2019/6/5</a:t>
             </a:fld>
             <a:endParaRPr lang="zh-CN" altLang="en-US"/>
           </a:p>
@@ -2283,7 +2474,7 @@
           <a:p>
             <a:fld id="{0D931F99-1544-4821-BA39-7D82BFF6D049}" type="datetimeFigureOut">
               <a:rPr lang="zh-CN" altLang="en-US" smtClean="0"/>
-              <a:t>2019/5/29</a:t>
+              <a:t>2019/6/5</a:t>
             </a:fld>
             <a:endParaRPr lang="zh-CN" altLang="en-US"/>
           </a:p>
@@ -2378,7 +2569,7 @@
           <a:p>
             <a:fld id="{0D931F99-1544-4821-BA39-7D82BFF6D049}" type="datetimeFigureOut">
               <a:rPr lang="zh-CN" altLang="en-US" smtClean="0"/>
-              <a:t>2019/5/29</a:t>
+              <a:t>2019/6/5</a:t>
             </a:fld>
             <a:endParaRPr lang="zh-CN" altLang="en-US"/>
           </a:p>
@@ -2655,7 +2846,7 @@
           <a:p>
             <a:fld id="{0D931F99-1544-4821-BA39-7D82BFF6D049}" type="datetimeFigureOut">
               <a:rPr lang="zh-CN" altLang="en-US" smtClean="0"/>
-              <a:t>2019/5/29</a:t>
+              <a:t>2019/6/5</a:t>
             </a:fld>
             <a:endParaRPr lang="zh-CN" altLang="en-US"/>
           </a:p>
@@ -2912,7 +3103,7 @@
           <a:p>
             <a:fld id="{0D931F99-1544-4821-BA39-7D82BFF6D049}" type="datetimeFigureOut">
               <a:rPr lang="zh-CN" altLang="en-US" smtClean="0"/>
-              <a:t>2019/5/29</a:t>
+              <a:t>2019/6/5</a:t>
             </a:fld>
             <a:endParaRPr lang="zh-CN" altLang="en-US"/>
           </a:p>
@@ -3125,7 +3316,7 @@
           <a:p>
             <a:fld id="{0D931F99-1544-4821-BA39-7D82BFF6D049}" type="datetimeFigureOut">
               <a:rPr lang="zh-CN" altLang="en-US" smtClean="0"/>
-              <a:t>2019/5/29</a:t>
+              <a:t>2019/6/5</a:t>
             </a:fld>
             <a:endParaRPr lang="zh-CN" altLang="en-US"/>
           </a:p>
@@ -3539,7 +3730,7 @@
           <p:nvPr/>
         </p:nvPicPr>
         <p:blipFill>
-          <a:blip r:embed="rId2">
+          <a:blip r:embed="rId3">
             <a:extLst>
               <a:ext uri="{28A0092B-C50C-407E-A947-70E740481C1C}">
                 <a14:useLocalDpi xmlns:a14="http://schemas.microsoft.com/office/drawing/2010/main" val="0"/>
@@ -5516,6 +5707,573 @@
 </file>
 
 <file path=ppt/slides/slide11.xml><?xml version="1.0" encoding="utf-8"?>
+<p:sld xmlns:a="http://schemas.openxmlformats.org/drawingml/2006/main" xmlns:r="http://schemas.openxmlformats.org/officeDocument/2006/relationships" xmlns:p="http://schemas.openxmlformats.org/presentationml/2006/main">
+  <p:cSld>
+    <p:spTree>
+      <p:nvGrpSpPr>
+        <p:cNvPr id="1" name=""/>
+        <p:cNvGrpSpPr/>
+        <p:nvPr/>
+      </p:nvGrpSpPr>
+      <p:grpSpPr>
+        <a:xfrm>
+          <a:off x="0" y="0"/>
+          <a:ext cx="0" cy="0"/>
+          <a:chOff x="0" y="0"/>
+          <a:chExt cx="0" cy="0"/>
+        </a:xfrm>
+      </p:grpSpPr>
+      <p:sp>
+        <p:nvSpPr>
+          <p:cNvPr id="11" name="矩形 15"/>
+          <p:cNvSpPr>
+            <a:spLocks noChangeArrowheads="1"/>
+          </p:cNvSpPr>
+          <p:nvPr/>
+        </p:nvSpPr>
+        <p:spPr bwMode="auto">
+          <a:xfrm>
+            <a:off x="6973570" y="-52388"/>
+            <a:ext cx="2159566" cy="738664"/>
+          </a:xfrm>
+          <a:prstGeom prst="rect">
+            <a:avLst/>
+          </a:prstGeom>
+          <a:noFill/>
+          <a:ln>
+            <a:noFill/>
+          </a:ln>
+          <a:extLst>
+            <a:ext uri="{909E8E84-426E-40DD-AFC4-6F175D3DCCD1}">
+              <a14:hiddenFill xmlns:a14="http://schemas.microsoft.com/office/drawing/2010/main">
+                <a:solidFill>
+                  <a:srgbClr val="FFFFFF"/>
+                </a:solidFill>
+              </a14:hiddenFill>
+            </a:ext>
+            <a:ext uri="{91240B29-F687-4F45-9708-019B960494DF}">
+              <a14:hiddenLine xmlns:a14="http://schemas.microsoft.com/office/drawing/2010/main" w="9525">
+                <a:solidFill>
+                  <a:srgbClr val="000000"/>
+                </a:solidFill>
+                <a:miter lim="800000"/>
+                <a:headEnd/>
+                <a:tailEnd/>
+              </a14:hiddenLine>
+            </a:ext>
+          </a:extLst>
+        </p:spPr>
+        <p:txBody>
+          <a:bodyPr wrap="none">
+            <a:spAutoFit/>
+          </a:bodyPr>
+          <a:lstStyle>
+            <a:lvl1pPr>
+              <a:spcBef>
+                <a:spcPct val="20000"/>
+              </a:spcBef>
+              <a:buFont typeface="Arial" panose="020B0604020202020204" pitchFamily="34" charset="0"/>
+              <a:buChar char="•"/>
+              <a:defRPr sz="3200">
+                <a:solidFill>
+                  <a:schemeClr val="tx1"/>
+                </a:solidFill>
+                <a:latin typeface="Calibri" panose="020F0502020204030204" pitchFamily="34" charset="0"/>
+                <a:ea typeface="宋体" panose="02010600030101010101" pitchFamily="2" charset="-122"/>
+                <a:sym typeface="Calibri" panose="020F0502020204030204" pitchFamily="34" charset="0"/>
+              </a:defRPr>
+            </a:lvl1pPr>
+            <a:lvl2pPr marL="742950" indent="-285750">
+              <a:spcBef>
+                <a:spcPct val="20000"/>
+              </a:spcBef>
+              <a:buFont typeface="Arial" panose="020B0604020202020204" pitchFamily="34" charset="0"/>
+              <a:buChar char="–"/>
+              <a:defRPr sz="2800">
+                <a:solidFill>
+                  <a:schemeClr val="tx1"/>
+                </a:solidFill>
+                <a:latin typeface="Calibri" panose="020F0502020204030204" pitchFamily="34" charset="0"/>
+                <a:ea typeface="宋体" panose="02010600030101010101" pitchFamily="2" charset="-122"/>
+                <a:sym typeface="Calibri" panose="020F0502020204030204" pitchFamily="34" charset="0"/>
+              </a:defRPr>
+            </a:lvl2pPr>
+            <a:lvl3pPr marL="1143000" indent="-228600">
+              <a:spcBef>
+                <a:spcPct val="20000"/>
+              </a:spcBef>
+              <a:buFont typeface="Arial" panose="020B0604020202020204" pitchFamily="34" charset="0"/>
+              <a:buChar char="•"/>
+              <a:defRPr sz="2400">
+                <a:solidFill>
+                  <a:schemeClr val="tx1"/>
+                </a:solidFill>
+                <a:latin typeface="Calibri" panose="020F0502020204030204" pitchFamily="34" charset="0"/>
+                <a:ea typeface="宋体" panose="02010600030101010101" pitchFamily="2" charset="-122"/>
+                <a:sym typeface="Calibri" panose="020F0502020204030204" pitchFamily="34" charset="0"/>
+              </a:defRPr>
+            </a:lvl3pPr>
+            <a:lvl4pPr marL="1600200" indent="-228600">
+              <a:spcBef>
+                <a:spcPct val="20000"/>
+              </a:spcBef>
+              <a:buFont typeface="Arial" panose="020B0604020202020204" pitchFamily="34" charset="0"/>
+              <a:buChar char="–"/>
+              <a:defRPr sz="2000">
+                <a:solidFill>
+                  <a:schemeClr val="tx1"/>
+                </a:solidFill>
+                <a:latin typeface="Calibri" panose="020F0502020204030204" pitchFamily="34" charset="0"/>
+                <a:ea typeface="宋体" panose="02010600030101010101" pitchFamily="2" charset="-122"/>
+                <a:sym typeface="Calibri" panose="020F0502020204030204" pitchFamily="34" charset="0"/>
+              </a:defRPr>
+            </a:lvl4pPr>
+            <a:lvl5pPr marL="2057400" indent="-228600">
+              <a:spcBef>
+                <a:spcPct val="20000"/>
+              </a:spcBef>
+              <a:buFont typeface="Arial" panose="020B0604020202020204" pitchFamily="34" charset="0"/>
+              <a:buChar char="»"/>
+              <a:defRPr sz="2000">
+                <a:solidFill>
+                  <a:schemeClr val="tx1"/>
+                </a:solidFill>
+                <a:latin typeface="Calibri" panose="020F0502020204030204" pitchFamily="34" charset="0"/>
+                <a:ea typeface="宋体" panose="02010600030101010101" pitchFamily="2" charset="-122"/>
+                <a:sym typeface="Calibri" panose="020F0502020204030204" pitchFamily="34" charset="0"/>
+              </a:defRPr>
+            </a:lvl5pPr>
+            <a:lvl6pPr marL="2514600" indent="-228600" eaLnBrk="0" fontAlgn="base" hangingPunct="0">
+              <a:spcBef>
+                <a:spcPct val="20000"/>
+              </a:spcBef>
+              <a:spcAft>
+                <a:spcPct val="0"/>
+              </a:spcAft>
+              <a:buFont typeface="Arial" panose="020B0604020202020204" pitchFamily="34" charset="0"/>
+              <a:buChar char="»"/>
+              <a:defRPr sz="2000">
+                <a:solidFill>
+                  <a:schemeClr val="tx1"/>
+                </a:solidFill>
+                <a:latin typeface="Calibri" panose="020F0502020204030204" pitchFamily="34" charset="0"/>
+                <a:ea typeface="宋体" panose="02010600030101010101" pitchFamily="2" charset="-122"/>
+                <a:sym typeface="Calibri" panose="020F0502020204030204" pitchFamily="34" charset="0"/>
+              </a:defRPr>
+            </a:lvl6pPr>
+            <a:lvl7pPr marL="2971800" indent="-228600" eaLnBrk="0" fontAlgn="base" hangingPunct="0">
+              <a:spcBef>
+                <a:spcPct val="20000"/>
+              </a:spcBef>
+              <a:spcAft>
+                <a:spcPct val="0"/>
+              </a:spcAft>
+              <a:buFont typeface="Arial" panose="020B0604020202020204" pitchFamily="34" charset="0"/>
+              <a:buChar char="»"/>
+              <a:defRPr sz="2000">
+                <a:solidFill>
+                  <a:schemeClr val="tx1"/>
+                </a:solidFill>
+                <a:latin typeface="Calibri" panose="020F0502020204030204" pitchFamily="34" charset="0"/>
+                <a:ea typeface="宋体" panose="02010600030101010101" pitchFamily="2" charset="-122"/>
+                <a:sym typeface="Calibri" panose="020F0502020204030204" pitchFamily="34" charset="0"/>
+              </a:defRPr>
+            </a:lvl7pPr>
+            <a:lvl8pPr marL="3429000" indent="-228600" eaLnBrk="0" fontAlgn="base" hangingPunct="0">
+              <a:spcBef>
+                <a:spcPct val="20000"/>
+              </a:spcBef>
+              <a:spcAft>
+                <a:spcPct val="0"/>
+              </a:spcAft>
+              <a:buFont typeface="Arial" panose="020B0604020202020204" pitchFamily="34" charset="0"/>
+              <a:buChar char="»"/>
+              <a:defRPr sz="2000">
+                <a:solidFill>
+                  <a:schemeClr val="tx1"/>
+                </a:solidFill>
+                <a:latin typeface="Calibri" panose="020F0502020204030204" pitchFamily="34" charset="0"/>
+                <a:ea typeface="宋体" panose="02010600030101010101" pitchFamily="2" charset="-122"/>
+                <a:sym typeface="Calibri" panose="020F0502020204030204" pitchFamily="34" charset="0"/>
+              </a:defRPr>
+            </a:lvl8pPr>
+            <a:lvl9pPr marL="3886200" indent="-228600" eaLnBrk="0" fontAlgn="base" hangingPunct="0">
+              <a:spcBef>
+                <a:spcPct val="20000"/>
+              </a:spcBef>
+              <a:spcAft>
+                <a:spcPct val="0"/>
+              </a:spcAft>
+              <a:buFont typeface="Arial" panose="020B0604020202020204" pitchFamily="34" charset="0"/>
+              <a:buChar char="»"/>
+              <a:defRPr sz="2000">
+                <a:solidFill>
+                  <a:schemeClr val="tx1"/>
+                </a:solidFill>
+                <a:latin typeface="Calibri" panose="020F0502020204030204" pitchFamily="34" charset="0"/>
+                <a:ea typeface="宋体" panose="02010600030101010101" pitchFamily="2" charset="-122"/>
+                <a:sym typeface="Calibri" panose="020F0502020204030204" pitchFamily="34" charset="0"/>
+              </a:defRPr>
+            </a:lvl9pPr>
+          </a:lstStyle>
+          <a:p>
+            <a:pPr>
+              <a:lnSpc>
+                <a:spcPct val="150000"/>
+              </a:lnSpc>
+              <a:spcBef>
+                <a:spcPct val="0"/>
+              </a:spcBef>
+              <a:buFontTx/>
+              <a:buNone/>
+            </a:pPr>
+            <a:r>
+              <a:rPr lang="en-US" altLang="zh-CN" sz="2800" b="1" dirty="0" smtClean="0">
+                <a:solidFill>
+                  <a:srgbClr val="3333FF"/>
+                </a:solidFill>
+                <a:latin typeface="Times New Roman" panose="02020603050405020304" pitchFamily="18" charset="0"/>
+                <a:ea typeface="微软雅黑" panose="020B0503020204020204" pitchFamily="34" charset="-122"/>
+                <a:cs typeface="Times New Roman" panose="02020603050405020304" pitchFamily="18" charset="0"/>
+              </a:rPr>
+              <a:t>1</a:t>
+            </a:r>
+            <a:r>
+              <a:rPr lang="zh-CN" altLang="en-US" sz="2800" b="1" dirty="0" smtClean="0">
+                <a:solidFill>
+                  <a:srgbClr val="3333FF"/>
+                </a:solidFill>
+                <a:latin typeface="Times New Roman" panose="02020603050405020304" pitchFamily="18" charset="0"/>
+                <a:ea typeface="微软雅黑" panose="020B0503020204020204" pitchFamily="34" charset="-122"/>
+                <a:cs typeface="Times New Roman" panose="02020603050405020304" pitchFamily="18" charset="0"/>
+              </a:rPr>
+              <a:t>、问题描述</a:t>
+            </a:r>
+            <a:endParaRPr lang="zh-CN" altLang="en-US" sz="2800" b="1" dirty="0">
+              <a:solidFill>
+                <a:srgbClr val="3333FF"/>
+              </a:solidFill>
+              <a:latin typeface="微软雅黑" panose="020B0503020204020204" pitchFamily="34" charset="-122"/>
+              <a:ea typeface="微软雅黑" panose="020B0503020204020204" pitchFamily="34" charset="-122"/>
+              <a:cs typeface="Times New Roman" panose="02020603050405020304" pitchFamily="18" charset="0"/>
+            </a:endParaRPr>
+          </a:p>
+        </p:txBody>
+      </p:sp>
+      <p:grpSp>
+        <p:nvGrpSpPr>
+          <p:cNvPr id="12" name="组合 12"/>
+          <p:cNvGrpSpPr>
+            <a:grpSpLocks/>
+          </p:cNvGrpSpPr>
+          <p:nvPr/>
+        </p:nvGrpSpPr>
+        <p:grpSpPr bwMode="auto">
+          <a:xfrm>
+            <a:off x="125413" y="731838"/>
+            <a:ext cx="2868612" cy="465137"/>
+            <a:chOff x="124668" y="732018"/>
+            <a:chExt cx="3120950" cy="465081"/>
+          </a:xfrm>
+        </p:grpSpPr>
+        <p:sp>
+          <p:nvSpPr>
+            <p:cNvPr id="13" name="矩形 12">
+              <a:extLst>
+                <a:ext uri="{FF2B5EF4-FFF2-40B4-BE49-F238E27FC236}">
+                  <a16:creationId xmlns:a16="http://schemas.microsoft.com/office/drawing/2014/main" id="{ACFF976D-C10F-4773-B6C0-A8EF394982B5}"/>
+                </a:ext>
+              </a:extLst>
+            </p:cNvPr>
+            <p:cNvSpPr/>
+            <p:nvPr/>
+          </p:nvSpPr>
+          <p:spPr>
+            <a:xfrm>
+              <a:off x="360713" y="732018"/>
+              <a:ext cx="2884905" cy="455033"/>
+            </a:xfrm>
+            <a:prstGeom prst="rect">
+              <a:avLst/>
+            </a:prstGeom>
+            <a:gradFill flip="none" rotWithShape="0">
+              <a:gsLst>
+                <a:gs pos="0">
+                  <a:srgbClr val="0070C0">
+                    <a:shade val="30000"/>
+                    <a:satMod val="115000"/>
+                  </a:srgbClr>
+                </a:gs>
+                <a:gs pos="50000">
+                  <a:srgbClr val="0070C0">
+                    <a:shade val="67500"/>
+                    <a:satMod val="115000"/>
+                  </a:srgbClr>
+                </a:gs>
+                <a:gs pos="100000">
+                  <a:srgbClr val="0070C0">
+                    <a:shade val="100000"/>
+                    <a:satMod val="115000"/>
+                  </a:srgbClr>
+                </a:gs>
+              </a:gsLst>
+              <a:lin ang="13500000" scaled="1"/>
+              <a:tileRect/>
+            </a:gradFill>
+            <a:scene3d>
+              <a:camera prst="orthographicFront"/>
+              <a:lightRig rig="flat" dir="t"/>
+            </a:scene3d>
+            <a:sp3d prstMaterial="dkEdge">
+              <a:bevelT w="8200" h="38100"/>
+            </a:sp3d>
+          </p:spPr>
+          <p:style>
+            <a:lnRef idx="0">
+              <a:schemeClr val="lt1">
+                <a:hueOff val="0"/>
+                <a:satOff val="0"/>
+                <a:lumOff val="0"/>
+                <a:alphaOff val="0"/>
+              </a:schemeClr>
+            </a:lnRef>
+            <a:fillRef idx="2">
+              <a:scrgbClr r="0" g="0" b="0"/>
+            </a:fillRef>
+            <a:effectRef idx="1">
+              <a:schemeClr val="accent6">
+                <a:shade val="80000"/>
+                <a:hueOff val="0"/>
+                <a:satOff val="0"/>
+                <a:lumOff val="0"/>
+                <a:alphaOff val="0"/>
+              </a:schemeClr>
+            </a:effectRef>
+            <a:fontRef idx="minor">
+              <a:schemeClr val="dk1"/>
+            </a:fontRef>
+          </p:style>
+        </p:sp>
+        <p:sp>
+          <p:nvSpPr>
+            <p:cNvPr id="14" name="文本框 13">
+              <a:extLst>
+                <a:ext uri="{FF2B5EF4-FFF2-40B4-BE49-F238E27FC236}">
+                  <a16:creationId xmlns:a16="http://schemas.microsoft.com/office/drawing/2014/main" id="{3583D282-40E0-4567-95F3-C6CD9EBD4A2A}"/>
+                </a:ext>
+              </a:extLst>
+            </p:cNvPr>
+            <p:cNvSpPr txBox="1"/>
+            <p:nvPr/>
+          </p:nvSpPr>
+          <p:spPr>
+            <a:xfrm>
+              <a:off x="124668" y="742066"/>
+              <a:ext cx="3035630" cy="455033"/>
+            </a:xfrm>
+            <a:prstGeom prst="rect">
+              <a:avLst/>
+            </a:prstGeom>
+            <a:scene3d>
+              <a:camera prst="orthographicFront"/>
+              <a:lightRig rig="flat" dir="t"/>
+            </a:scene3d>
+            <a:sp3d/>
+          </p:spPr>
+          <p:style>
+            <a:lnRef idx="0">
+              <a:scrgbClr r="0" g="0" b="0"/>
+            </a:lnRef>
+            <a:fillRef idx="0">
+              <a:scrgbClr r="0" g="0" b="0"/>
+            </a:fillRef>
+            <a:effectRef idx="0">
+              <a:scrgbClr r="0" g="0" b="0"/>
+            </a:effectRef>
+            <a:fontRef idx="minor">
+              <a:schemeClr val="dk1"/>
+            </a:fontRef>
+          </p:style>
+          <p:txBody>
+            <a:bodyPr lIns="361183" tIns="55880" rIns="55880" bIns="55880" spcCol="1270" anchor="ctr"/>
+            <a:lstStyle/>
+            <a:p>
+              <a:pPr defTabSz="977900">
+                <a:lnSpc>
+                  <a:spcPct val="90000"/>
+                </a:lnSpc>
+                <a:spcAft>
+                  <a:spcPts val="0"/>
+                </a:spcAft>
+                <a:tabLst>
+                  <a:tab pos="444500" algn="l"/>
+                </a:tabLst>
+                <a:defRPr/>
+              </a:pPr>
+              <a:r>
+                <a:rPr lang="zh-CN" altLang="en-US" sz="2200" dirty="0" smtClean="0">
+                  <a:solidFill>
+                    <a:schemeClr val="bg1"/>
+                  </a:solidFill>
+                  <a:latin typeface="Times New Roman" panose="02020603050405020304" pitchFamily="18" charset="0"/>
+                  <a:ea typeface="微软雅黑" panose="020B0503020204020204" pitchFamily="34" charset="-122"/>
+                  <a:cs typeface="Times New Roman" panose="02020603050405020304" pitchFamily="18" charset="0"/>
+                </a:rPr>
+                <a:t>（</a:t>
+              </a:r>
+              <a:r>
+                <a:rPr lang="en-US" altLang="zh-CN" sz="2200" dirty="0" smtClean="0">
+                  <a:solidFill>
+                    <a:schemeClr val="bg1"/>
+                  </a:solidFill>
+                  <a:latin typeface="Times New Roman" panose="02020603050405020304" pitchFamily="18" charset="0"/>
+                  <a:ea typeface="微软雅黑" panose="020B0503020204020204" pitchFamily="34" charset="-122"/>
+                  <a:cs typeface="Times New Roman" panose="02020603050405020304" pitchFamily="18" charset="0"/>
+                </a:rPr>
+                <a:t>3</a:t>
+              </a:r>
+              <a:r>
+                <a:rPr lang="zh-CN" altLang="en-US" sz="2200" dirty="0" smtClean="0">
+                  <a:solidFill>
+                    <a:schemeClr val="bg1"/>
+                  </a:solidFill>
+                  <a:latin typeface="Times New Roman" panose="02020603050405020304" pitchFamily="18" charset="0"/>
+                  <a:ea typeface="微软雅黑" panose="020B0503020204020204" pitchFamily="34" charset="-122"/>
+                  <a:cs typeface="Times New Roman" panose="02020603050405020304" pitchFamily="18" charset="0"/>
+                </a:rPr>
+                <a:t>）</a:t>
+              </a:r>
+              <a:r>
+                <a:rPr lang="zh-CN" altLang="en-US" sz="2200" dirty="0" smtClean="0">
+                  <a:solidFill>
+                    <a:schemeClr val="bg1"/>
+                  </a:solidFill>
+                  <a:latin typeface="微软雅黑" panose="020B0503020204020204" pitchFamily="34" charset="-122"/>
+                  <a:ea typeface="微软雅黑" panose="020B0503020204020204" pitchFamily="34" charset="-122"/>
+                  <a:cs typeface="Times New Roman" panose="02020603050405020304" pitchFamily="18" charset="0"/>
+                </a:rPr>
+                <a:t>模型</a:t>
+              </a:r>
+              <a:r>
+                <a:rPr lang="zh-CN" altLang="en-US" sz="2200" dirty="0">
+                  <a:solidFill>
+                    <a:schemeClr val="bg1"/>
+                  </a:solidFill>
+                  <a:latin typeface="微软雅黑" panose="020B0503020204020204" pitchFamily="34" charset="-122"/>
+                  <a:ea typeface="微软雅黑" panose="020B0503020204020204" pitchFamily="34" charset="-122"/>
+                  <a:cs typeface="Times New Roman" panose="02020603050405020304" pitchFamily="18" charset="0"/>
+                </a:rPr>
+                <a:t>验证</a:t>
+              </a:r>
+              <a:endParaRPr lang="zh-CN" altLang="en-US" sz="2200" dirty="0">
+                <a:solidFill>
+                  <a:schemeClr val="bg1"/>
+                </a:solidFill>
+                <a:latin typeface="微软雅黑" panose="020B0503020204020204" pitchFamily="34" charset="-122"/>
+                <a:ea typeface="微软雅黑" panose="020B0503020204020204" pitchFamily="34" charset="-122"/>
+              </a:endParaRPr>
+            </a:p>
+          </p:txBody>
+        </p:sp>
+      </p:grpSp>
+      <p:sp>
+        <p:nvSpPr>
+          <p:cNvPr id="15" name="矩形 14"/>
+          <p:cNvSpPr/>
+          <p:nvPr/>
+        </p:nvSpPr>
+        <p:spPr>
+          <a:xfrm>
+            <a:off x="1046590" y="2421493"/>
+            <a:ext cx="6646435" cy="369332"/>
+          </a:xfrm>
+          <a:prstGeom prst="rect">
+            <a:avLst/>
+          </a:prstGeom>
+        </p:spPr>
+        <p:txBody>
+          <a:bodyPr wrap="none">
+            <a:spAutoFit/>
+          </a:bodyPr>
+          <a:lstStyle/>
+          <a:p>
+            <a:r>
+              <a:rPr lang="zh-CN" altLang="en-US" b="1" dirty="0" smtClean="0">
+                <a:latin typeface="微软雅黑" panose="020B0503020204020204" pitchFamily="34" charset="-122"/>
+                <a:ea typeface="微软雅黑" panose="020B0503020204020204" pitchFamily="34" charset="-122"/>
+              </a:rPr>
+              <a:t>不同工况</a:t>
+            </a:r>
+            <a:r>
+              <a:rPr lang="en-US" altLang="zh-CN" b="1" dirty="0" smtClean="0">
+                <a:latin typeface="微软雅黑" panose="020B0503020204020204" pitchFamily="34" charset="-122"/>
+                <a:ea typeface="微软雅黑" panose="020B0503020204020204" pitchFamily="34" charset="-122"/>
+              </a:rPr>
+              <a:t>(T, p, RH)</a:t>
+            </a:r>
+            <a:r>
+              <a:rPr lang="zh-CN" altLang="en-US" b="1" dirty="0" smtClean="0">
+                <a:latin typeface="微软雅黑" panose="020B0503020204020204" pitchFamily="34" charset="-122"/>
+                <a:ea typeface="微软雅黑" panose="020B0503020204020204" pitchFamily="34" charset="-122"/>
+              </a:rPr>
+              <a:t>下</a:t>
+            </a:r>
+            <a:r>
+              <a:rPr lang="en-US" altLang="zh-CN" b="1" dirty="0" smtClean="0">
+                <a:latin typeface="微软雅黑" panose="020B0503020204020204" pitchFamily="34" charset="-122"/>
+                <a:ea typeface="微软雅黑" panose="020B0503020204020204" pitchFamily="34" charset="-122"/>
+              </a:rPr>
+              <a:t>iv</a:t>
+            </a:r>
+            <a:r>
+              <a:rPr lang="zh-CN" altLang="en-US" b="1" dirty="0" smtClean="0">
+                <a:latin typeface="微软雅黑" panose="020B0503020204020204" pitchFamily="34" charset="-122"/>
+                <a:ea typeface="微软雅黑" panose="020B0503020204020204" pitchFamily="34" charset="-122"/>
+              </a:rPr>
+              <a:t>和</a:t>
+            </a:r>
+            <a:r>
+              <a:rPr lang="en-US" altLang="zh-CN" b="1" dirty="0" smtClean="0">
+                <a:latin typeface="微软雅黑" panose="020B0503020204020204" pitchFamily="34" charset="-122"/>
+                <a:ea typeface="微软雅黑" panose="020B0503020204020204" pitchFamily="34" charset="-122"/>
+              </a:rPr>
+              <a:t>O2</a:t>
+            </a:r>
+            <a:r>
+              <a:rPr lang="zh-CN" altLang="en-US" b="1" dirty="0" smtClean="0">
+                <a:latin typeface="微软雅黑" panose="020B0503020204020204" pitchFamily="34" charset="-122"/>
+                <a:ea typeface="微软雅黑" panose="020B0503020204020204" pitchFamily="34" charset="-122"/>
+              </a:rPr>
+              <a:t>浓度分布、水饱和度厚度方向分布</a:t>
+            </a:r>
+            <a:endParaRPr lang="zh-CN" altLang="en-US" b="1" dirty="0">
+              <a:latin typeface="微软雅黑" panose="020B0503020204020204" pitchFamily="34" charset="-122"/>
+              <a:ea typeface="微软雅黑" panose="020B0503020204020204" pitchFamily="34" charset="-122"/>
+            </a:endParaRPr>
+          </a:p>
+        </p:txBody>
+      </p:sp>
+    </p:spTree>
+    <p:extLst>
+      <p:ext uri="{BB962C8B-B14F-4D97-AF65-F5344CB8AC3E}">
+        <p14:creationId xmlns:p14="http://schemas.microsoft.com/office/powerpoint/2010/main" val="2808630033"/>
+      </p:ext>
+    </p:extLst>
+  </p:cSld>
+  <p:clrMapOvr>
+    <a:masterClrMapping/>
+  </p:clrMapOvr>
+  <p:timing>
+    <p:tnLst>
+      <p:par>
+        <p:cTn id="1" dur="indefinite" restart="never" nodeType="tmRoot"/>
+      </p:par>
+    </p:tnLst>
+  </p:timing>
+</p:sld>
+</file>
+
+<file path=ppt/slides/slide12.xml><?xml version="1.0" encoding="utf-8"?>
 <p:sld xmlns:a="http://schemas.openxmlformats.org/drawingml/2006/main" xmlns:r="http://schemas.openxmlformats.org/officeDocument/2006/relationships" xmlns:p="http://schemas.openxmlformats.org/presentationml/2006/main">
   <p:cSld>
     <p:spTree>
@@ -6009,7 +6767,7 @@
 </p:sld>
 </file>
 
-<file path=ppt/slides/slide12.xml><?xml version="1.0" encoding="utf-8"?>
+<file path=ppt/slides/slide13.xml><?xml version="1.0" encoding="utf-8"?>
 <p:sld xmlns:a="http://schemas.openxmlformats.org/drawingml/2006/main" xmlns:r="http://schemas.openxmlformats.org/officeDocument/2006/relationships" xmlns:p="http://schemas.openxmlformats.org/presentationml/2006/main">
   <p:cSld>
     <p:spTree>
@@ -6210,10 +6968,17 @@
   <p:clrMapOvr>
     <a:masterClrMapping/>
   </p:clrMapOvr>
+  <p:timing>
+    <p:tnLst>
+      <p:par>
+        <p:cTn id="1" dur="indefinite" restart="never" nodeType="tmRoot"/>
+      </p:par>
+    </p:tnLst>
+  </p:timing>
 </p:sld>
 </file>
 
-<file path=ppt/slides/slide13.xml><?xml version="1.0" encoding="utf-8"?>
+<file path=ppt/slides/slide14.xml><?xml version="1.0" encoding="utf-8"?>
 <p:sld xmlns:a="http://schemas.openxmlformats.org/drawingml/2006/main" xmlns:r="http://schemas.openxmlformats.org/officeDocument/2006/relationships" xmlns:p="http://schemas.openxmlformats.org/presentationml/2006/main">
   <p:cSld>
     <p:spTree>
@@ -6446,6 +7211,252 @@
   <p:clrMapOvr>
     <a:masterClrMapping/>
   </p:clrMapOvr>
+  <p:timing>
+    <p:tnLst>
+      <p:par>
+        <p:cTn id="1" dur="indefinite" restart="never" nodeType="tmRoot"/>
+      </p:par>
+    </p:tnLst>
+  </p:timing>
+</p:sld>
+</file>
+
+<file path=ppt/slides/slide15.xml><?xml version="1.0" encoding="utf-8"?>
+<p:sld xmlns:a="http://schemas.openxmlformats.org/drawingml/2006/main" xmlns:r="http://schemas.openxmlformats.org/officeDocument/2006/relationships" xmlns:p="http://schemas.openxmlformats.org/presentationml/2006/main">
+  <p:cSld>
+    <p:spTree>
+      <p:nvGrpSpPr>
+        <p:cNvPr id="1" name=""/>
+        <p:cNvGrpSpPr/>
+        <p:nvPr/>
+      </p:nvGrpSpPr>
+      <p:grpSpPr>
+        <a:xfrm>
+          <a:off x="0" y="0"/>
+          <a:ext cx="0" cy="0"/>
+          <a:chOff x="0" y="0"/>
+          <a:chExt cx="0" cy="0"/>
+        </a:xfrm>
+      </p:grpSpPr>
+      <p:sp>
+        <p:nvSpPr>
+          <p:cNvPr id="7" name="文本框 6"/>
+          <p:cNvSpPr txBox="1"/>
+          <p:nvPr/>
+        </p:nvSpPr>
+        <p:spPr>
+          <a:xfrm>
+            <a:off x="205740" y="297180"/>
+            <a:ext cx="7109460" cy="461665"/>
+          </a:xfrm>
+          <a:prstGeom prst="rect">
+            <a:avLst/>
+          </a:prstGeom>
+          <a:noFill/>
+        </p:spPr>
+        <p:txBody>
+          <a:bodyPr wrap="square" rtlCol="0">
+            <a:spAutoFit/>
+          </a:bodyPr>
+          <a:lstStyle/>
+          <a:p>
+            <a:r>
+              <a:rPr lang="zh-CN" altLang="en-US" sz="2400" b="1" dirty="0" smtClean="0">
+                <a:latin typeface="微软雅黑" panose="020B0503020204020204" pitchFamily="34" charset="-122"/>
+                <a:ea typeface="微软雅黑" panose="020B0503020204020204" pitchFamily="34" charset="-122"/>
+              </a:rPr>
+              <a:t>下一步</a:t>
+            </a:r>
+            <a:endParaRPr lang="en-US" altLang="zh-CN" sz="2400" b="1" dirty="0" smtClean="0">
+              <a:latin typeface="微软雅黑" panose="020B0503020204020204" pitchFamily="34" charset="-122"/>
+              <a:ea typeface="微软雅黑" panose="020B0503020204020204" pitchFamily="34" charset="-122"/>
+            </a:endParaRPr>
+          </a:p>
+        </p:txBody>
+      </p:sp>
+      <p:sp>
+        <p:nvSpPr>
+          <p:cNvPr id="3" name="矩形 2"/>
+          <p:cNvSpPr/>
+          <p:nvPr/>
+        </p:nvSpPr>
+        <p:spPr>
+          <a:xfrm>
+            <a:off x="827612" y="1395353"/>
+            <a:ext cx="6511719" cy="646331"/>
+          </a:xfrm>
+          <a:prstGeom prst="rect">
+            <a:avLst/>
+          </a:prstGeom>
+        </p:spPr>
+        <p:txBody>
+          <a:bodyPr wrap="none">
+            <a:spAutoFit/>
+          </a:bodyPr>
+          <a:lstStyle/>
+          <a:p>
+            <a:pPr marL="342900" indent="-342900">
+              <a:buAutoNum type="arabicPeriod"/>
+            </a:pPr>
+            <a:r>
+              <a:rPr lang="en-US" altLang="zh-CN" b="1" dirty="0" smtClean="0">
+                <a:latin typeface="微软雅黑" panose="020B0503020204020204" pitchFamily="34" charset="-122"/>
+                <a:ea typeface="微软雅黑" panose="020B0503020204020204" pitchFamily="34" charset="-122"/>
+              </a:rPr>
+              <a:t>BP</a:t>
+            </a:r>
+            <a:r>
+              <a:rPr lang="zh-CN" altLang="en-US" b="1" dirty="0" smtClean="0">
+                <a:latin typeface="微软雅黑" panose="020B0503020204020204" pitchFamily="34" charset="-122"/>
+                <a:ea typeface="微软雅黑" panose="020B0503020204020204" pitchFamily="34" charset="-122"/>
+              </a:rPr>
+              <a:t>区域下和流道下的液态水分布没有明显差别</a:t>
+            </a:r>
+            <a:endParaRPr lang="en-US" altLang="zh-CN" b="1" dirty="0" smtClean="0">
+              <a:latin typeface="微软雅黑" panose="020B0503020204020204" pitchFamily="34" charset="-122"/>
+              <a:ea typeface="微软雅黑" panose="020B0503020204020204" pitchFamily="34" charset="-122"/>
+            </a:endParaRPr>
+          </a:p>
+          <a:p>
+            <a:pPr marL="342900" indent="-342900">
+              <a:buAutoNum type="arabicPeriod"/>
+            </a:pPr>
+            <a:r>
+              <a:rPr lang="zh-CN" altLang="en-US" b="1" dirty="0">
+                <a:latin typeface="微软雅黑" panose="020B0503020204020204" pitchFamily="34" charset="-122"/>
+                <a:ea typeface="微软雅黑" panose="020B0503020204020204" pitchFamily="34" charset="-122"/>
+              </a:rPr>
+              <a:t>厚度方向上，阴极和阳极的液态水饱和度没有明显的差别</a:t>
+            </a:r>
+            <a:endParaRPr lang="zh-CN" altLang="en-US" b="1" dirty="0">
+              <a:latin typeface="微软雅黑" panose="020B0503020204020204" pitchFamily="34" charset="-122"/>
+              <a:ea typeface="微软雅黑" panose="020B0503020204020204" pitchFamily="34" charset="-122"/>
+            </a:endParaRPr>
+          </a:p>
+        </p:txBody>
+      </p:sp>
+    </p:spTree>
+    <p:extLst>
+      <p:ext uri="{BB962C8B-B14F-4D97-AF65-F5344CB8AC3E}">
+        <p14:creationId xmlns:p14="http://schemas.microsoft.com/office/powerpoint/2010/main" val="2550507257"/>
+      </p:ext>
+    </p:extLst>
+  </p:cSld>
+  <p:clrMapOvr>
+    <a:masterClrMapping/>
+  </p:clrMapOvr>
+  <p:timing>
+    <p:tnLst>
+      <p:par>
+        <p:cTn id="1" dur="indefinite" restart="never" nodeType="tmRoot"/>
+      </p:par>
+    </p:tnLst>
+  </p:timing>
+</p:sld>
+</file>
+
+<file path=ppt/slides/slide16.xml><?xml version="1.0" encoding="utf-8"?>
+<p:sld xmlns:a="http://schemas.openxmlformats.org/drawingml/2006/main" xmlns:r="http://schemas.openxmlformats.org/officeDocument/2006/relationships" xmlns:p="http://schemas.openxmlformats.org/presentationml/2006/main">
+  <p:cSld>
+    <p:spTree>
+      <p:nvGrpSpPr>
+        <p:cNvPr id="1" name=""/>
+        <p:cNvGrpSpPr/>
+        <p:nvPr/>
+      </p:nvGrpSpPr>
+      <p:grpSpPr>
+        <a:xfrm>
+          <a:off x="0" y="0"/>
+          <a:ext cx="0" cy="0"/>
+          <a:chOff x="0" y="0"/>
+          <a:chExt cx="0" cy="0"/>
+        </a:xfrm>
+      </p:grpSpPr>
+      <p:sp>
+        <p:nvSpPr>
+          <p:cNvPr id="7" name="文本框 6"/>
+          <p:cNvSpPr txBox="1"/>
+          <p:nvPr/>
+        </p:nvSpPr>
+        <p:spPr>
+          <a:xfrm>
+            <a:off x="205740" y="297180"/>
+            <a:ext cx="7109460" cy="461665"/>
+          </a:xfrm>
+          <a:prstGeom prst="rect">
+            <a:avLst/>
+          </a:prstGeom>
+          <a:noFill/>
+        </p:spPr>
+        <p:txBody>
+          <a:bodyPr wrap="square" rtlCol="0">
+            <a:spAutoFit/>
+          </a:bodyPr>
+          <a:lstStyle/>
+          <a:p>
+            <a:r>
+              <a:rPr lang="zh-CN" altLang="en-US" sz="2400" b="1" dirty="0" smtClean="0">
+                <a:latin typeface="微软雅黑" panose="020B0503020204020204" pitchFamily="34" charset="-122"/>
+                <a:ea typeface="微软雅黑" panose="020B0503020204020204" pitchFamily="34" charset="-122"/>
+              </a:rPr>
+              <a:t>下一步</a:t>
+            </a:r>
+            <a:endParaRPr lang="en-US" altLang="zh-CN" sz="2400" b="1" dirty="0" smtClean="0">
+              <a:latin typeface="微软雅黑" panose="020B0503020204020204" pitchFamily="34" charset="-122"/>
+              <a:ea typeface="微软雅黑" panose="020B0503020204020204" pitchFamily="34" charset="-122"/>
+            </a:endParaRPr>
+          </a:p>
+        </p:txBody>
+      </p:sp>
+      <p:sp>
+        <p:nvSpPr>
+          <p:cNvPr id="3" name="矩形 2"/>
+          <p:cNvSpPr/>
+          <p:nvPr/>
+        </p:nvSpPr>
+        <p:spPr>
+          <a:xfrm>
+            <a:off x="1787732" y="389513"/>
+            <a:ext cx="2954655" cy="369332"/>
+          </a:xfrm>
+          <a:prstGeom prst="rect">
+            <a:avLst/>
+          </a:prstGeom>
+        </p:spPr>
+        <p:txBody>
+          <a:bodyPr wrap="none">
+            <a:spAutoFit/>
+          </a:bodyPr>
+          <a:lstStyle/>
+          <a:p>
+            <a:r>
+              <a:rPr lang="zh-CN" altLang="en-US" b="1" dirty="0" smtClean="0">
+                <a:latin typeface="微软雅黑" panose="020B0503020204020204" pitchFamily="34" charset="-122"/>
+                <a:ea typeface="微软雅黑" panose="020B0503020204020204" pitchFamily="34" charset="-122"/>
+              </a:rPr>
+              <a:t>用于优化的目标和算法选择</a:t>
+            </a:r>
+            <a:endParaRPr lang="zh-CN" altLang="en-US" dirty="0"/>
+          </a:p>
+        </p:txBody>
+      </p:sp>
+    </p:spTree>
+    <p:extLst>
+      <p:ext uri="{BB962C8B-B14F-4D97-AF65-F5344CB8AC3E}">
+        <p14:creationId xmlns:p14="http://schemas.microsoft.com/office/powerpoint/2010/main" val="371218542"/>
+      </p:ext>
+    </p:extLst>
+  </p:cSld>
+  <p:clrMapOvr>
+    <a:masterClrMapping/>
+  </p:clrMapOvr>
+  <p:timing>
+    <p:tnLst>
+      <p:par>
+        <p:cTn id="1" dur="indefinite" restart="never" nodeType="tmRoot"/>
+      </p:par>
+    </p:tnLst>
+  </p:timing>
 </p:sld>
 </file>
 
@@ -8186,7 +9197,7 @@
           <p:nvPr/>
         </p:nvPicPr>
         <p:blipFill>
-          <a:blip r:embed="rId2"/>
+          <a:blip r:embed="rId3"/>
           <a:stretch>
             <a:fillRect/>
           </a:stretch>
@@ -8210,7 +9221,7 @@
           <p:nvPr/>
         </p:nvPicPr>
         <p:blipFill>
-          <a:blip r:embed="rId3"/>
+          <a:blip r:embed="rId4"/>
           <a:stretch>
             <a:fillRect/>
           </a:stretch>
@@ -8234,7 +9245,7 @@
           <p:nvPr/>
         </p:nvPicPr>
         <p:blipFill>
-          <a:blip r:embed="rId4"/>
+          <a:blip r:embed="rId5"/>
           <a:stretch>
             <a:fillRect/>
           </a:stretch>
@@ -8258,7 +9269,7 @@
           <p:nvPr/>
         </p:nvPicPr>
         <p:blipFill>
-          <a:blip r:embed="rId5"/>
+          <a:blip r:embed="rId6"/>
           <a:stretch>
             <a:fillRect/>
           </a:stretch>
@@ -8282,7 +9293,7 @@
           <p:nvPr/>
         </p:nvPicPr>
         <p:blipFill>
-          <a:blip r:embed="rId6"/>
+          <a:blip r:embed="rId7"/>
           <a:stretch>
             <a:fillRect/>
           </a:stretch>
@@ -8306,7 +9317,7 @@
           <p:nvPr/>
         </p:nvPicPr>
         <p:blipFill>
-          <a:blip r:embed="rId7"/>
+          <a:blip r:embed="rId8"/>
           <a:stretch>
             <a:fillRect/>
           </a:stretch>
@@ -8330,7 +9341,7 @@
           <p:nvPr/>
         </p:nvPicPr>
         <p:blipFill>
-          <a:blip r:embed="rId8"/>
+          <a:blip r:embed="rId9"/>
           <a:stretch>
             <a:fillRect/>
           </a:stretch>
@@ -8354,7 +9365,7 @@
           <p:nvPr/>
         </p:nvPicPr>
         <p:blipFill>
-          <a:blip r:embed="rId9"/>
+          <a:blip r:embed="rId10"/>
           <a:stretch>
             <a:fillRect/>
           </a:stretch>
@@ -8378,7 +9389,7 @@
           <p:nvPr/>
         </p:nvPicPr>
         <p:blipFill>
-          <a:blip r:embed="rId10"/>
+          <a:blip r:embed="rId11"/>
           <a:stretch>
             <a:fillRect/>
           </a:stretch>
@@ -8402,7 +9413,7 @@
           <p:nvPr/>
         </p:nvPicPr>
         <p:blipFill>
-          <a:blip r:embed="rId11"/>
+          <a:blip r:embed="rId12"/>
           <a:stretch>
             <a:fillRect/>
           </a:stretch>
@@ -8426,7 +9437,7 @@
           <p:nvPr/>
         </p:nvPicPr>
         <p:blipFill>
-          <a:blip r:embed="rId12"/>
+          <a:blip r:embed="rId13"/>
           <a:stretch>
             <a:fillRect/>
           </a:stretch>
@@ -8450,7 +9461,7 @@
           <p:nvPr/>
         </p:nvPicPr>
         <p:blipFill>
-          <a:blip r:embed="rId13"/>
+          <a:blip r:embed="rId14"/>
           <a:stretch>
             <a:fillRect/>
           </a:stretch>
@@ -8474,7 +9485,7 @@
           <p:nvPr/>
         </p:nvPicPr>
         <p:blipFill>
-          <a:blip r:embed="rId14"/>
+          <a:blip r:embed="rId15"/>
           <a:stretch>
             <a:fillRect/>
           </a:stretch>
@@ -8498,7 +9509,7 @@
           <p:nvPr/>
         </p:nvPicPr>
         <p:blipFill>
-          <a:blip r:embed="rId15"/>
+          <a:blip r:embed="rId16"/>
           <a:stretch>
             <a:fillRect/>
           </a:stretch>
@@ -8522,7 +9533,7 @@
           <p:nvPr/>
         </p:nvPicPr>
         <p:blipFill>
-          <a:blip r:embed="rId16"/>
+          <a:blip r:embed="rId17"/>
           <a:stretch>
             <a:fillRect/>
           </a:stretch>
@@ -8546,7 +9557,7 @@
           <p:nvPr/>
         </p:nvPicPr>
         <p:blipFill>
-          <a:blip r:embed="rId17"/>
+          <a:blip r:embed="rId18"/>
           <a:stretch>
             <a:fillRect/>
           </a:stretch>
@@ -8570,7 +9581,7 @@
           <p:nvPr/>
         </p:nvPicPr>
         <p:blipFill>
-          <a:blip r:embed="rId18"/>
+          <a:blip r:embed="rId19"/>
           <a:stretch>
             <a:fillRect/>
           </a:stretch>
@@ -8594,7 +9605,7 @@
           <p:nvPr/>
         </p:nvPicPr>
         <p:blipFill>
-          <a:blip r:embed="rId19"/>
+          <a:blip r:embed="rId20"/>
           <a:stretch>
             <a:fillRect/>
           </a:stretch>
@@ -8618,7 +9629,7 @@
           <p:nvPr/>
         </p:nvPicPr>
         <p:blipFill>
-          <a:blip r:embed="rId20"/>
+          <a:blip r:embed="rId21"/>
           <a:stretch>
             <a:fillRect/>
           </a:stretch>
@@ -8642,7 +9653,7 @@
           <p:nvPr/>
         </p:nvPicPr>
         <p:blipFill>
-          <a:blip r:embed="rId21"/>
+          <a:blip r:embed="rId22"/>
           <a:stretch>
             <a:fillRect/>
           </a:stretch>
@@ -8666,7 +9677,7 @@
           <p:nvPr/>
         </p:nvPicPr>
         <p:blipFill>
-          <a:blip r:embed="rId22"/>
+          <a:blip r:embed="rId23"/>
           <a:stretch>
             <a:fillRect/>
           </a:stretch>
@@ -8690,7 +9701,7 @@
           <p:nvPr/>
         </p:nvPicPr>
         <p:blipFill>
-          <a:blip r:embed="rId23"/>
+          <a:blip r:embed="rId24"/>
           <a:stretch>
             <a:fillRect/>
           </a:stretch>
@@ -8714,7 +9725,7 @@
           <p:nvPr/>
         </p:nvPicPr>
         <p:blipFill>
-          <a:blip r:embed="rId24"/>
+          <a:blip r:embed="rId25"/>
           <a:stretch>
             <a:fillRect/>
           </a:stretch>
@@ -8738,7 +9749,7 @@
           <p:nvPr/>
         </p:nvPicPr>
         <p:blipFill>
-          <a:blip r:embed="rId25"/>
+          <a:blip r:embed="rId26"/>
           <a:stretch>
             <a:fillRect/>
           </a:stretch>
@@ -8762,7 +9773,7 @@
           <p:nvPr/>
         </p:nvPicPr>
         <p:blipFill>
-          <a:blip r:embed="rId26"/>
+          <a:blip r:embed="rId27"/>
           <a:stretch>
             <a:fillRect/>
           </a:stretch>
@@ -12801,7 +13812,7 @@
           <a:graphicData uri="http://schemas.openxmlformats.org/presentationml/2006/ole">
             <mc:AlternateContent xmlns:mc="http://schemas.openxmlformats.org/markup-compatibility/2006">
               <mc:Choice xmlns:v="urn:schemas-microsoft-com:vml" Requires="v">
-                <p:oleObj spid="_x0000_s1947" name="公式" r:id="rId3" imgW="1028520" imgH="241200" progId="Equation.3">
+                <p:oleObj spid="_x0000_s2010" name="公式" r:id="rId3" imgW="1028520" imgH="241200" progId="Equation.3">
                   <p:embed/>
                 </p:oleObj>
               </mc:Choice>
@@ -12944,7 +13955,7 @@
           <a:graphicData uri="http://schemas.openxmlformats.org/presentationml/2006/ole">
             <mc:AlternateContent xmlns:mc="http://schemas.openxmlformats.org/markup-compatibility/2006">
               <mc:Choice xmlns:v="urn:schemas-microsoft-com:vml" Requires="v">
-                <p:oleObj spid="_x0000_s1948" name="公式" r:id="rId5" imgW="2412720" imgH="241200" progId="Equation.3">
+                <p:oleObj spid="_x0000_s2011" name="公式" r:id="rId5" imgW="2412720" imgH="241200" progId="Equation.3">
                   <p:embed/>
                 </p:oleObj>
               </mc:Choice>
@@ -13009,7 +14020,7 @@
           <a:graphicData uri="http://schemas.openxmlformats.org/presentationml/2006/ole">
             <mc:AlternateContent xmlns:mc="http://schemas.openxmlformats.org/markup-compatibility/2006">
               <mc:Choice xmlns:v="urn:schemas-microsoft-com:vml" Requires="v">
-                <p:oleObj spid="_x0000_s1949" name="公式" r:id="rId7" imgW="2158920" imgH="241200" progId="Equation.3">
+                <p:oleObj spid="_x0000_s2012" name="公式" r:id="rId7" imgW="2158920" imgH="241200" progId="Equation.3">
                   <p:embed/>
                 </p:oleObj>
               </mc:Choice>
@@ -13074,7 +14085,7 @@
           <a:graphicData uri="http://schemas.openxmlformats.org/presentationml/2006/ole">
             <mc:AlternateContent xmlns:mc="http://schemas.openxmlformats.org/markup-compatibility/2006">
               <mc:Choice xmlns:v="urn:schemas-microsoft-com:vml" Requires="v">
-                <p:oleObj spid="_x0000_s1950" name="公式" r:id="rId9" imgW="1765080" imgH="241200" progId="Equation.3">
+                <p:oleObj spid="_x0000_s2013" name="公式" r:id="rId9" imgW="1765080" imgH="241200" progId="Equation.3">
                   <p:embed/>
                 </p:oleObj>
               </mc:Choice>
@@ -13139,7 +14150,7 @@
           <a:graphicData uri="http://schemas.openxmlformats.org/presentationml/2006/ole">
             <mc:AlternateContent xmlns:mc="http://schemas.openxmlformats.org/markup-compatibility/2006">
               <mc:Choice xmlns:v="urn:schemas-microsoft-com:vml" Requires="v">
-                <p:oleObj spid="_x0000_s1951" name="公式" r:id="rId11" imgW="876240" imgH="431640" progId="Equation.3">
+                <p:oleObj spid="_x0000_s2014" name="公式" r:id="rId11" imgW="876240" imgH="431640" progId="Equation.3">
                   <p:embed/>
                 </p:oleObj>
               </mc:Choice>
@@ -13204,7 +14215,7 @@
           <a:graphicData uri="http://schemas.openxmlformats.org/presentationml/2006/ole">
             <mc:AlternateContent xmlns:mc="http://schemas.openxmlformats.org/markup-compatibility/2006">
               <mc:Choice xmlns:v="urn:schemas-microsoft-com:vml" Requires="v">
-                <p:oleObj spid="_x0000_s1952" name="公式" r:id="rId13" imgW="1130040" imgH="228600" progId="Equation.3">
+                <p:oleObj spid="_x0000_s2015" name="公式" r:id="rId13" imgW="1130040" imgH="228600" progId="Equation.3">
                   <p:embed/>
                 </p:oleObj>
               </mc:Choice>
@@ -13269,7 +14280,7 @@
           <a:graphicData uri="http://schemas.openxmlformats.org/presentationml/2006/ole">
             <mc:AlternateContent xmlns:mc="http://schemas.openxmlformats.org/markup-compatibility/2006">
               <mc:Choice xmlns:v="urn:schemas-microsoft-com:vml" Requires="v">
-                <p:oleObj spid="_x0000_s1953" name="公式" r:id="rId15" imgW="1028520" imgH="228600" progId="Equation.3">
+                <p:oleObj spid="_x0000_s2016" name="公式" r:id="rId15" imgW="1028520" imgH="228600" progId="Equation.3">
                   <p:embed/>
                 </p:oleObj>
               </mc:Choice>
@@ -13334,7 +14345,7 @@
           <a:graphicData uri="http://schemas.openxmlformats.org/presentationml/2006/ole">
             <mc:AlternateContent xmlns:mc="http://schemas.openxmlformats.org/markup-compatibility/2006">
               <mc:Choice xmlns:v="urn:schemas-microsoft-com:vml" Requires="v">
-                <p:oleObj spid="_x0000_s1954" name="公式" r:id="rId17" imgW="1625400" imgH="444240" progId="Equation.3">
+                <p:oleObj spid="_x0000_s2017" name="公式" r:id="rId17" imgW="1625400" imgH="444240" progId="Equation.3">
                   <p:embed/>
                 </p:oleObj>
               </mc:Choice>
@@ -13399,7 +14410,7 @@
           <a:graphicData uri="http://schemas.openxmlformats.org/presentationml/2006/ole">
             <mc:AlternateContent xmlns:mc="http://schemas.openxmlformats.org/markup-compatibility/2006">
               <mc:Choice xmlns:v="urn:schemas-microsoft-com:vml" Requires="v">
-                <p:oleObj spid="_x0000_s1955" name="公式" r:id="rId19" imgW="2514600" imgH="419040" progId="Equation.3">
+                <p:oleObj spid="_x0000_s2018" name="公式" r:id="rId19" imgW="2514600" imgH="419040" progId="Equation.3">
                   <p:embed/>
                 </p:oleObj>
               </mc:Choice>
@@ -20422,7 +21433,7 @@
           <a:graphicData uri="http://schemas.openxmlformats.org/presentationml/2006/ole">
             <mc:AlternateContent xmlns:mc="http://schemas.openxmlformats.org/markup-compatibility/2006">
               <mc:Choice xmlns:v="urn:schemas-microsoft-com:vml" Requires="v">
-                <p:oleObj spid="_x0000_s2164" name="公式" r:id="rId4" imgW="914400" imgH="215640" progId="Equation.3">
+                <p:oleObj spid="_x0000_s2192" name="公式" r:id="rId4" imgW="914400" imgH="215640" progId="Equation.3">
                   <p:embed/>
                 </p:oleObj>
               </mc:Choice>
@@ -20479,7 +21490,7 @@
           <a:graphicData uri="http://schemas.openxmlformats.org/presentationml/2006/ole">
             <mc:AlternateContent xmlns:mc="http://schemas.openxmlformats.org/markup-compatibility/2006">
               <mc:Choice xmlns:v="urn:schemas-microsoft-com:vml" Requires="v">
-                <p:oleObj spid="_x0000_s2165" name="公式" r:id="rId6" imgW="1739880" imgH="672840" progId="Equation.3">
+                <p:oleObj spid="_x0000_s2193" name="公式" r:id="rId6" imgW="1739880" imgH="672840" progId="Equation.3">
                   <p:embed/>
                 </p:oleObj>
               </mc:Choice>
@@ -20536,7 +21547,7 @@
           <a:graphicData uri="http://schemas.openxmlformats.org/presentationml/2006/ole">
             <mc:AlternateContent xmlns:mc="http://schemas.openxmlformats.org/markup-compatibility/2006">
               <mc:Choice xmlns:v="urn:schemas-microsoft-com:vml" Requires="v">
-                <p:oleObj spid="_x0000_s2166" name="公式" r:id="rId8" imgW="330120" imgH="241200" progId="Equation.3">
+                <p:oleObj spid="_x0000_s2194" name="公式" r:id="rId8" imgW="330120" imgH="241200" progId="Equation.3">
                   <p:embed/>
                 </p:oleObj>
               </mc:Choice>
@@ -20593,7 +21604,7 @@
           <a:graphicData uri="http://schemas.openxmlformats.org/presentationml/2006/ole">
             <mc:AlternateContent xmlns:mc="http://schemas.openxmlformats.org/markup-compatibility/2006">
               <mc:Choice xmlns:v="urn:schemas-microsoft-com:vml" Requires="v">
-                <p:oleObj spid="_x0000_s2167" name="公式" r:id="rId10" imgW="1104840" imgH="672840" progId="Equation.3">
+                <p:oleObj spid="_x0000_s2195" name="公式" r:id="rId10" imgW="1104840" imgH="672840" progId="Equation.3">
                   <p:embed/>
                 </p:oleObj>
               </mc:Choice>
@@ -23477,7 +24488,7 @@
           <a:graphicData uri="http://schemas.openxmlformats.org/presentationml/2006/ole">
             <mc:AlternateContent xmlns:mc="http://schemas.openxmlformats.org/markup-compatibility/2006">
               <mc:Choice xmlns:v="urn:schemas-microsoft-com:vml" Requires="v">
-                <p:oleObj spid="_x0000_s3336" name="公式" r:id="rId3" imgW="330120" imgH="228600" progId="Equation.3">
+                <p:oleObj spid="_x0000_s3427" name="公式" r:id="rId3" imgW="330120" imgH="228600" progId="Equation.3">
                   <p:embed/>
                 </p:oleObj>
               </mc:Choice>
@@ -23534,7 +24545,7 @@
           <a:graphicData uri="http://schemas.openxmlformats.org/presentationml/2006/ole">
             <mc:AlternateContent xmlns:mc="http://schemas.openxmlformats.org/markup-compatibility/2006">
               <mc:Choice xmlns:v="urn:schemas-microsoft-com:vml" Requires="v">
-                <p:oleObj spid="_x0000_s3337" name="公式" r:id="rId5" imgW="253800" imgH="228600" progId="Equation.3">
+                <p:oleObj spid="_x0000_s3428" name="公式" r:id="rId5" imgW="253800" imgH="228600" progId="Equation.3">
                   <p:embed/>
                 </p:oleObj>
               </mc:Choice>
@@ -23591,7 +24602,7 @@
           <a:graphicData uri="http://schemas.openxmlformats.org/presentationml/2006/ole">
             <mc:AlternateContent xmlns:mc="http://schemas.openxmlformats.org/markup-compatibility/2006">
               <mc:Choice xmlns:v="urn:schemas-microsoft-com:vml" Requires="v">
-                <p:oleObj spid="_x0000_s3338" name="公式" r:id="rId7" imgW="304560" imgH="228600" progId="Equation.3">
+                <p:oleObj spid="_x0000_s3429" name="公式" r:id="rId7" imgW="304560" imgH="228600" progId="Equation.3">
                   <p:embed/>
                 </p:oleObj>
               </mc:Choice>
@@ -23648,7 +24659,7 @@
           <a:graphicData uri="http://schemas.openxmlformats.org/presentationml/2006/ole">
             <mc:AlternateContent xmlns:mc="http://schemas.openxmlformats.org/markup-compatibility/2006">
               <mc:Choice xmlns:v="urn:schemas-microsoft-com:vml" Requires="v">
-                <p:oleObj spid="_x0000_s3339" name="公式" r:id="rId9" imgW="228600" imgH="228600" progId="Equation.3">
+                <p:oleObj spid="_x0000_s3430" name="公式" r:id="rId9" imgW="228600" imgH="228600" progId="Equation.3">
                   <p:embed/>
                 </p:oleObj>
               </mc:Choice>
@@ -23705,7 +24716,7 @@
           <a:graphicData uri="http://schemas.openxmlformats.org/presentationml/2006/ole">
             <mc:AlternateContent xmlns:mc="http://schemas.openxmlformats.org/markup-compatibility/2006">
               <mc:Choice xmlns:v="urn:schemas-microsoft-com:vml" Requires="v">
-                <p:oleObj spid="_x0000_s3340" name="公式" r:id="rId11" imgW="1002960" imgH="241200" progId="Equation.3">
+                <p:oleObj spid="_x0000_s3431" name="公式" r:id="rId11" imgW="1002960" imgH="241200" progId="Equation.3">
                   <p:embed/>
                 </p:oleObj>
               </mc:Choice>
@@ -23762,7 +24773,7 @@
           <a:graphicData uri="http://schemas.openxmlformats.org/presentationml/2006/ole">
             <mc:AlternateContent xmlns:mc="http://schemas.openxmlformats.org/markup-compatibility/2006">
               <mc:Choice xmlns:v="urn:schemas-microsoft-com:vml" Requires="v">
-                <p:oleObj spid="_x0000_s3341" name="公式" r:id="rId13" imgW="1002960" imgH="241200" progId="Equation.3">
+                <p:oleObj spid="_x0000_s3432" name="公式" r:id="rId13" imgW="1002960" imgH="241200" progId="Equation.3">
                   <p:embed/>
                 </p:oleObj>
               </mc:Choice>
@@ -23819,7 +24830,7 @@
           <a:graphicData uri="http://schemas.openxmlformats.org/presentationml/2006/ole">
             <mc:AlternateContent xmlns:mc="http://schemas.openxmlformats.org/markup-compatibility/2006">
               <mc:Choice xmlns:v="urn:schemas-microsoft-com:vml" Requires="v">
-                <p:oleObj spid="_x0000_s3342" name="公式" r:id="rId15" imgW="1079280" imgH="469800" progId="Equation.3">
+                <p:oleObj spid="_x0000_s3433" name="公式" r:id="rId15" imgW="1079280" imgH="469800" progId="Equation.3">
                   <p:embed/>
                 </p:oleObj>
               </mc:Choice>
@@ -23876,7 +24887,7 @@
           <a:graphicData uri="http://schemas.openxmlformats.org/presentationml/2006/ole">
             <mc:AlternateContent xmlns:mc="http://schemas.openxmlformats.org/markup-compatibility/2006">
               <mc:Choice xmlns:v="urn:schemas-microsoft-com:vml" Requires="v">
-                <p:oleObj spid="_x0000_s3343" name="公式" r:id="rId17" imgW="685800" imgH="469800" progId="Equation.3">
+                <p:oleObj spid="_x0000_s3434" name="公式" r:id="rId17" imgW="685800" imgH="469800" progId="Equation.3">
                   <p:embed/>
                 </p:oleObj>
               </mc:Choice>
@@ -23933,7 +24944,7 @@
           <a:graphicData uri="http://schemas.openxmlformats.org/presentationml/2006/ole">
             <mc:AlternateContent xmlns:mc="http://schemas.openxmlformats.org/markup-compatibility/2006">
               <mc:Choice xmlns:v="urn:schemas-microsoft-com:vml" Requires="v">
-                <p:oleObj spid="_x0000_s3344" name="公式" r:id="rId19" imgW="1625400" imgH="419040" progId="Equation.3">
+                <p:oleObj spid="_x0000_s3435" name="公式" r:id="rId19" imgW="1625400" imgH="419040" progId="Equation.3">
                   <p:embed/>
                 </p:oleObj>
               </mc:Choice>
@@ -23990,7 +25001,7 @@
           <a:graphicData uri="http://schemas.openxmlformats.org/presentationml/2006/ole">
             <mc:AlternateContent xmlns:mc="http://schemas.openxmlformats.org/markup-compatibility/2006">
               <mc:Choice xmlns:v="urn:schemas-microsoft-com:vml" Requires="v">
-                <p:oleObj spid="_x0000_s3345" name="公式" r:id="rId21" imgW="1968480" imgH="419040" progId="Equation.3">
+                <p:oleObj spid="_x0000_s3436" name="公式" r:id="rId21" imgW="1968480" imgH="419040" progId="Equation.3">
                   <p:embed/>
                 </p:oleObj>
               </mc:Choice>
@@ -24047,7 +25058,7 @@
           <a:graphicData uri="http://schemas.openxmlformats.org/presentationml/2006/ole">
             <mc:AlternateContent xmlns:mc="http://schemas.openxmlformats.org/markup-compatibility/2006">
               <mc:Choice xmlns:v="urn:schemas-microsoft-com:vml" Requires="v">
-                <p:oleObj spid="_x0000_s3346" name="公式" r:id="rId23" imgW="2590560" imgH="977760" progId="Equation.3">
+                <p:oleObj spid="_x0000_s3437" name="公式" r:id="rId23" imgW="2590560" imgH="977760" progId="Equation.3">
                   <p:embed/>
                 </p:oleObj>
               </mc:Choice>
@@ -24104,7 +25115,7 @@
           <a:graphicData uri="http://schemas.openxmlformats.org/presentationml/2006/ole">
             <mc:AlternateContent xmlns:mc="http://schemas.openxmlformats.org/markup-compatibility/2006">
               <mc:Choice xmlns:v="urn:schemas-microsoft-com:vml" Requires="v">
-                <p:oleObj spid="_x0000_s3347" name="公式" r:id="rId25" imgW="672840" imgH="241200" progId="Equation.3">
+                <p:oleObj spid="_x0000_s3438" name="公式" r:id="rId25" imgW="672840" imgH="241200" progId="Equation.3">
                   <p:embed/>
                 </p:oleObj>
               </mc:Choice>
@@ -24161,7 +25172,7 @@
           <a:graphicData uri="http://schemas.openxmlformats.org/presentationml/2006/ole">
             <mc:AlternateContent xmlns:mc="http://schemas.openxmlformats.org/markup-compatibility/2006">
               <mc:Choice xmlns:v="urn:schemas-microsoft-com:vml" Requires="v">
-                <p:oleObj spid="_x0000_s3348" name="公式" r:id="rId27" imgW="672840" imgH="241200" progId="Equation.3">
+                <p:oleObj spid="_x0000_s3439" name="公式" r:id="rId27" imgW="672840" imgH="241200" progId="Equation.3">
                   <p:embed/>
                 </p:oleObj>
               </mc:Choice>

</xml_diff>